<commit_message>
Code Analysis ruleset fixes
</commit_message>
<xml_diff>
--- a/QTec/Presentation.pptx
+++ b/QTec/Presentation.pptx
@@ -807,9 +807,14 @@
           <a:lstStyle/>
           <a:p>
             <a:r>
-              <a:rPr lang="en-US"/>
-              <a:t>Click to add notes</a:t>
-            </a:r>
+              <a:rPr lang="en-US" dirty="0" smtClean="0"/>
+              <a:t>Speak</a:t>
+            </a:r>
+            <a:r>
+              <a:rPr lang="en-US" baseline="0" dirty="0" smtClean="0"/>
+              <a:t> about yourself in brief showcasing your technical expertise.</a:t>
+            </a:r>
+            <a:endParaRPr lang="en-US" dirty="0"/>
           </a:p>
         </p:txBody>
       </p:sp>
@@ -1081,53 +1086,11 @@
           <a:bodyPr/>
           <a:lstStyle/>
           <a:p>
-            <a:r>
-              <a:rPr lang="en-US" b="1"/>
-              <a:t>Example objectives</a:t>
-            </a:r>
-          </a:p>
-          <a:p>
-            <a:r>
-              <a:rPr lang="en-US"/>
-              <a:t>At the end of this lesson, you will be able to:</a:t>
-            </a:r>
-          </a:p>
-          <a:p>
-            <a:pPr lvl="1">
-              <a:buFontTx/>
-              <a:buChar char="•"/>
-            </a:pPr>
-            <a:r>
-              <a:rPr lang="en-US"/>
-              <a:t>Save files to the team Web server.</a:t>
-            </a:r>
-          </a:p>
-          <a:p>
-            <a:pPr lvl="1">
-              <a:buFontTx/>
-              <a:buChar char="•"/>
-            </a:pPr>
-            <a:r>
-              <a:rPr lang="en-US"/>
-              <a:t>Move files to different locations on the team Web server.</a:t>
-            </a:r>
-          </a:p>
-          <a:p>
-            <a:pPr lvl="1">
-              <a:buFontTx/>
-              <a:buChar char="•"/>
-            </a:pPr>
-            <a:r>
-              <a:rPr lang="en-US"/>
-              <a:t>Share files on the team Web server.</a:t>
-            </a:r>
-          </a:p>
-          <a:p>
             <a:pPr>
               <a:buFontTx/>
-              <a:buChar char="•"/>
+              <a:buNone/>
             </a:pPr>
-            <a:endParaRPr lang="en-US"/>
+            <a:endParaRPr lang="en-US" dirty="0"/>
           </a:p>
         </p:txBody>
       </p:sp>
@@ -5084,7 +5047,220 @@
   <p:timing>
     <p:tnLst>
       <p:par>
-        <p:cTn id="1" dur="indefinite" restart="never" nodeType="tmRoot"/>
+        <p:cTn id="1" dur="indefinite" restart="never" nodeType="tmRoot">
+          <p:childTnLst>
+            <p:seq concurrent="1" nextAc="seek">
+              <p:cTn id="2" dur="indefinite" nodeType="mainSeq">
+                <p:childTnLst>
+                  <p:par>
+                    <p:cTn id="3" fill="hold">
+                      <p:stCondLst>
+                        <p:cond delay="indefinite"/>
+                      </p:stCondLst>
+                      <p:childTnLst>
+                        <p:par>
+                          <p:cTn id="4" fill="hold">
+                            <p:stCondLst>
+                              <p:cond delay="0"/>
+                            </p:stCondLst>
+                            <p:childTnLst>
+                              <p:par>
+                                <p:cTn id="5" presetID="16" presetClass="entr" presetSubtype="21" fill="hold" nodeType="clickEffect">
+                                  <p:stCondLst>
+                                    <p:cond delay="0"/>
+                                  </p:stCondLst>
+                                  <p:childTnLst>
+                                    <p:set>
+                                      <p:cBhvr>
+                                        <p:cTn id="6" dur="1" fill="hold">
+                                          <p:stCondLst>
+                                            <p:cond delay="0"/>
+                                          </p:stCondLst>
+                                        </p:cTn>
+                                        <p:tgtEl>
+                                          <p:spTgt spid="2051">
+                                            <p:txEl>
+                                              <p:pRg st="0" end="0"/>
+                                            </p:txEl>
+                                          </p:spTgt>
+                                        </p:tgtEl>
+                                        <p:attrNameLst>
+                                          <p:attrName>style.visibility</p:attrName>
+                                        </p:attrNameLst>
+                                      </p:cBhvr>
+                                      <p:to>
+                                        <p:strVal val="visible"/>
+                                      </p:to>
+                                    </p:set>
+                                    <p:animEffect transition="in" filter="barn(inVertical)">
+                                      <p:cBhvr>
+                                        <p:cTn id="7" dur="500"/>
+                                        <p:tgtEl>
+                                          <p:spTgt spid="2051">
+                                            <p:txEl>
+                                              <p:pRg st="0" end="0"/>
+                                            </p:txEl>
+                                          </p:spTgt>
+                                        </p:tgtEl>
+                                      </p:cBhvr>
+                                    </p:animEffect>
+                                  </p:childTnLst>
+                                </p:cTn>
+                              </p:par>
+                              <p:par>
+                                <p:cTn id="8" presetID="16" presetClass="entr" presetSubtype="21" fill="hold" nodeType="withEffect">
+                                  <p:stCondLst>
+                                    <p:cond delay="0"/>
+                                  </p:stCondLst>
+                                  <p:childTnLst>
+                                    <p:set>
+                                      <p:cBhvr>
+                                        <p:cTn id="9" dur="1" fill="hold">
+                                          <p:stCondLst>
+                                            <p:cond delay="0"/>
+                                          </p:stCondLst>
+                                        </p:cTn>
+                                        <p:tgtEl>
+                                          <p:spTgt spid="2051">
+                                            <p:txEl>
+                                              <p:pRg st="1" end="1"/>
+                                            </p:txEl>
+                                          </p:spTgt>
+                                        </p:tgtEl>
+                                        <p:attrNameLst>
+                                          <p:attrName>style.visibility</p:attrName>
+                                        </p:attrNameLst>
+                                      </p:cBhvr>
+                                      <p:to>
+                                        <p:strVal val="visible"/>
+                                      </p:to>
+                                    </p:set>
+                                    <p:animEffect transition="in" filter="barn(inVertical)">
+                                      <p:cBhvr>
+                                        <p:cTn id="10" dur="500"/>
+                                        <p:tgtEl>
+                                          <p:spTgt spid="2051">
+                                            <p:txEl>
+                                              <p:pRg st="1" end="1"/>
+                                            </p:txEl>
+                                          </p:spTgt>
+                                        </p:tgtEl>
+                                      </p:cBhvr>
+                                    </p:animEffect>
+                                  </p:childTnLst>
+                                </p:cTn>
+                              </p:par>
+                              <p:par>
+                                <p:cTn id="11" presetID="16" presetClass="entr" presetSubtype="21" fill="hold" nodeType="withEffect">
+                                  <p:stCondLst>
+                                    <p:cond delay="0"/>
+                                  </p:stCondLst>
+                                  <p:childTnLst>
+                                    <p:set>
+                                      <p:cBhvr>
+                                        <p:cTn id="12" dur="1" fill="hold">
+                                          <p:stCondLst>
+                                            <p:cond delay="0"/>
+                                          </p:stCondLst>
+                                        </p:cTn>
+                                        <p:tgtEl>
+                                          <p:spTgt spid="2051">
+                                            <p:txEl>
+                                              <p:pRg st="2" end="2"/>
+                                            </p:txEl>
+                                          </p:spTgt>
+                                        </p:tgtEl>
+                                        <p:attrNameLst>
+                                          <p:attrName>style.visibility</p:attrName>
+                                        </p:attrNameLst>
+                                      </p:cBhvr>
+                                      <p:to>
+                                        <p:strVal val="visible"/>
+                                      </p:to>
+                                    </p:set>
+                                    <p:animEffect transition="in" filter="barn(inVertical)">
+                                      <p:cBhvr>
+                                        <p:cTn id="13" dur="500"/>
+                                        <p:tgtEl>
+                                          <p:spTgt spid="2051">
+                                            <p:txEl>
+                                              <p:pRg st="2" end="2"/>
+                                            </p:txEl>
+                                          </p:spTgt>
+                                        </p:tgtEl>
+                                      </p:cBhvr>
+                                    </p:animEffect>
+                                  </p:childTnLst>
+                                </p:cTn>
+                              </p:par>
+                              <p:par>
+                                <p:cTn id="14" presetID="16" presetClass="entr" presetSubtype="21" fill="hold" nodeType="withEffect">
+                                  <p:stCondLst>
+                                    <p:cond delay="0"/>
+                                  </p:stCondLst>
+                                  <p:childTnLst>
+                                    <p:set>
+                                      <p:cBhvr>
+                                        <p:cTn id="15" dur="1" fill="hold">
+                                          <p:stCondLst>
+                                            <p:cond delay="0"/>
+                                          </p:stCondLst>
+                                        </p:cTn>
+                                        <p:tgtEl>
+                                          <p:spTgt spid="2051">
+                                            <p:txEl>
+                                              <p:pRg st="3" end="3"/>
+                                            </p:txEl>
+                                          </p:spTgt>
+                                        </p:tgtEl>
+                                        <p:attrNameLst>
+                                          <p:attrName>style.visibility</p:attrName>
+                                        </p:attrNameLst>
+                                      </p:cBhvr>
+                                      <p:to>
+                                        <p:strVal val="visible"/>
+                                      </p:to>
+                                    </p:set>
+                                    <p:animEffect transition="in" filter="barn(inVertical)">
+                                      <p:cBhvr>
+                                        <p:cTn id="16" dur="500"/>
+                                        <p:tgtEl>
+                                          <p:spTgt spid="2051">
+                                            <p:txEl>
+                                              <p:pRg st="3" end="3"/>
+                                            </p:txEl>
+                                          </p:spTgt>
+                                        </p:tgtEl>
+                                      </p:cBhvr>
+                                    </p:animEffect>
+                                  </p:childTnLst>
+                                </p:cTn>
+                              </p:par>
+                            </p:childTnLst>
+                          </p:cTn>
+                        </p:par>
+                      </p:childTnLst>
+                    </p:cTn>
+                  </p:par>
+                </p:childTnLst>
+              </p:cTn>
+              <p:prevCondLst>
+                <p:cond evt="onPrev" delay="0">
+                  <p:tgtEl>
+                    <p:sldTgt/>
+                  </p:tgtEl>
+                </p:cond>
+              </p:prevCondLst>
+              <p:nextCondLst>
+                <p:cond evt="onNext" delay="0">
+                  <p:tgtEl>
+                    <p:sldTgt/>
+                  </p:tgtEl>
+                </p:cond>
+              </p:nextCondLst>
+            </p:seq>
+          </p:childTnLst>
+        </p:cTn>
       </p:par>
     </p:tnLst>
   </p:timing>
@@ -5657,8 +5833,13 @@
           <a:p>
             <a:r>
               <a:rPr lang="en-US" dirty="0"/>
-              <a:t>Entity Framework Code First</a:t>
-            </a:r>
+              <a:t>Entity Framework Code </a:t>
+            </a:r>
+            <a:r>
+              <a:rPr lang="en-US" dirty="0" smtClean="0"/>
+              <a:t>First.</a:t>
+            </a:r>
+            <a:endParaRPr lang="en-US" dirty="0"/>
           </a:p>
           <a:p>
             <a:r>
@@ -5673,13 +5854,13 @@
           <a:p>
             <a:r>
               <a:rPr lang="en-US" dirty="0" smtClean="0"/>
-              <a:t>Fluent Validation</a:t>
-            </a:r>
-          </a:p>
-          <a:p>
-            <a:r>
-              <a:rPr lang="en-US" smtClean="0"/>
-              <a:t>Auto mapper</a:t>
+              <a:t>Fluent Validation.</a:t>
+            </a:r>
+          </a:p>
+          <a:p>
+            <a:r>
+              <a:rPr lang="en-US" dirty="0" smtClean="0"/>
+              <a:t>Auto mapper.</a:t>
             </a:r>
             <a:endParaRPr lang="en-US" dirty="0" smtClean="0"/>
           </a:p>
@@ -5693,9 +5874,756 @@
   <p:timing>
     <p:tnLst>
       <p:par>
-        <p:cTn id="1" dur="indefinite" restart="never" nodeType="tmRoot"/>
+        <p:cTn id="1" dur="indefinite" restart="never" nodeType="tmRoot">
+          <p:childTnLst>
+            <p:seq concurrent="1" nextAc="seek">
+              <p:cTn id="2" dur="indefinite" nodeType="mainSeq">
+                <p:childTnLst>
+                  <p:par>
+                    <p:cTn id="3" fill="hold">
+                      <p:stCondLst>
+                        <p:cond delay="indefinite"/>
+                      </p:stCondLst>
+                      <p:childTnLst>
+                        <p:par>
+                          <p:cTn id="4" fill="hold">
+                            <p:stCondLst>
+                              <p:cond delay="0"/>
+                            </p:stCondLst>
+                            <p:childTnLst>
+                              <p:par>
+                                <p:cTn id="5" presetID="2" presetClass="entr" presetSubtype="4" fill="hold" grpId="0" nodeType="clickEffect">
+                                  <p:stCondLst>
+                                    <p:cond delay="0"/>
+                                  </p:stCondLst>
+                                  <p:childTnLst>
+                                    <p:set>
+                                      <p:cBhvr>
+                                        <p:cTn id="6" dur="1" fill="hold">
+                                          <p:stCondLst>
+                                            <p:cond delay="0"/>
+                                          </p:stCondLst>
+                                        </p:cTn>
+                                        <p:tgtEl>
+                                          <p:spTgt spid="6147">
+                                            <p:txEl>
+                                              <p:pRg st="0" end="0"/>
+                                            </p:txEl>
+                                          </p:spTgt>
+                                        </p:tgtEl>
+                                        <p:attrNameLst>
+                                          <p:attrName>style.visibility</p:attrName>
+                                        </p:attrNameLst>
+                                      </p:cBhvr>
+                                      <p:to>
+                                        <p:strVal val="visible"/>
+                                      </p:to>
+                                    </p:set>
+                                    <p:anim calcmode="lin" valueType="num">
+                                      <p:cBhvr additive="base">
+                                        <p:cTn id="7" dur="500" fill="hold"/>
+                                        <p:tgtEl>
+                                          <p:spTgt spid="6147">
+                                            <p:txEl>
+                                              <p:pRg st="0" end="0"/>
+                                            </p:txEl>
+                                          </p:spTgt>
+                                        </p:tgtEl>
+                                        <p:attrNameLst>
+                                          <p:attrName>ppt_x</p:attrName>
+                                        </p:attrNameLst>
+                                      </p:cBhvr>
+                                      <p:tavLst>
+                                        <p:tav tm="0">
+                                          <p:val>
+                                            <p:strVal val="#ppt_x"/>
+                                          </p:val>
+                                        </p:tav>
+                                        <p:tav tm="100000">
+                                          <p:val>
+                                            <p:strVal val="#ppt_x"/>
+                                          </p:val>
+                                        </p:tav>
+                                      </p:tavLst>
+                                    </p:anim>
+                                    <p:anim calcmode="lin" valueType="num">
+                                      <p:cBhvr additive="base">
+                                        <p:cTn id="8" dur="500" fill="hold"/>
+                                        <p:tgtEl>
+                                          <p:spTgt spid="6147">
+                                            <p:txEl>
+                                              <p:pRg st="0" end="0"/>
+                                            </p:txEl>
+                                          </p:spTgt>
+                                        </p:tgtEl>
+                                        <p:attrNameLst>
+                                          <p:attrName>ppt_y</p:attrName>
+                                        </p:attrNameLst>
+                                      </p:cBhvr>
+                                      <p:tavLst>
+                                        <p:tav tm="0">
+                                          <p:val>
+                                            <p:strVal val="1+#ppt_h/2"/>
+                                          </p:val>
+                                        </p:tav>
+                                        <p:tav tm="100000">
+                                          <p:val>
+                                            <p:strVal val="#ppt_y"/>
+                                          </p:val>
+                                        </p:tav>
+                                      </p:tavLst>
+                                    </p:anim>
+                                  </p:childTnLst>
+                                </p:cTn>
+                              </p:par>
+                            </p:childTnLst>
+                          </p:cTn>
+                        </p:par>
+                      </p:childTnLst>
+                    </p:cTn>
+                  </p:par>
+                  <p:par>
+                    <p:cTn id="9" fill="hold">
+                      <p:stCondLst>
+                        <p:cond delay="indefinite"/>
+                      </p:stCondLst>
+                      <p:childTnLst>
+                        <p:par>
+                          <p:cTn id="10" fill="hold">
+                            <p:stCondLst>
+                              <p:cond delay="0"/>
+                            </p:stCondLst>
+                            <p:childTnLst>
+                              <p:par>
+                                <p:cTn id="11" presetID="2" presetClass="entr" presetSubtype="4" fill="hold" grpId="0" nodeType="clickEffect">
+                                  <p:stCondLst>
+                                    <p:cond delay="0"/>
+                                  </p:stCondLst>
+                                  <p:childTnLst>
+                                    <p:set>
+                                      <p:cBhvr>
+                                        <p:cTn id="12" dur="1" fill="hold">
+                                          <p:stCondLst>
+                                            <p:cond delay="0"/>
+                                          </p:stCondLst>
+                                        </p:cTn>
+                                        <p:tgtEl>
+                                          <p:spTgt spid="6147">
+                                            <p:txEl>
+                                              <p:pRg st="1" end="1"/>
+                                            </p:txEl>
+                                          </p:spTgt>
+                                        </p:tgtEl>
+                                        <p:attrNameLst>
+                                          <p:attrName>style.visibility</p:attrName>
+                                        </p:attrNameLst>
+                                      </p:cBhvr>
+                                      <p:to>
+                                        <p:strVal val="visible"/>
+                                      </p:to>
+                                    </p:set>
+                                    <p:anim calcmode="lin" valueType="num">
+                                      <p:cBhvr additive="base">
+                                        <p:cTn id="13" dur="500" fill="hold"/>
+                                        <p:tgtEl>
+                                          <p:spTgt spid="6147">
+                                            <p:txEl>
+                                              <p:pRg st="1" end="1"/>
+                                            </p:txEl>
+                                          </p:spTgt>
+                                        </p:tgtEl>
+                                        <p:attrNameLst>
+                                          <p:attrName>ppt_x</p:attrName>
+                                        </p:attrNameLst>
+                                      </p:cBhvr>
+                                      <p:tavLst>
+                                        <p:tav tm="0">
+                                          <p:val>
+                                            <p:strVal val="#ppt_x"/>
+                                          </p:val>
+                                        </p:tav>
+                                        <p:tav tm="100000">
+                                          <p:val>
+                                            <p:strVal val="#ppt_x"/>
+                                          </p:val>
+                                        </p:tav>
+                                      </p:tavLst>
+                                    </p:anim>
+                                    <p:anim calcmode="lin" valueType="num">
+                                      <p:cBhvr additive="base">
+                                        <p:cTn id="14" dur="500" fill="hold"/>
+                                        <p:tgtEl>
+                                          <p:spTgt spid="6147">
+                                            <p:txEl>
+                                              <p:pRg st="1" end="1"/>
+                                            </p:txEl>
+                                          </p:spTgt>
+                                        </p:tgtEl>
+                                        <p:attrNameLst>
+                                          <p:attrName>ppt_y</p:attrName>
+                                        </p:attrNameLst>
+                                      </p:cBhvr>
+                                      <p:tavLst>
+                                        <p:tav tm="0">
+                                          <p:val>
+                                            <p:strVal val="1+#ppt_h/2"/>
+                                          </p:val>
+                                        </p:tav>
+                                        <p:tav tm="100000">
+                                          <p:val>
+                                            <p:strVal val="#ppt_y"/>
+                                          </p:val>
+                                        </p:tav>
+                                      </p:tavLst>
+                                    </p:anim>
+                                  </p:childTnLst>
+                                </p:cTn>
+                              </p:par>
+                            </p:childTnLst>
+                          </p:cTn>
+                        </p:par>
+                      </p:childTnLst>
+                    </p:cTn>
+                  </p:par>
+                  <p:par>
+                    <p:cTn id="15" fill="hold">
+                      <p:stCondLst>
+                        <p:cond delay="indefinite"/>
+                      </p:stCondLst>
+                      <p:childTnLst>
+                        <p:par>
+                          <p:cTn id="16" fill="hold">
+                            <p:stCondLst>
+                              <p:cond delay="0"/>
+                            </p:stCondLst>
+                            <p:childTnLst>
+                              <p:par>
+                                <p:cTn id="17" presetID="2" presetClass="entr" presetSubtype="4" fill="hold" grpId="0" nodeType="clickEffect">
+                                  <p:stCondLst>
+                                    <p:cond delay="0"/>
+                                  </p:stCondLst>
+                                  <p:childTnLst>
+                                    <p:set>
+                                      <p:cBhvr>
+                                        <p:cTn id="18" dur="1" fill="hold">
+                                          <p:stCondLst>
+                                            <p:cond delay="0"/>
+                                          </p:stCondLst>
+                                        </p:cTn>
+                                        <p:tgtEl>
+                                          <p:spTgt spid="6147">
+                                            <p:txEl>
+                                              <p:pRg st="2" end="2"/>
+                                            </p:txEl>
+                                          </p:spTgt>
+                                        </p:tgtEl>
+                                        <p:attrNameLst>
+                                          <p:attrName>style.visibility</p:attrName>
+                                        </p:attrNameLst>
+                                      </p:cBhvr>
+                                      <p:to>
+                                        <p:strVal val="visible"/>
+                                      </p:to>
+                                    </p:set>
+                                    <p:anim calcmode="lin" valueType="num">
+                                      <p:cBhvr additive="base">
+                                        <p:cTn id="19" dur="500" fill="hold"/>
+                                        <p:tgtEl>
+                                          <p:spTgt spid="6147">
+                                            <p:txEl>
+                                              <p:pRg st="2" end="2"/>
+                                            </p:txEl>
+                                          </p:spTgt>
+                                        </p:tgtEl>
+                                        <p:attrNameLst>
+                                          <p:attrName>ppt_x</p:attrName>
+                                        </p:attrNameLst>
+                                      </p:cBhvr>
+                                      <p:tavLst>
+                                        <p:tav tm="0">
+                                          <p:val>
+                                            <p:strVal val="#ppt_x"/>
+                                          </p:val>
+                                        </p:tav>
+                                        <p:tav tm="100000">
+                                          <p:val>
+                                            <p:strVal val="#ppt_x"/>
+                                          </p:val>
+                                        </p:tav>
+                                      </p:tavLst>
+                                    </p:anim>
+                                    <p:anim calcmode="lin" valueType="num">
+                                      <p:cBhvr additive="base">
+                                        <p:cTn id="20" dur="500" fill="hold"/>
+                                        <p:tgtEl>
+                                          <p:spTgt spid="6147">
+                                            <p:txEl>
+                                              <p:pRg st="2" end="2"/>
+                                            </p:txEl>
+                                          </p:spTgt>
+                                        </p:tgtEl>
+                                        <p:attrNameLst>
+                                          <p:attrName>ppt_y</p:attrName>
+                                        </p:attrNameLst>
+                                      </p:cBhvr>
+                                      <p:tavLst>
+                                        <p:tav tm="0">
+                                          <p:val>
+                                            <p:strVal val="1+#ppt_h/2"/>
+                                          </p:val>
+                                        </p:tav>
+                                        <p:tav tm="100000">
+                                          <p:val>
+                                            <p:strVal val="#ppt_y"/>
+                                          </p:val>
+                                        </p:tav>
+                                      </p:tavLst>
+                                    </p:anim>
+                                  </p:childTnLst>
+                                </p:cTn>
+                              </p:par>
+                            </p:childTnLst>
+                          </p:cTn>
+                        </p:par>
+                      </p:childTnLst>
+                    </p:cTn>
+                  </p:par>
+                  <p:par>
+                    <p:cTn id="21" fill="hold">
+                      <p:stCondLst>
+                        <p:cond delay="indefinite"/>
+                      </p:stCondLst>
+                      <p:childTnLst>
+                        <p:par>
+                          <p:cTn id="22" fill="hold">
+                            <p:stCondLst>
+                              <p:cond delay="0"/>
+                            </p:stCondLst>
+                            <p:childTnLst>
+                              <p:par>
+                                <p:cTn id="23" presetID="2" presetClass="entr" presetSubtype="4" fill="hold" grpId="0" nodeType="clickEffect">
+                                  <p:stCondLst>
+                                    <p:cond delay="0"/>
+                                  </p:stCondLst>
+                                  <p:childTnLst>
+                                    <p:set>
+                                      <p:cBhvr>
+                                        <p:cTn id="24" dur="1" fill="hold">
+                                          <p:stCondLst>
+                                            <p:cond delay="0"/>
+                                          </p:stCondLst>
+                                        </p:cTn>
+                                        <p:tgtEl>
+                                          <p:spTgt spid="6147">
+                                            <p:txEl>
+                                              <p:pRg st="3" end="3"/>
+                                            </p:txEl>
+                                          </p:spTgt>
+                                        </p:tgtEl>
+                                        <p:attrNameLst>
+                                          <p:attrName>style.visibility</p:attrName>
+                                        </p:attrNameLst>
+                                      </p:cBhvr>
+                                      <p:to>
+                                        <p:strVal val="visible"/>
+                                      </p:to>
+                                    </p:set>
+                                    <p:anim calcmode="lin" valueType="num">
+                                      <p:cBhvr additive="base">
+                                        <p:cTn id="25" dur="500" fill="hold"/>
+                                        <p:tgtEl>
+                                          <p:spTgt spid="6147">
+                                            <p:txEl>
+                                              <p:pRg st="3" end="3"/>
+                                            </p:txEl>
+                                          </p:spTgt>
+                                        </p:tgtEl>
+                                        <p:attrNameLst>
+                                          <p:attrName>ppt_x</p:attrName>
+                                        </p:attrNameLst>
+                                      </p:cBhvr>
+                                      <p:tavLst>
+                                        <p:tav tm="0">
+                                          <p:val>
+                                            <p:strVal val="#ppt_x"/>
+                                          </p:val>
+                                        </p:tav>
+                                        <p:tav tm="100000">
+                                          <p:val>
+                                            <p:strVal val="#ppt_x"/>
+                                          </p:val>
+                                        </p:tav>
+                                      </p:tavLst>
+                                    </p:anim>
+                                    <p:anim calcmode="lin" valueType="num">
+                                      <p:cBhvr additive="base">
+                                        <p:cTn id="26" dur="500" fill="hold"/>
+                                        <p:tgtEl>
+                                          <p:spTgt spid="6147">
+                                            <p:txEl>
+                                              <p:pRg st="3" end="3"/>
+                                            </p:txEl>
+                                          </p:spTgt>
+                                        </p:tgtEl>
+                                        <p:attrNameLst>
+                                          <p:attrName>ppt_y</p:attrName>
+                                        </p:attrNameLst>
+                                      </p:cBhvr>
+                                      <p:tavLst>
+                                        <p:tav tm="0">
+                                          <p:val>
+                                            <p:strVal val="1+#ppt_h/2"/>
+                                          </p:val>
+                                        </p:tav>
+                                        <p:tav tm="100000">
+                                          <p:val>
+                                            <p:strVal val="#ppt_y"/>
+                                          </p:val>
+                                        </p:tav>
+                                      </p:tavLst>
+                                    </p:anim>
+                                  </p:childTnLst>
+                                </p:cTn>
+                              </p:par>
+                            </p:childTnLst>
+                          </p:cTn>
+                        </p:par>
+                      </p:childTnLst>
+                    </p:cTn>
+                  </p:par>
+                  <p:par>
+                    <p:cTn id="27" fill="hold">
+                      <p:stCondLst>
+                        <p:cond delay="indefinite"/>
+                      </p:stCondLst>
+                      <p:childTnLst>
+                        <p:par>
+                          <p:cTn id="28" fill="hold">
+                            <p:stCondLst>
+                              <p:cond delay="0"/>
+                            </p:stCondLst>
+                            <p:childTnLst>
+                              <p:par>
+                                <p:cTn id="29" presetID="2" presetClass="entr" presetSubtype="4" fill="hold" grpId="0" nodeType="clickEffect">
+                                  <p:stCondLst>
+                                    <p:cond delay="0"/>
+                                  </p:stCondLst>
+                                  <p:childTnLst>
+                                    <p:set>
+                                      <p:cBhvr>
+                                        <p:cTn id="30" dur="1" fill="hold">
+                                          <p:stCondLst>
+                                            <p:cond delay="0"/>
+                                          </p:stCondLst>
+                                        </p:cTn>
+                                        <p:tgtEl>
+                                          <p:spTgt spid="6147">
+                                            <p:txEl>
+                                              <p:pRg st="4" end="4"/>
+                                            </p:txEl>
+                                          </p:spTgt>
+                                        </p:tgtEl>
+                                        <p:attrNameLst>
+                                          <p:attrName>style.visibility</p:attrName>
+                                        </p:attrNameLst>
+                                      </p:cBhvr>
+                                      <p:to>
+                                        <p:strVal val="visible"/>
+                                      </p:to>
+                                    </p:set>
+                                    <p:anim calcmode="lin" valueType="num">
+                                      <p:cBhvr additive="base">
+                                        <p:cTn id="31" dur="500" fill="hold"/>
+                                        <p:tgtEl>
+                                          <p:spTgt spid="6147">
+                                            <p:txEl>
+                                              <p:pRg st="4" end="4"/>
+                                            </p:txEl>
+                                          </p:spTgt>
+                                        </p:tgtEl>
+                                        <p:attrNameLst>
+                                          <p:attrName>ppt_x</p:attrName>
+                                        </p:attrNameLst>
+                                      </p:cBhvr>
+                                      <p:tavLst>
+                                        <p:tav tm="0">
+                                          <p:val>
+                                            <p:strVal val="#ppt_x"/>
+                                          </p:val>
+                                        </p:tav>
+                                        <p:tav tm="100000">
+                                          <p:val>
+                                            <p:strVal val="#ppt_x"/>
+                                          </p:val>
+                                        </p:tav>
+                                      </p:tavLst>
+                                    </p:anim>
+                                    <p:anim calcmode="lin" valueType="num">
+                                      <p:cBhvr additive="base">
+                                        <p:cTn id="32" dur="500" fill="hold"/>
+                                        <p:tgtEl>
+                                          <p:spTgt spid="6147">
+                                            <p:txEl>
+                                              <p:pRg st="4" end="4"/>
+                                            </p:txEl>
+                                          </p:spTgt>
+                                        </p:tgtEl>
+                                        <p:attrNameLst>
+                                          <p:attrName>ppt_y</p:attrName>
+                                        </p:attrNameLst>
+                                      </p:cBhvr>
+                                      <p:tavLst>
+                                        <p:tav tm="0">
+                                          <p:val>
+                                            <p:strVal val="1+#ppt_h/2"/>
+                                          </p:val>
+                                        </p:tav>
+                                        <p:tav tm="100000">
+                                          <p:val>
+                                            <p:strVal val="#ppt_y"/>
+                                          </p:val>
+                                        </p:tav>
+                                      </p:tavLst>
+                                    </p:anim>
+                                  </p:childTnLst>
+                                </p:cTn>
+                              </p:par>
+                            </p:childTnLst>
+                          </p:cTn>
+                        </p:par>
+                      </p:childTnLst>
+                    </p:cTn>
+                  </p:par>
+                  <p:par>
+                    <p:cTn id="33" fill="hold">
+                      <p:stCondLst>
+                        <p:cond delay="indefinite"/>
+                      </p:stCondLst>
+                      <p:childTnLst>
+                        <p:par>
+                          <p:cTn id="34" fill="hold">
+                            <p:stCondLst>
+                              <p:cond delay="0"/>
+                            </p:stCondLst>
+                            <p:childTnLst>
+                              <p:par>
+                                <p:cTn id="35" presetID="2" presetClass="entr" presetSubtype="4" fill="hold" grpId="0" nodeType="clickEffect">
+                                  <p:stCondLst>
+                                    <p:cond delay="0"/>
+                                  </p:stCondLst>
+                                  <p:childTnLst>
+                                    <p:set>
+                                      <p:cBhvr>
+                                        <p:cTn id="36" dur="1" fill="hold">
+                                          <p:stCondLst>
+                                            <p:cond delay="0"/>
+                                          </p:stCondLst>
+                                        </p:cTn>
+                                        <p:tgtEl>
+                                          <p:spTgt spid="6147">
+                                            <p:txEl>
+                                              <p:pRg st="5" end="5"/>
+                                            </p:txEl>
+                                          </p:spTgt>
+                                        </p:tgtEl>
+                                        <p:attrNameLst>
+                                          <p:attrName>style.visibility</p:attrName>
+                                        </p:attrNameLst>
+                                      </p:cBhvr>
+                                      <p:to>
+                                        <p:strVal val="visible"/>
+                                      </p:to>
+                                    </p:set>
+                                    <p:anim calcmode="lin" valueType="num">
+                                      <p:cBhvr additive="base">
+                                        <p:cTn id="37" dur="500" fill="hold"/>
+                                        <p:tgtEl>
+                                          <p:spTgt spid="6147">
+                                            <p:txEl>
+                                              <p:pRg st="5" end="5"/>
+                                            </p:txEl>
+                                          </p:spTgt>
+                                        </p:tgtEl>
+                                        <p:attrNameLst>
+                                          <p:attrName>ppt_x</p:attrName>
+                                        </p:attrNameLst>
+                                      </p:cBhvr>
+                                      <p:tavLst>
+                                        <p:tav tm="0">
+                                          <p:val>
+                                            <p:strVal val="#ppt_x"/>
+                                          </p:val>
+                                        </p:tav>
+                                        <p:tav tm="100000">
+                                          <p:val>
+                                            <p:strVal val="#ppt_x"/>
+                                          </p:val>
+                                        </p:tav>
+                                      </p:tavLst>
+                                    </p:anim>
+                                    <p:anim calcmode="lin" valueType="num">
+                                      <p:cBhvr additive="base">
+                                        <p:cTn id="38" dur="500" fill="hold"/>
+                                        <p:tgtEl>
+                                          <p:spTgt spid="6147">
+                                            <p:txEl>
+                                              <p:pRg st="5" end="5"/>
+                                            </p:txEl>
+                                          </p:spTgt>
+                                        </p:tgtEl>
+                                        <p:attrNameLst>
+                                          <p:attrName>ppt_y</p:attrName>
+                                        </p:attrNameLst>
+                                      </p:cBhvr>
+                                      <p:tavLst>
+                                        <p:tav tm="0">
+                                          <p:val>
+                                            <p:strVal val="1+#ppt_h/2"/>
+                                          </p:val>
+                                        </p:tav>
+                                        <p:tav tm="100000">
+                                          <p:val>
+                                            <p:strVal val="#ppt_y"/>
+                                          </p:val>
+                                        </p:tav>
+                                      </p:tavLst>
+                                    </p:anim>
+                                  </p:childTnLst>
+                                </p:cTn>
+                              </p:par>
+                            </p:childTnLst>
+                          </p:cTn>
+                        </p:par>
+                      </p:childTnLst>
+                    </p:cTn>
+                  </p:par>
+                  <p:par>
+                    <p:cTn id="39" fill="hold">
+                      <p:stCondLst>
+                        <p:cond delay="indefinite"/>
+                      </p:stCondLst>
+                      <p:childTnLst>
+                        <p:par>
+                          <p:cTn id="40" fill="hold">
+                            <p:stCondLst>
+                              <p:cond delay="0"/>
+                            </p:stCondLst>
+                            <p:childTnLst>
+                              <p:par>
+                                <p:cTn id="41" presetID="2" presetClass="entr" presetSubtype="4" fill="hold" grpId="0" nodeType="clickEffect">
+                                  <p:stCondLst>
+                                    <p:cond delay="0"/>
+                                  </p:stCondLst>
+                                  <p:childTnLst>
+                                    <p:set>
+                                      <p:cBhvr>
+                                        <p:cTn id="42" dur="1" fill="hold">
+                                          <p:stCondLst>
+                                            <p:cond delay="0"/>
+                                          </p:stCondLst>
+                                        </p:cTn>
+                                        <p:tgtEl>
+                                          <p:spTgt spid="6147">
+                                            <p:txEl>
+                                              <p:pRg st="6" end="6"/>
+                                            </p:txEl>
+                                          </p:spTgt>
+                                        </p:tgtEl>
+                                        <p:attrNameLst>
+                                          <p:attrName>style.visibility</p:attrName>
+                                        </p:attrNameLst>
+                                      </p:cBhvr>
+                                      <p:to>
+                                        <p:strVal val="visible"/>
+                                      </p:to>
+                                    </p:set>
+                                    <p:anim calcmode="lin" valueType="num">
+                                      <p:cBhvr additive="base">
+                                        <p:cTn id="43" dur="500" fill="hold"/>
+                                        <p:tgtEl>
+                                          <p:spTgt spid="6147">
+                                            <p:txEl>
+                                              <p:pRg st="6" end="6"/>
+                                            </p:txEl>
+                                          </p:spTgt>
+                                        </p:tgtEl>
+                                        <p:attrNameLst>
+                                          <p:attrName>ppt_x</p:attrName>
+                                        </p:attrNameLst>
+                                      </p:cBhvr>
+                                      <p:tavLst>
+                                        <p:tav tm="0">
+                                          <p:val>
+                                            <p:strVal val="#ppt_x"/>
+                                          </p:val>
+                                        </p:tav>
+                                        <p:tav tm="100000">
+                                          <p:val>
+                                            <p:strVal val="#ppt_x"/>
+                                          </p:val>
+                                        </p:tav>
+                                      </p:tavLst>
+                                    </p:anim>
+                                    <p:anim calcmode="lin" valueType="num">
+                                      <p:cBhvr additive="base">
+                                        <p:cTn id="44" dur="500" fill="hold"/>
+                                        <p:tgtEl>
+                                          <p:spTgt spid="6147">
+                                            <p:txEl>
+                                              <p:pRg st="6" end="6"/>
+                                            </p:txEl>
+                                          </p:spTgt>
+                                        </p:tgtEl>
+                                        <p:attrNameLst>
+                                          <p:attrName>ppt_y</p:attrName>
+                                        </p:attrNameLst>
+                                      </p:cBhvr>
+                                      <p:tavLst>
+                                        <p:tav tm="0">
+                                          <p:val>
+                                            <p:strVal val="1+#ppt_h/2"/>
+                                          </p:val>
+                                        </p:tav>
+                                        <p:tav tm="100000">
+                                          <p:val>
+                                            <p:strVal val="#ppt_y"/>
+                                          </p:val>
+                                        </p:tav>
+                                      </p:tavLst>
+                                    </p:anim>
+                                  </p:childTnLst>
+                                </p:cTn>
+                              </p:par>
+                            </p:childTnLst>
+                          </p:cTn>
+                        </p:par>
+                      </p:childTnLst>
+                    </p:cTn>
+                  </p:par>
+                </p:childTnLst>
+              </p:cTn>
+              <p:prevCondLst>
+                <p:cond evt="onPrev" delay="0">
+                  <p:tgtEl>
+                    <p:sldTgt/>
+                  </p:tgtEl>
+                </p:cond>
+              </p:prevCondLst>
+              <p:nextCondLst>
+                <p:cond evt="onNext" delay="0">
+                  <p:tgtEl>
+                    <p:sldTgt/>
+                  </p:tgtEl>
+                </p:cond>
+              </p:nextCondLst>
+            </p:seq>
+          </p:childTnLst>
+        </p:cTn>
       </p:par>
     </p:tnLst>
+    <p:bldLst>
+      <p:bldP spid="6147" grpId="0" build="p"/>
+    </p:bldLst>
   </p:timing>
 </p:sld>
 </file>
@@ -5733,9 +6661,10 @@
           <a:lstStyle/>
           <a:p>
             <a:r>
-              <a:rPr lang="en-US"/>
-              <a:t>Training Outline</a:t>
-            </a:r>
+              <a:rPr lang="en-US" dirty="0" smtClean="0"/>
+              <a:t>Solution structure</a:t>
+            </a:r>
+            <a:endParaRPr lang="en-US" dirty="0"/>
           </a:p>
         </p:txBody>
       </p:sp>
@@ -5756,46 +6685,123 @@
           </a:xfrm>
         </p:spPr>
         <p:txBody>
-          <a:bodyPr/>
+          <a:bodyPr>
+            <a:normAutofit fontScale="70000" lnSpcReduction="20000"/>
+          </a:bodyPr>
           <a:lstStyle/>
           <a:p>
             <a:r>
-              <a:rPr lang="en-US"/>
-              <a:t>Lesson 1: Name</a:t>
-            </a:r>
-          </a:p>
-          <a:p>
-            <a:pPr lvl="1"/>
-            <a:r>
-              <a:rPr lang="en-US"/>
-              <a:t>Provide brief description, if desired.</a:t>
-            </a:r>
-          </a:p>
-          <a:p>
-            <a:r>
-              <a:rPr lang="en-US"/>
-              <a:t>Lesson 2: Name</a:t>
-            </a:r>
-          </a:p>
-          <a:p>
-            <a:pPr lvl="1"/>
-            <a:r>
-              <a:rPr lang="en-US"/>
-              <a:t>Provide brief description, if desired.</a:t>
-            </a:r>
-          </a:p>
-          <a:p>
-            <a:r>
-              <a:rPr lang="en-US"/>
-              <a:t>Lesson 3: Name</a:t>
-            </a:r>
-          </a:p>
-          <a:p>
-            <a:pPr lvl="1"/>
-            <a:r>
-              <a:rPr lang="en-US"/>
-              <a:t>Provide brief description, if desired.</a:t>
-            </a:r>
+              <a:rPr lang="en-US" dirty="0" smtClean="0"/>
+              <a:t>Always start with blank solution</a:t>
+            </a:r>
+          </a:p>
+          <a:p>
+            <a:r>
+              <a:rPr lang="en-US" dirty="0" smtClean="0"/>
+              <a:t>Enable </a:t>
+            </a:r>
+            <a:r>
+              <a:rPr lang="en-US" dirty="0" err="1" smtClean="0"/>
+              <a:t>nuget</a:t>
+            </a:r>
+            <a:r>
+              <a:rPr lang="en-US" dirty="0" smtClean="0"/>
+              <a:t> package restore on the solution.</a:t>
+            </a:r>
+          </a:p>
+          <a:p>
+            <a:r>
+              <a:rPr lang="en-US" dirty="0" smtClean="0"/>
+              <a:t>Packages folder should be never committed to source code repository.</a:t>
+            </a:r>
+          </a:p>
+          <a:p>
+            <a:r>
+              <a:rPr lang="en-US" dirty="0" smtClean="0"/>
+              <a:t>All files of </a:t>
+            </a:r>
+            <a:r>
+              <a:rPr lang="en-US" dirty="0" err="1" smtClean="0"/>
+              <a:t>nuget</a:t>
+            </a:r>
+            <a:r>
+              <a:rPr lang="en-US" dirty="0" smtClean="0"/>
+              <a:t> should be committed in the repository.</a:t>
+            </a:r>
+          </a:p>
+          <a:p>
+            <a:r>
+              <a:rPr lang="en-US" dirty="0" smtClean="0"/>
+              <a:t>All the projects in the solution should be under </a:t>
+            </a:r>
+            <a:r>
+              <a:rPr lang="en-US" dirty="0" err="1" smtClean="0"/>
+              <a:t>src</a:t>
+            </a:r>
+            <a:r>
+              <a:rPr lang="en-US" dirty="0" smtClean="0"/>
+              <a:t> folder.</a:t>
+            </a:r>
+          </a:p>
+          <a:p>
+            <a:r>
+              <a:rPr lang="en-US" dirty="0" smtClean="0"/>
+              <a:t>Use proper conventions in naming the projects file.</a:t>
+            </a:r>
+            <a:endParaRPr lang="en-US" dirty="0" smtClean="0"/>
+          </a:p>
+          <a:p>
+            <a:r>
+              <a:rPr lang="en-US" dirty="0" smtClean="0"/>
+              <a:t>The .</a:t>
+            </a:r>
+            <a:r>
+              <a:rPr lang="en-US" dirty="0" err="1" smtClean="0"/>
+              <a:t>sln</a:t>
+            </a:r>
+            <a:r>
+              <a:rPr lang="en-US" dirty="0" smtClean="0"/>
+              <a:t> file should be outside of </a:t>
+            </a:r>
+            <a:r>
+              <a:rPr lang="en-US" dirty="0" err="1" smtClean="0"/>
+              <a:t>src</a:t>
+            </a:r>
+            <a:r>
+              <a:rPr lang="en-US" dirty="0" smtClean="0"/>
+              <a:t> directory</a:t>
+            </a:r>
+          </a:p>
+          <a:p>
+            <a:r>
+              <a:rPr lang="en-US" dirty="0" smtClean="0"/>
+              <a:t>All common files related to the projects must be kept in the </a:t>
+            </a:r>
+            <a:r>
+              <a:rPr lang="en-US" dirty="0" err="1" smtClean="0"/>
+              <a:t>solutionItems</a:t>
+            </a:r>
+            <a:r>
+              <a:rPr lang="en-US" dirty="0" smtClean="0"/>
+              <a:t> folder.</a:t>
+            </a:r>
+          </a:p>
+          <a:p>
+            <a:r>
+              <a:rPr lang="en-US" dirty="0" smtClean="0"/>
+              <a:t>Use file linking feature for common files.</a:t>
+            </a:r>
+            <a:endParaRPr lang="en-US" dirty="0" smtClean="0"/>
+          </a:p>
+          <a:p>
+            <a:r>
+              <a:rPr lang="en-US" dirty="0" smtClean="0"/>
+              <a:t>Use solution folder in solution explorer to segregate your layers.</a:t>
+            </a:r>
+            <a:endParaRPr lang="en-US" dirty="0"/>
+          </a:p>
+          <a:p>
+            <a:endParaRPr lang="en-US" dirty="0"/>
           </a:p>
         </p:txBody>
       </p:sp>
@@ -5807,9 +6813,1065 @@
   <p:timing>
     <p:tnLst>
       <p:par>
-        <p:cTn id="1" dur="indefinite" restart="never" nodeType="tmRoot"/>
+        <p:cTn id="1" dur="indefinite" restart="never" nodeType="tmRoot">
+          <p:childTnLst>
+            <p:seq concurrent="1" nextAc="seek">
+              <p:cTn id="2" dur="indefinite" nodeType="mainSeq">
+                <p:childTnLst>
+                  <p:par>
+                    <p:cTn id="3" fill="hold">
+                      <p:stCondLst>
+                        <p:cond delay="indefinite"/>
+                      </p:stCondLst>
+                      <p:childTnLst>
+                        <p:par>
+                          <p:cTn id="4" fill="hold">
+                            <p:stCondLst>
+                              <p:cond delay="0"/>
+                            </p:stCondLst>
+                            <p:childTnLst>
+                              <p:par>
+                                <p:cTn id="5" presetID="2" presetClass="entr" presetSubtype="4" fill="hold" grpId="0" nodeType="clickEffect">
+                                  <p:stCondLst>
+                                    <p:cond delay="0"/>
+                                  </p:stCondLst>
+                                  <p:childTnLst>
+                                    <p:set>
+                                      <p:cBhvr>
+                                        <p:cTn id="6" dur="1" fill="hold">
+                                          <p:stCondLst>
+                                            <p:cond delay="0"/>
+                                          </p:stCondLst>
+                                        </p:cTn>
+                                        <p:tgtEl>
+                                          <p:spTgt spid="30723">
+                                            <p:txEl>
+                                              <p:pRg st="0" end="0"/>
+                                            </p:txEl>
+                                          </p:spTgt>
+                                        </p:tgtEl>
+                                        <p:attrNameLst>
+                                          <p:attrName>style.visibility</p:attrName>
+                                        </p:attrNameLst>
+                                      </p:cBhvr>
+                                      <p:to>
+                                        <p:strVal val="visible"/>
+                                      </p:to>
+                                    </p:set>
+                                    <p:anim calcmode="lin" valueType="num">
+                                      <p:cBhvr additive="base">
+                                        <p:cTn id="7" dur="500" fill="hold"/>
+                                        <p:tgtEl>
+                                          <p:spTgt spid="30723">
+                                            <p:txEl>
+                                              <p:pRg st="0" end="0"/>
+                                            </p:txEl>
+                                          </p:spTgt>
+                                        </p:tgtEl>
+                                        <p:attrNameLst>
+                                          <p:attrName>ppt_x</p:attrName>
+                                        </p:attrNameLst>
+                                      </p:cBhvr>
+                                      <p:tavLst>
+                                        <p:tav tm="0">
+                                          <p:val>
+                                            <p:strVal val="#ppt_x"/>
+                                          </p:val>
+                                        </p:tav>
+                                        <p:tav tm="100000">
+                                          <p:val>
+                                            <p:strVal val="#ppt_x"/>
+                                          </p:val>
+                                        </p:tav>
+                                      </p:tavLst>
+                                    </p:anim>
+                                    <p:anim calcmode="lin" valueType="num">
+                                      <p:cBhvr additive="base">
+                                        <p:cTn id="8" dur="500" fill="hold"/>
+                                        <p:tgtEl>
+                                          <p:spTgt spid="30723">
+                                            <p:txEl>
+                                              <p:pRg st="0" end="0"/>
+                                            </p:txEl>
+                                          </p:spTgt>
+                                        </p:tgtEl>
+                                        <p:attrNameLst>
+                                          <p:attrName>ppt_y</p:attrName>
+                                        </p:attrNameLst>
+                                      </p:cBhvr>
+                                      <p:tavLst>
+                                        <p:tav tm="0">
+                                          <p:val>
+                                            <p:strVal val="1+#ppt_h/2"/>
+                                          </p:val>
+                                        </p:tav>
+                                        <p:tav tm="100000">
+                                          <p:val>
+                                            <p:strVal val="#ppt_y"/>
+                                          </p:val>
+                                        </p:tav>
+                                      </p:tavLst>
+                                    </p:anim>
+                                  </p:childTnLst>
+                                </p:cTn>
+                              </p:par>
+                            </p:childTnLst>
+                          </p:cTn>
+                        </p:par>
+                      </p:childTnLst>
+                    </p:cTn>
+                  </p:par>
+                  <p:par>
+                    <p:cTn id="9" fill="hold">
+                      <p:stCondLst>
+                        <p:cond delay="indefinite"/>
+                      </p:stCondLst>
+                      <p:childTnLst>
+                        <p:par>
+                          <p:cTn id="10" fill="hold">
+                            <p:stCondLst>
+                              <p:cond delay="0"/>
+                            </p:stCondLst>
+                            <p:childTnLst>
+                              <p:par>
+                                <p:cTn id="11" presetID="2" presetClass="entr" presetSubtype="4" fill="hold" grpId="0" nodeType="clickEffect">
+                                  <p:stCondLst>
+                                    <p:cond delay="0"/>
+                                  </p:stCondLst>
+                                  <p:childTnLst>
+                                    <p:set>
+                                      <p:cBhvr>
+                                        <p:cTn id="12" dur="1" fill="hold">
+                                          <p:stCondLst>
+                                            <p:cond delay="0"/>
+                                          </p:stCondLst>
+                                        </p:cTn>
+                                        <p:tgtEl>
+                                          <p:spTgt spid="30723">
+                                            <p:txEl>
+                                              <p:pRg st="1" end="1"/>
+                                            </p:txEl>
+                                          </p:spTgt>
+                                        </p:tgtEl>
+                                        <p:attrNameLst>
+                                          <p:attrName>style.visibility</p:attrName>
+                                        </p:attrNameLst>
+                                      </p:cBhvr>
+                                      <p:to>
+                                        <p:strVal val="visible"/>
+                                      </p:to>
+                                    </p:set>
+                                    <p:anim calcmode="lin" valueType="num">
+                                      <p:cBhvr additive="base">
+                                        <p:cTn id="13" dur="500" fill="hold"/>
+                                        <p:tgtEl>
+                                          <p:spTgt spid="30723">
+                                            <p:txEl>
+                                              <p:pRg st="1" end="1"/>
+                                            </p:txEl>
+                                          </p:spTgt>
+                                        </p:tgtEl>
+                                        <p:attrNameLst>
+                                          <p:attrName>ppt_x</p:attrName>
+                                        </p:attrNameLst>
+                                      </p:cBhvr>
+                                      <p:tavLst>
+                                        <p:tav tm="0">
+                                          <p:val>
+                                            <p:strVal val="#ppt_x"/>
+                                          </p:val>
+                                        </p:tav>
+                                        <p:tav tm="100000">
+                                          <p:val>
+                                            <p:strVal val="#ppt_x"/>
+                                          </p:val>
+                                        </p:tav>
+                                      </p:tavLst>
+                                    </p:anim>
+                                    <p:anim calcmode="lin" valueType="num">
+                                      <p:cBhvr additive="base">
+                                        <p:cTn id="14" dur="500" fill="hold"/>
+                                        <p:tgtEl>
+                                          <p:spTgt spid="30723">
+                                            <p:txEl>
+                                              <p:pRg st="1" end="1"/>
+                                            </p:txEl>
+                                          </p:spTgt>
+                                        </p:tgtEl>
+                                        <p:attrNameLst>
+                                          <p:attrName>ppt_y</p:attrName>
+                                        </p:attrNameLst>
+                                      </p:cBhvr>
+                                      <p:tavLst>
+                                        <p:tav tm="0">
+                                          <p:val>
+                                            <p:strVal val="1+#ppt_h/2"/>
+                                          </p:val>
+                                        </p:tav>
+                                        <p:tav tm="100000">
+                                          <p:val>
+                                            <p:strVal val="#ppt_y"/>
+                                          </p:val>
+                                        </p:tav>
+                                      </p:tavLst>
+                                    </p:anim>
+                                  </p:childTnLst>
+                                </p:cTn>
+                              </p:par>
+                            </p:childTnLst>
+                          </p:cTn>
+                        </p:par>
+                      </p:childTnLst>
+                    </p:cTn>
+                  </p:par>
+                  <p:par>
+                    <p:cTn id="15" fill="hold">
+                      <p:stCondLst>
+                        <p:cond delay="indefinite"/>
+                      </p:stCondLst>
+                      <p:childTnLst>
+                        <p:par>
+                          <p:cTn id="16" fill="hold">
+                            <p:stCondLst>
+                              <p:cond delay="0"/>
+                            </p:stCondLst>
+                            <p:childTnLst>
+                              <p:par>
+                                <p:cTn id="17" presetID="2" presetClass="entr" presetSubtype="4" fill="hold" grpId="0" nodeType="clickEffect">
+                                  <p:stCondLst>
+                                    <p:cond delay="0"/>
+                                  </p:stCondLst>
+                                  <p:childTnLst>
+                                    <p:set>
+                                      <p:cBhvr>
+                                        <p:cTn id="18" dur="1" fill="hold">
+                                          <p:stCondLst>
+                                            <p:cond delay="0"/>
+                                          </p:stCondLst>
+                                        </p:cTn>
+                                        <p:tgtEl>
+                                          <p:spTgt spid="30723">
+                                            <p:txEl>
+                                              <p:pRg st="2" end="2"/>
+                                            </p:txEl>
+                                          </p:spTgt>
+                                        </p:tgtEl>
+                                        <p:attrNameLst>
+                                          <p:attrName>style.visibility</p:attrName>
+                                        </p:attrNameLst>
+                                      </p:cBhvr>
+                                      <p:to>
+                                        <p:strVal val="visible"/>
+                                      </p:to>
+                                    </p:set>
+                                    <p:anim calcmode="lin" valueType="num">
+                                      <p:cBhvr additive="base">
+                                        <p:cTn id="19" dur="500" fill="hold"/>
+                                        <p:tgtEl>
+                                          <p:spTgt spid="30723">
+                                            <p:txEl>
+                                              <p:pRg st="2" end="2"/>
+                                            </p:txEl>
+                                          </p:spTgt>
+                                        </p:tgtEl>
+                                        <p:attrNameLst>
+                                          <p:attrName>ppt_x</p:attrName>
+                                        </p:attrNameLst>
+                                      </p:cBhvr>
+                                      <p:tavLst>
+                                        <p:tav tm="0">
+                                          <p:val>
+                                            <p:strVal val="#ppt_x"/>
+                                          </p:val>
+                                        </p:tav>
+                                        <p:tav tm="100000">
+                                          <p:val>
+                                            <p:strVal val="#ppt_x"/>
+                                          </p:val>
+                                        </p:tav>
+                                      </p:tavLst>
+                                    </p:anim>
+                                    <p:anim calcmode="lin" valueType="num">
+                                      <p:cBhvr additive="base">
+                                        <p:cTn id="20" dur="500" fill="hold"/>
+                                        <p:tgtEl>
+                                          <p:spTgt spid="30723">
+                                            <p:txEl>
+                                              <p:pRg st="2" end="2"/>
+                                            </p:txEl>
+                                          </p:spTgt>
+                                        </p:tgtEl>
+                                        <p:attrNameLst>
+                                          <p:attrName>ppt_y</p:attrName>
+                                        </p:attrNameLst>
+                                      </p:cBhvr>
+                                      <p:tavLst>
+                                        <p:tav tm="0">
+                                          <p:val>
+                                            <p:strVal val="1+#ppt_h/2"/>
+                                          </p:val>
+                                        </p:tav>
+                                        <p:tav tm="100000">
+                                          <p:val>
+                                            <p:strVal val="#ppt_y"/>
+                                          </p:val>
+                                        </p:tav>
+                                      </p:tavLst>
+                                    </p:anim>
+                                  </p:childTnLst>
+                                </p:cTn>
+                              </p:par>
+                            </p:childTnLst>
+                          </p:cTn>
+                        </p:par>
+                      </p:childTnLst>
+                    </p:cTn>
+                  </p:par>
+                  <p:par>
+                    <p:cTn id="21" fill="hold">
+                      <p:stCondLst>
+                        <p:cond delay="indefinite"/>
+                      </p:stCondLst>
+                      <p:childTnLst>
+                        <p:par>
+                          <p:cTn id="22" fill="hold">
+                            <p:stCondLst>
+                              <p:cond delay="0"/>
+                            </p:stCondLst>
+                            <p:childTnLst>
+                              <p:par>
+                                <p:cTn id="23" presetID="2" presetClass="entr" presetSubtype="4" fill="hold" grpId="0" nodeType="clickEffect">
+                                  <p:stCondLst>
+                                    <p:cond delay="0"/>
+                                  </p:stCondLst>
+                                  <p:childTnLst>
+                                    <p:set>
+                                      <p:cBhvr>
+                                        <p:cTn id="24" dur="1" fill="hold">
+                                          <p:stCondLst>
+                                            <p:cond delay="0"/>
+                                          </p:stCondLst>
+                                        </p:cTn>
+                                        <p:tgtEl>
+                                          <p:spTgt spid="30723">
+                                            <p:txEl>
+                                              <p:pRg st="3" end="3"/>
+                                            </p:txEl>
+                                          </p:spTgt>
+                                        </p:tgtEl>
+                                        <p:attrNameLst>
+                                          <p:attrName>style.visibility</p:attrName>
+                                        </p:attrNameLst>
+                                      </p:cBhvr>
+                                      <p:to>
+                                        <p:strVal val="visible"/>
+                                      </p:to>
+                                    </p:set>
+                                    <p:anim calcmode="lin" valueType="num">
+                                      <p:cBhvr additive="base">
+                                        <p:cTn id="25" dur="500" fill="hold"/>
+                                        <p:tgtEl>
+                                          <p:spTgt spid="30723">
+                                            <p:txEl>
+                                              <p:pRg st="3" end="3"/>
+                                            </p:txEl>
+                                          </p:spTgt>
+                                        </p:tgtEl>
+                                        <p:attrNameLst>
+                                          <p:attrName>ppt_x</p:attrName>
+                                        </p:attrNameLst>
+                                      </p:cBhvr>
+                                      <p:tavLst>
+                                        <p:tav tm="0">
+                                          <p:val>
+                                            <p:strVal val="#ppt_x"/>
+                                          </p:val>
+                                        </p:tav>
+                                        <p:tav tm="100000">
+                                          <p:val>
+                                            <p:strVal val="#ppt_x"/>
+                                          </p:val>
+                                        </p:tav>
+                                      </p:tavLst>
+                                    </p:anim>
+                                    <p:anim calcmode="lin" valueType="num">
+                                      <p:cBhvr additive="base">
+                                        <p:cTn id="26" dur="500" fill="hold"/>
+                                        <p:tgtEl>
+                                          <p:spTgt spid="30723">
+                                            <p:txEl>
+                                              <p:pRg st="3" end="3"/>
+                                            </p:txEl>
+                                          </p:spTgt>
+                                        </p:tgtEl>
+                                        <p:attrNameLst>
+                                          <p:attrName>ppt_y</p:attrName>
+                                        </p:attrNameLst>
+                                      </p:cBhvr>
+                                      <p:tavLst>
+                                        <p:tav tm="0">
+                                          <p:val>
+                                            <p:strVal val="1+#ppt_h/2"/>
+                                          </p:val>
+                                        </p:tav>
+                                        <p:tav tm="100000">
+                                          <p:val>
+                                            <p:strVal val="#ppt_y"/>
+                                          </p:val>
+                                        </p:tav>
+                                      </p:tavLst>
+                                    </p:anim>
+                                  </p:childTnLst>
+                                </p:cTn>
+                              </p:par>
+                            </p:childTnLst>
+                          </p:cTn>
+                        </p:par>
+                      </p:childTnLst>
+                    </p:cTn>
+                  </p:par>
+                  <p:par>
+                    <p:cTn id="27" fill="hold">
+                      <p:stCondLst>
+                        <p:cond delay="indefinite"/>
+                      </p:stCondLst>
+                      <p:childTnLst>
+                        <p:par>
+                          <p:cTn id="28" fill="hold">
+                            <p:stCondLst>
+                              <p:cond delay="0"/>
+                            </p:stCondLst>
+                            <p:childTnLst>
+                              <p:par>
+                                <p:cTn id="29" presetID="2" presetClass="entr" presetSubtype="4" fill="hold" grpId="0" nodeType="clickEffect">
+                                  <p:stCondLst>
+                                    <p:cond delay="0"/>
+                                  </p:stCondLst>
+                                  <p:childTnLst>
+                                    <p:set>
+                                      <p:cBhvr>
+                                        <p:cTn id="30" dur="1" fill="hold">
+                                          <p:stCondLst>
+                                            <p:cond delay="0"/>
+                                          </p:stCondLst>
+                                        </p:cTn>
+                                        <p:tgtEl>
+                                          <p:spTgt spid="30723">
+                                            <p:txEl>
+                                              <p:pRg st="4" end="4"/>
+                                            </p:txEl>
+                                          </p:spTgt>
+                                        </p:tgtEl>
+                                        <p:attrNameLst>
+                                          <p:attrName>style.visibility</p:attrName>
+                                        </p:attrNameLst>
+                                      </p:cBhvr>
+                                      <p:to>
+                                        <p:strVal val="visible"/>
+                                      </p:to>
+                                    </p:set>
+                                    <p:anim calcmode="lin" valueType="num">
+                                      <p:cBhvr additive="base">
+                                        <p:cTn id="31" dur="500" fill="hold"/>
+                                        <p:tgtEl>
+                                          <p:spTgt spid="30723">
+                                            <p:txEl>
+                                              <p:pRg st="4" end="4"/>
+                                            </p:txEl>
+                                          </p:spTgt>
+                                        </p:tgtEl>
+                                        <p:attrNameLst>
+                                          <p:attrName>ppt_x</p:attrName>
+                                        </p:attrNameLst>
+                                      </p:cBhvr>
+                                      <p:tavLst>
+                                        <p:tav tm="0">
+                                          <p:val>
+                                            <p:strVal val="#ppt_x"/>
+                                          </p:val>
+                                        </p:tav>
+                                        <p:tav tm="100000">
+                                          <p:val>
+                                            <p:strVal val="#ppt_x"/>
+                                          </p:val>
+                                        </p:tav>
+                                      </p:tavLst>
+                                    </p:anim>
+                                    <p:anim calcmode="lin" valueType="num">
+                                      <p:cBhvr additive="base">
+                                        <p:cTn id="32" dur="500" fill="hold"/>
+                                        <p:tgtEl>
+                                          <p:spTgt spid="30723">
+                                            <p:txEl>
+                                              <p:pRg st="4" end="4"/>
+                                            </p:txEl>
+                                          </p:spTgt>
+                                        </p:tgtEl>
+                                        <p:attrNameLst>
+                                          <p:attrName>ppt_y</p:attrName>
+                                        </p:attrNameLst>
+                                      </p:cBhvr>
+                                      <p:tavLst>
+                                        <p:tav tm="0">
+                                          <p:val>
+                                            <p:strVal val="1+#ppt_h/2"/>
+                                          </p:val>
+                                        </p:tav>
+                                        <p:tav tm="100000">
+                                          <p:val>
+                                            <p:strVal val="#ppt_y"/>
+                                          </p:val>
+                                        </p:tav>
+                                      </p:tavLst>
+                                    </p:anim>
+                                  </p:childTnLst>
+                                </p:cTn>
+                              </p:par>
+                            </p:childTnLst>
+                          </p:cTn>
+                        </p:par>
+                      </p:childTnLst>
+                    </p:cTn>
+                  </p:par>
+                  <p:par>
+                    <p:cTn id="33" fill="hold">
+                      <p:stCondLst>
+                        <p:cond delay="indefinite"/>
+                      </p:stCondLst>
+                      <p:childTnLst>
+                        <p:par>
+                          <p:cTn id="34" fill="hold">
+                            <p:stCondLst>
+                              <p:cond delay="0"/>
+                            </p:stCondLst>
+                            <p:childTnLst>
+                              <p:par>
+                                <p:cTn id="35" presetID="2" presetClass="entr" presetSubtype="4" fill="hold" grpId="0" nodeType="clickEffect">
+                                  <p:stCondLst>
+                                    <p:cond delay="0"/>
+                                  </p:stCondLst>
+                                  <p:childTnLst>
+                                    <p:set>
+                                      <p:cBhvr>
+                                        <p:cTn id="36" dur="1" fill="hold">
+                                          <p:stCondLst>
+                                            <p:cond delay="0"/>
+                                          </p:stCondLst>
+                                        </p:cTn>
+                                        <p:tgtEl>
+                                          <p:spTgt spid="30723">
+                                            <p:txEl>
+                                              <p:pRg st="5" end="5"/>
+                                            </p:txEl>
+                                          </p:spTgt>
+                                        </p:tgtEl>
+                                        <p:attrNameLst>
+                                          <p:attrName>style.visibility</p:attrName>
+                                        </p:attrNameLst>
+                                      </p:cBhvr>
+                                      <p:to>
+                                        <p:strVal val="visible"/>
+                                      </p:to>
+                                    </p:set>
+                                    <p:anim calcmode="lin" valueType="num">
+                                      <p:cBhvr additive="base">
+                                        <p:cTn id="37" dur="500" fill="hold"/>
+                                        <p:tgtEl>
+                                          <p:spTgt spid="30723">
+                                            <p:txEl>
+                                              <p:pRg st="5" end="5"/>
+                                            </p:txEl>
+                                          </p:spTgt>
+                                        </p:tgtEl>
+                                        <p:attrNameLst>
+                                          <p:attrName>ppt_x</p:attrName>
+                                        </p:attrNameLst>
+                                      </p:cBhvr>
+                                      <p:tavLst>
+                                        <p:tav tm="0">
+                                          <p:val>
+                                            <p:strVal val="#ppt_x"/>
+                                          </p:val>
+                                        </p:tav>
+                                        <p:tav tm="100000">
+                                          <p:val>
+                                            <p:strVal val="#ppt_x"/>
+                                          </p:val>
+                                        </p:tav>
+                                      </p:tavLst>
+                                    </p:anim>
+                                    <p:anim calcmode="lin" valueType="num">
+                                      <p:cBhvr additive="base">
+                                        <p:cTn id="38" dur="500" fill="hold"/>
+                                        <p:tgtEl>
+                                          <p:spTgt spid="30723">
+                                            <p:txEl>
+                                              <p:pRg st="5" end="5"/>
+                                            </p:txEl>
+                                          </p:spTgt>
+                                        </p:tgtEl>
+                                        <p:attrNameLst>
+                                          <p:attrName>ppt_y</p:attrName>
+                                        </p:attrNameLst>
+                                      </p:cBhvr>
+                                      <p:tavLst>
+                                        <p:tav tm="0">
+                                          <p:val>
+                                            <p:strVal val="1+#ppt_h/2"/>
+                                          </p:val>
+                                        </p:tav>
+                                        <p:tav tm="100000">
+                                          <p:val>
+                                            <p:strVal val="#ppt_y"/>
+                                          </p:val>
+                                        </p:tav>
+                                      </p:tavLst>
+                                    </p:anim>
+                                  </p:childTnLst>
+                                </p:cTn>
+                              </p:par>
+                            </p:childTnLst>
+                          </p:cTn>
+                        </p:par>
+                      </p:childTnLst>
+                    </p:cTn>
+                  </p:par>
+                  <p:par>
+                    <p:cTn id="39" fill="hold">
+                      <p:stCondLst>
+                        <p:cond delay="indefinite"/>
+                      </p:stCondLst>
+                      <p:childTnLst>
+                        <p:par>
+                          <p:cTn id="40" fill="hold">
+                            <p:stCondLst>
+                              <p:cond delay="0"/>
+                            </p:stCondLst>
+                            <p:childTnLst>
+                              <p:par>
+                                <p:cTn id="41" presetID="2" presetClass="entr" presetSubtype="4" fill="hold" grpId="0" nodeType="clickEffect">
+                                  <p:stCondLst>
+                                    <p:cond delay="0"/>
+                                  </p:stCondLst>
+                                  <p:childTnLst>
+                                    <p:set>
+                                      <p:cBhvr>
+                                        <p:cTn id="42" dur="1" fill="hold">
+                                          <p:stCondLst>
+                                            <p:cond delay="0"/>
+                                          </p:stCondLst>
+                                        </p:cTn>
+                                        <p:tgtEl>
+                                          <p:spTgt spid="30723">
+                                            <p:txEl>
+                                              <p:pRg st="6" end="6"/>
+                                            </p:txEl>
+                                          </p:spTgt>
+                                        </p:tgtEl>
+                                        <p:attrNameLst>
+                                          <p:attrName>style.visibility</p:attrName>
+                                        </p:attrNameLst>
+                                      </p:cBhvr>
+                                      <p:to>
+                                        <p:strVal val="visible"/>
+                                      </p:to>
+                                    </p:set>
+                                    <p:anim calcmode="lin" valueType="num">
+                                      <p:cBhvr additive="base">
+                                        <p:cTn id="43" dur="500" fill="hold"/>
+                                        <p:tgtEl>
+                                          <p:spTgt spid="30723">
+                                            <p:txEl>
+                                              <p:pRg st="6" end="6"/>
+                                            </p:txEl>
+                                          </p:spTgt>
+                                        </p:tgtEl>
+                                        <p:attrNameLst>
+                                          <p:attrName>ppt_x</p:attrName>
+                                        </p:attrNameLst>
+                                      </p:cBhvr>
+                                      <p:tavLst>
+                                        <p:tav tm="0">
+                                          <p:val>
+                                            <p:strVal val="#ppt_x"/>
+                                          </p:val>
+                                        </p:tav>
+                                        <p:tav tm="100000">
+                                          <p:val>
+                                            <p:strVal val="#ppt_x"/>
+                                          </p:val>
+                                        </p:tav>
+                                      </p:tavLst>
+                                    </p:anim>
+                                    <p:anim calcmode="lin" valueType="num">
+                                      <p:cBhvr additive="base">
+                                        <p:cTn id="44" dur="500" fill="hold"/>
+                                        <p:tgtEl>
+                                          <p:spTgt spid="30723">
+                                            <p:txEl>
+                                              <p:pRg st="6" end="6"/>
+                                            </p:txEl>
+                                          </p:spTgt>
+                                        </p:tgtEl>
+                                        <p:attrNameLst>
+                                          <p:attrName>ppt_y</p:attrName>
+                                        </p:attrNameLst>
+                                      </p:cBhvr>
+                                      <p:tavLst>
+                                        <p:tav tm="0">
+                                          <p:val>
+                                            <p:strVal val="1+#ppt_h/2"/>
+                                          </p:val>
+                                        </p:tav>
+                                        <p:tav tm="100000">
+                                          <p:val>
+                                            <p:strVal val="#ppt_y"/>
+                                          </p:val>
+                                        </p:tav>
+                                      </p:tavLst>
+                                    </p:anim>
+                                  </p:childTnLst>
+                                </p:cTn>
+                              </p:par>
+                            </p:childTnLst>
+                          </p:cTn>
+                        </p:par>
+                      </p:childTnLst>
+                    </p:cTn>
+                  </p:par>
+                  <p:par>
+                    <p:cTn id="45" fill="hold">
+                      <p:stCondLst>
+                        <p:cond delay="indefinite"/>
+                      </p:stCondLst>
+                      <p:childTnLst>
+                        <p:par>
+                          <p:cTn id="46" fill="hold">
+                            <p:stCondLst>
+                              <p:cond delay="0"/>
+                            </p:stCondLst>
+                            <p:childTnLst>
+                              <p:par>
+                                <p:cTn id="47" presetID="2" presetClass="entr" presetSubtype="4" fill="hold" grpId="0" nodeType="clickEffect">
+                                  <p:stCondLst>
+                                    <p:cond delay="0"/>
+                                  </p:stCondLst>
+                                  <p:childTnLst>
+                                    <p:set>
+                                      <p:cBhvr>
+                                        <p:cTn id="48" dur="1" fill="hold">
+                                          <p:stCondLst>
+                                            <p:cond delay="0"/>
+                                          </p:stCondLst>
+                                        </p:cTn>
+                                        <p:tgtEl>
+                                          <p:spTgt spid="30723">
+                                            <p:txEl>
+                                              <p:pRg st="7" end="7"/>
+                                            </p:txEl>
+                                          </p:spTgt>
+                                        </p:tgtEl>
+                                        <p:attrNameLst>
+                                          <p:attrName>style.visibility</p:attrName>
+                                        </p:attrNameLst>
+                                      </p:cBhvr>
+                                      <p:to>
+                                        <p:strVal val="visible"/>
+                                      </p:to>
+                                    </p:set>
+                                    <p:anim calcmode="lin" valueType="num">
+                                      <p:cBhvr additive="base">
+                                        <p:cTn id="49" dur="500" fill="hold"/>
+                                        <p:tgtEl>
+                                          <p:spTgt spid="30723">
+                                            <p:txEl>
+                                              <p:pRg st="7" end="7"/>
+                                            </p:txEl>
+                                          </p:spTgt>
+                                        </p:tgtEl>
+                                        <p:attrNameLst>
+                                          <p:attrName>ppt_x</p:attrName>
+                                        </p:attrNameLst>
+                                      </p:cBhvr>
+                                      <p:tavLst>
+                                        <p:tav tm="0">
+                                          <p:val>
+                                            <p:strVal val="#ppt_x"/>
+                                          </p:val>
+                                        </p:tav>
+                                        <p:tav tm="100000">
+                                          <p:val>
+                                            <p:strVal val="#ppt_x"/>
+                                          </p:val>
+                                        </p:tav>
+                                      </p:tavLst>
+                                    </p:anim>
+                                    <p:anim calcmode="lin" valueType="num">
+                                      <p:cBhvr additive="base">
+                                        <p:cTn id="50" dur="500" fill="hold"/>
+                                        <p:tgtEl>
+                                          <p:spTgt spid="30723">
+                                            <p:txEl>
+                                              <p:pRg st="7" end="7"/>
+                                            </p:txEl>
+                                          </p:spTgt>
+                                        </p:tgtEl>
+                                        <p:attrNameLst>
+                                          <p:attrName>ppt_y</p:attrName>
+                                        </p:attrNameLst>
+                                      </p:cBhvr>
+                                      <p:tavLst>
+                                        <p:tav tm="0">
+                                          <p:val>
+                                            <p:strVal val="1+#ppt_h/2"/>
+                                          </p:val>
+                                        </p:tav>
+                                        <p:tav tm="100000">
+                                          <p:val>
+                                            <p:strVal val="#ppt_y"/>
+                                          </p:val>
+                                        </p:tav>
+                                      </p:tavLst>
+                                    </p:anim>
+                                  </p:childTnLst>
+                                </p:cTn>
+                              </p:par>
+                            </p:childTnLst>
+                          </p:cTn>
+                        </p:par>
+                      </p:childTnLst>
+                    </p:cTn>
+                  </p:par>
+                  <p:par>
+                    <p:cTn id="51" fill="hold">
+                      <p:stCondLst>
+                        <p:cond delay="indefinite"/>
+                      </p:stCondLst>
+                      <p:childTnLst>
+                        <p:par>
+                          <p:cTn id="52" fill="hold">
+                            <p:stCondLst>
+                              <p:cond delay="0"/>
+                            </p:stCondLst>
+                            <p:childTnLst>
+                              <p:par>
+                                <p:cTn id="53" presetID="2" presetClass="entr" presetSubtype="4" fill="hold" grpId="0" nodeType="clickEffect">
+                                  <p:stCondLst>
+                                    <p:cond delay="0"/>
+                                  </p:stCondLst>
+                                  <p:childTnLst>
+                                    <p:set>
+                                      <p:cBhvr>
+                                        <p:cTn id="54" dur="1" fill="hold">
+                                          <p:stCondLst>
+                                            <p:cond delay="0"/>
+                                          </p:stCondLst>
+                                        </p:cTn>
+                                        <p:tgtEl>
+                                          <p:spTgt spid="30723">
+                                            <p:txEl>
+                                              <p:pRg st="8" end="8"/>
+                                            </p:txEl>
+                                          </p:spTgt>
+                                        </p:tgtEl>
+                                        <p:attrNameLst>
+                                          <p:attrName>style.visibility</p:attrName>
+                                        </p:attrNameLst>
+                                      </p:cBhvr>
+                                      <p:to>
+                                        <p:strVal val="visible"/>
+                                      </p:to>
+                                    </p:set>
+                                    <p:anim calcmode="lin" valueType="num">
+                                      <p:cBhvr additive="base">
+                                        <p:cTn id="55" dur="500" fill="hold"/>
+                                        <p:tgtEl>
+                                          <p:spTgt spid="30723">
+                                            <p:txEl>
+                                              <p:pRg st="8" end="8"/>
+                                            </p:txEl>
+                                          </p:spTgt>
+                                        </p:tgtEl>
+                                        <p:attrNameLst>
+                                          <p:attrName>ppt_x</p:attrName>
+                                        </p:attrNameLst>
+                                      </p:cBhvr>
+                                      <p:tavLst>
+                                        <p:tav tm="0">
+                                          <p:val>
+                                            <p:strVal val="#ppt_x"/>
+                                          </p:val>
+                                        </p:tav>
+                                        <p:tav tm="100000">
+                                          <p:val>
+                                            <p:strVal val="#ppt_x"/>
+                                          </p:val>
+                                        </p:tav>
+                                      </p:tavLst>
+                                    </p:anim>
+                                    <p:anim calcmode="lin" valueType="num">
+                                      <p:cBhvr additive="base">
+                                        <p:cTn id="56" dur="500" fill="hold"/>
+                                        <p:tgtEl>
+                                          <p:spTgt spid="30723">
+                                            <p:txEl>
+                                              <p:pRg st="8" end="8"/>
+                                            </p:txEl>
+                                          </p:spTgt>
+                                        </p:tgtEl>
+                                        <p:attrNameLst>
+                                          <p:attrName>ppt_y</p:attrName>
+                                        </p:attrNameLst>
+                                      </p:cBhvr>
+                                      <p:tavLst>
+                                        <p:tav tm="0">
+                                          <p:val>
+                                            <p:strVal val="1+#ppt_h/2"/>
+                                          </p:val>
+                                        </p:tav>
+                                        <p:tav tm="100000">
+                                          <p:val>
+                                            <p:strVal val="#ppt_y"/>
+                                          </p:val>
+                                        </p:tav>
+                                      </p:tavLst>
+                                    </p:anim>
+                                  </p:childTnLst>
+                                </p:cTn>
+                              </p:par>
+                            </p:childTnLst>
+                          </p:cTn>
+                        </p:par>
+                      </p:childTnLst>
+                    </p:cTn>
+                  </p:par>
+                  <p:par>
+                    <p:cTn id="57" fill="hold">
+                      <p:stCondLst>
+                        <p:cond delay="indefinite"/>
+                      </p:stCondLst>
+                      <p:childTnLst>
+                        <p:par>
+                          <p:cTn id="58" fill="hold">
+                            <p:stCondLst>
+                              <p:cond delay="0"/>
+                            </p:stCondLst>
+                            <p:childTnLst>
+                              <p:par>
+                                <p:cTn id="59" presetID="2" presetClass="entr" presetSubtype="4" fill="hold" grpId="0" nodeType="clickEffect">
+                                  <p:stCondLst>
+                                    <p:cond delay="0"/>
+                                  </p:stCondLst>
+                                  <p:childTnLst>
+                                    <p:set>
+                                      <p:cBhvr>
+                                        <p:cTn id="60" dur="1" fill="hold">
+                                          <p:stCondLst>
+                                            <p:cond delay="0"/>
+                                          </p:stCondLst>
+                                        </p:cTn>
+                                        <p:tgtEl>
+                                          <p:spTgt spid="30723">
+                                            <p:txEl>
+                                              <p:pRg st="9" end="9"/>
+                                            </p:txEl>
+                                          </p:spTgt>
+                                        </p:tgtEl>
+                                        <p:attrNameLst>
+                                          <p:attrName>style.visibility</p:attrName>
+                                        </p:attrNameLst>
+                                      </p:cBhvr>
+                                      <p:to>
+                                        <p:strVal val="visible"/>
+                                      </p:to>
+                                    </p:set>
+                                    <p:anim calcmode="lin" valueType="num">
+                                      <p:cBhvr additive="base">
+                                        <p:cTn id="61" dur="500" fill="hold"/>
+                                        <p:tgtEl>
+                                          <p:spTgt spid="30723">
+                                            <p:txEl>
+                                              <p:pRg st="9" end="9"/>
+                                            </p:txEl>
+                                          </p:spTgt>
+                                        </p:tgtEl>
+                                        <p:attrNameLst>
+                                          <p:attrName>ppt_x</p:attrName>
+                                        </p:attrNameLst>
+                                      </p:cBhvr>
+                                      <p:tavLst>
+                                        <p:tav tm="0">
+                                          <p:val>
+                                            <p:strVal val="#ppt_x"/>
+                                          </p:val>
+                                        </p:tav>
+                                        <p:tav tm="100000">
+                                          <p:val>
+                                            <p:strVal val="#ppt_x"/>
+                                          </p:val>
+                                        </p:tav>
+                                      </p:tavLst>
+                                    </p:anim>
+                                    <p:anim calcmode="lin" valueType="num">
+                                      <p:cBhvr additive="base">
+                                        <p:cTn id="62" dur="500" fill="hold"/>
+                                        <p:tgtEl>
+                                          <p:spTgt spid="30723">
+                                            <p:txEl>
+                                              <p:pRg st="9" end="9"/>
+                                            </p:txEl>
+                                          </p:spTgt>
+                                        </p:tgtEl>
+                                        <p:attrNameLst>
+                                          <p:attrName>ppt_y</p:attrName>
+                                        </p:attrNameLst>
+                                      </p:cBhvr>
+                                      <p:tavLst>
+                                        <p:tav tm="0">
+                                          <p:val>
+                                            <p:strVal val="1+#ppt_h/2"/>
+                                          </p:val>
+                                        </p:tav>
+                                        <p:tav tm="100000">
+                                          <p:val>
+                                            <p:strVal val="#ppt_y"/>
+                                          </p:val>
+                                        </p:tav>
+                                      </p:tavLst>
+                                    </p:anim>
+                                  </p:childTnLst>
+                                </p:cTn>
+                              </p:par>
+                            </p:childTnLst>
+                          </p:cTn>
+                        </p:par>
+                      </p:childTnLst>
+                    </p:cTn>
+                  </p:par>
+                </p:childTnLst>
+              </p:cTn>
+              <p:prevCondLst>
+                <p:cond evt="onPrev" delay="0">
+                  <p:tgtEl>
+                    <p:sldTgt/>
+                  </p:tgtEl>
+                </p:cond>
+              </p:prevCondLst>
+              <p:nextCondLst>
+                <p:cond evt="onNext" delay="0">
+                  <p:tgtEl>
+                    <p:sldTgt/>
+                  </p:tgtEl>
+                </p:cond>
+              </p:nextCondLst>
+            </p:seq>
+          </p:childTnLst>
+        </p:cTn>
       </p:par>
     </p:tnLst>
+    <p:bldLst>
+      <p:bldP spid="30723" grpId="0" build="p"/>
+    </p:bldLst>
   </p:timing>
 </p:sld>
 </file>
@@ -5847,9 +7909,14 @@
           <a:lstStyle/>
           <a:p>
             <a:r>
-              <a:rPr lang="en-US"/>
-              <a:t>Lesson 1: Objectives</a:t>
-            </a:r>
+              <a:rPr lang="en-US" dirty="0" smtClean="0"/>
+              <a:t>Code Analysis and </a:t>
+            </a:r>
+            <a:r>
+              <a:rPr lang="en-US" dirty="0" err="1" smtClean="0"/>
+              <a:t>Stylecop</a:t>
+            </a:r>
+            <a:endParaRPr lang="en-US" dirty="0"/>
           </a:p>
         </p:txBody>
       </p:sp>
@@ -5865,25 +7932,106 @@
         </p:nvSpPr>
         <p:spPr/>
         <p:txBody>
-          <a:bodyPr/>
+          <a:bodyPr>
+            <a:normAutofit fontScale="62500" lnSpcReduction="20000"/>
+          </a:bodyPr>
           <a:lstStyle/>
           <a:p>
             <a:r>
-              <a:rPr lang="en-US"/>
-              <a:t>List the intended outcomes for this training session.</a:t>
-            </a:r>
-          </a:p>
-          <a:p>
-            <a:r>
-              <a:rPr lang="en-US"/>
-              <a:t>Each objective should be concise, should contain a verb, and should have a measurable result.</a:t>
-            </a:r>
-          </a:p>
-          <a:p>
-            <a:r>
-              <a:rPr lang="en-US"/>
-              <a:t>Tip: Click and scroll in the notes pane below to see examples, or to add your own speaker notes.</a:t>
-            </a:r>
+              <a:rPr lang="en-US" dirty="0"/>
+              <a:t> Code Analysis feature of Visual Studio performs static code analysis on code to help developers identify potential design, globalization, interoperability, performance, security, and a lot of other categories of potential problems.</a:t>
+            </a:r>
+            <a:endParaRPr lang="en-US" dirty="0"/>
+          </a:p>
+          <a:p>
+            <a:r>
+              <a:rPr lang="en-US" dirty="0" smtClean="0"/>
+              <a:t>These rules </a:t>
+            </a:r>
+            <a:r>
+              <a:rPr lang="en-US" dirty="0"/>
+              <a:t>that mainly targets best practices in </a:t>
+            </a:r>
+            <a:r>
+              <a:rPr lang="en-US" dirty="0" smtClean="0"/>
+              <a:t>writing code.</a:t>
+            </a:r>
+          </a:p>
+          <a:p>
+            <a:r>
+              <a:rPr lang="en-US" dirty="0" smtClean="0"/>
+              <a:t>A custom </a:t>
+            </a:r>
+            <a:r>
+              <a:rPr lang="en-US" dirty="0" err="1" smtClean="0"/>
+              <a:t>ruleset</a:t>
+            </a:r>
+            <a:r>
+              <a:rPr lang="en-US" dirty="0" smtClean="0"/>
+              <a:t> file must be added in the </a:t>
+            </a:r>
+            <a:r>
+              <a:rPr lang="en-US" dirty="0" err="1" smtClean="0"/>
+              <a:t>solutionItems</a:t>
+            </a:r>
+            <a:r>
+              <a:rPr lang="en-US" dirty="0" smtClean="0"/>
+              <a:t> folder and all projects must follow it. The UI project should follow Recommended </a:t>
+            </a:r>
+            <a:r>
+              <a:rPr lang="en-US" dirty="0" err="1" smtClean="0"/>
+              <a:t>ruleset</a:t>
+            </a:r>
+            <a:r>
+              <a:rPr lang="en-US" dirty="0" smtClean="0"/>
+              <a:t>.</a:t>
+            </a:r>
+          </a:p>
+          <a:p>
+            <a:r>
+              <a:rPr lang="en-US" dirty="0" smtClean="0"/>
+              <a:t>No rule should be suppressed until the proper justification is given and discussed with me first.</a:t>
+            </a:r>
+          </a:p>
+          <a:p>
+            <a:r>
+              <a:rPr lang="en-US" dirty="0" smtClean="0"/>
+              <a:t>Avoid duplicate code by using ‘Code Clone’ feature of Visual Studio.</a:t>
+            </a:r>
+            <a:endParaRPr lang="en-US" dirty="0" smtClean="0"/>
+          </a:p>
+          <a:p>
+            <a:r>
+              <a:rPr lang="en-US" dirty="0" err="1" smtClean="0"/>
+              <a:t>Stylecop</a:t>
+            </a:r>
+            <a:r>
+              <a:rPr lang="en-US" dirty="0" smtClean="0"/>
+              <a:t> helps to beautify your code and recommended coding style as per Microsoft Design guidelines.</a:t>
+            </a:r>
+          </a:p>
+          <a:p>
+            <a:r>
+              <a:rPr lang="en-US" dirty="0" smtClean="0"/>
+              <a:t>No code should be committed until </a:t>
+            </a:r>
+            <a:r>
+              <a:rPr lang="en-US" smtClean="0"/>
+              <a:t>all warnings </a:t>
+            </a:r>
+            <a:r>
+              <a:rPr lang="en-US" dirty="0" smtClean="0"/>
+              <a:t>of code analysis and </a:t>
+            </a:r>
+            <a:r>
+              <a:rPr lang="en-US" dirty="0" err="1" smtClean="0"/>
+              <a:t>stylecop</a:t>
+            </a:r>
+            <a:r>
+              <a:rPr lang="en-US" dirty="0" smtClean="0"/>
+              <a:t> are solved.</a:t>
+            </a:r>
+            <a:endParaRPr lang="en-US" dirty="0"/>
           </a:p>
         </p:txBody>
       </p:sp>
@@ -5895,9 +8043,756 @@
   <p:timing>
     <p:tnLst>
       <p:par>
-        <p:cTn id="1" dur="indefinite" restart="never" nodeType="tmRoot"/>
+        <p:cTn id="1" dur="indefinite" restart="never" nodeType="tmRoot">
+          <p:childTnLst>
+            <p:seq concurrent="1" nextAc="seek">
+              <p:cTn id="2" dur="indefinite" nodeType="mainSeq">
+                <p:childTnLst>
+                  <p:par>
+                    <p:cTn id="3" fill="hold">
+                      <p:stCondLst>
+                        <p:cond delay="indefinite"/>
+                      </p:stCondLst>
+                      <p:childTnLst>
+                        <p:par>
+                          <p:cTn id="4" fill="hold">
+                            <p:stCondLst>
+                              <p:cond delay="0"/>
+                            </p:stCondLst>
+                            <p:childTnLst>
+                              <p:par>
+                                <p:cTn id="5" presetID="2" presetClass="entr" presetSubtype="4" fill="hold" grpId="0" nodeType="clickEffect">
+                                  <p:stCondLst>
+                                    <p:cond delay="0"/>
+                                  </p:stCondLst>
+                                  <p:childTnLst>
+                                    <p:set>
+                                      <p:cBhvr>
+                                        <p:cTn id="6" dur="1" fill="hold">
+                                          <p:stCondLst>
+                                            <p:cond delay="0"/>
+                                          </p:stCondLst>
+                                        </p:cTn>
+                                        <p:tgtEl>
+                                          <p:spTgt spid="20483">
+                                            <p:txEl>
+                                              <p:pRg st="0" end="0"/>
+                                            </p:txEl>
+                                          </p:spTgt>
+                                        </p:tgtEl>
+                                        <p:attrNameLst>
+                                          <p:attrName>style.visibility</p:attrName>
+                                        </p:attrNameLst>
+                                      </p:cBhvr>
+                                      <p:to>
+                                        <p:strVal val="visible"/>
+                                      </p:to>
+                                    </p:set>
+                                    <p:anim calcmode="lin" valueType="num">
+                                      <p:cBhvr additive="base">
+                                        <p:cTn id="7" dur="500" fill="hold"/>
+                                        <p:tgtEl>
+                                          <p:spTgt spid="20483">
+                                            <p:txEl>
+                                              <p:pRg st="0" end="0"/>
+                                            </p:txEl>
+                                          </p:spTgt>
+                                        </p:tgtEl>
+                                        <p:attrNameLst>
+                                          <p:attrName>ppt_x</p:attrName>
+                                        </p:attrNameLst>
+                                      </p:cBhvr>
+                                      <p:tavLst>
+                                        <p:tav tm="0">
+                                          <p:val>
+                                            <p:strVal val="#ppt_x"/>
+                                          </p:val>
+                                        </p:tav>
+                                        <p:tav tm="100000">
+                                          <p:val>
+                                            <p:strVal val="#ppt_x"/>
+                                          </p:val>
+                                        </p:tav>
+                                      </p:tavLst>
+                                    </p:anim>
+                                    <p:anim calcmode="lin" valueType="num">
+                                      <p:cBhvr additive="base">
+                                        <p:cTn id="8" dur="500" fill="hold"/>
+                                        <p:tgtEl>
+                                          <p:spTgt spid="20483">
+                                            <p:txEl>
+                                              <p:pRg st="0" end="0"/>
+                                            </p:txEl>
+                                          </p:spTgt>
+                                        </p:tgtEl>
+                                        <p:attrNameLst>
+                                          <p:attrName>ppt_y</p:attrName>
+                                        </p:attrNameLst>
+                                      </p:cBhvr>
+                                      <p:tavLst>
+                                        <p:tav tm="0">
+                                          <p:val>
+                                            <p:strVal val="1+#ppt_h/2"/>
+                                          </p:val>
+                                        </p:tav>
+                                        <p:tav tm="100000">
+                                          <p:val>
+                                            <p:strVal val="#ppt_y"/>
+                                          </p:val>
+                                        </p:tav>
+                                      </p:tavLst>
+                                    </p:anim>
+                                  </p:childTnLst>
+                                </p:cTn>
+                              </p:par>
+                            </p:childTnLst>
+                          </p:cTn>
+                        </p:par>
+                      </p:childTnLst>
+                    </p:cTn>
+                  </p:par>
+                  <p:par>
+                    <p:cTn id="9" fill="hold">
+                      <p:stCondLst>
+                        <p:cond delay="indefinite"/>
+                      </p:stCondLst>
+                      <p:childTnLst>
+                        <p:par>
+                          <p:cTn id="10" fill="hold">
+                            <p:stCondLst>
+                              <p:cond delay="0"/>
+                            </p:stCondLst>
+                            <p:childTnLst>
+                              <p:par>
+                                <p:cTn id="11" presetID="2" presetClass="entr" presetSubtype="4" fill="hold" grpId="0" nodeType="clickEffect">
+                                  <p:stCondLst>
+                                    <p:cond delay="0"/>
+                                  </p:stCondLst>
+                                  <p:childTnLst>
+                                    <p:set>
+                                      <p:cBhvr>
+                                        <p:cTn id="12" dur="1" fill="hold">
+                                          <p:stCondLst>
+                                            <p:cond delay="0"/>
+                                          </p:stCondLst>
+                                        </p:cTn>
+                                        <p:tgtEl>
+                                          <p:spTgt spid="20483">
+                                            <p:txEl>
+                                              <p:pRg st="1" end="1"/>
+                                            </p:txEl>
+                                          </p:spTgt>
+                                        </p:tgtEl>
+                                        <p:attrNameLst>
+                                          <p:attrName>style.visibility</p:attrName>
+                                        </p:attrNameLst>
+                                      </p:cBhvr>
+                                      <p:to>
+                                        <p:strVal val="visible"/>
+                                      </p:to>
+                                    </p:set>
+                                    <p:anim calcmode="lin" valueType="num">
+                                      <p:cBhvr additive="base">
+                                        <p:cTn id="13" dur="500" fill="hold"/>
+                                        <p:tgtEl>
+                                          <p:spTgt spid="20483">
+                                            <p:txEl>
+                                              <p:pRg st="1" end="1"/>
+                                            </p:txEl>
+                                          </p:spTgt>
+                                        </p:tgtEl>
+                                        <p:attrNameLst>
+                                          <p:attrName>ppt_x</p:attrName>
+                                        </p:attrNameLst>
+                                      </p:cBhvr>
+                                      <p:tavLst>
+                                        <p:tav tm="0">
+                                          <p:val>
+                                            <p:strVal val="#ppt_x"/>
+                                          </p:val>
+                                        </p:tav>
+                                        <p:tav tm="100000">
+                                          <p:val>
+                                            <p:strVal val="#ppt_x"/>
+                                          </p:val>
+                                        </p:tav>
+                                      </p:tavLst>
+                                    </p:anim>
+                                    <p:anim calcmode="lin" valueType="num">
+                                      <p:cBhvr additive="base">
+                                        <p:cTn id="14" dur="500" fill="hold"/>
+                                        <p:tgtEl>
+                                          <p:spTgt spid="20483">
+                                            <p:txEl>
+                                              <p:pRg st="1" end="1"/>
+                                            </p:txEl>
+                                          </p:spTgt>
+                                        </p:tgtEl>
+                                        <p:attrNameLst>
+                                          <p:attrName>ppt_y</p:attrName>
+                                        </p:attrNameLst>
+                                      </p:cBhvr>
+                                      <p:tavLst>
+                                        <p:tav tm="0">
+                                          <p:val>
+                                            <p:strVal val="1+#ppt_h/2"/>
+                                          </p:val>
+                                        </p:tav>
+                                        <p:tav tm="100000">
+                                          <p:val>
+                                            <p:strVal val="#ppt_y"/>
+                                          </p:val>
+                                        </p:tav>
+                                      </p:tavLst>
+                                    </p:anim>
+                                  </p:childTnLst>
+                                </p:cTn>
+                              </p:par>
+                            </p:childTnLst>
+                          </p:cTn>
+                        </p:par>
+                      </p:childTnLst>
+                    </p:cTn>
+                  </p:par>
+                  <p:par>
+                    <p:cTn id="15" fill="hold">
+                      <p:stCondLst>
+                        <p:cond delay="indefinite"/>
+                      </p:stCondLst>
+                      <p:childTnLst>
+                        <p:par>
+                          <p:cTn id="16" fill="hold">
+                            <p:stCondLst>
+                              <p:cond delay="0"/>
+                            </p:stCondLst>
+                            <p:childTnLst>
+                              <p:par>
+                                <p:cTn id="17" presetID="2" presetClass="entr" presetSubtype="4" fill="hold" grpId="0" nodeType="clickEffect">
+                                  <p:stCondLst>
+                                    <p:cond delay="0"/>
+                                  </p:stCondLst>
+                                  <p:childTnLst>
+                                    <p:set>
+                                      <p:cBhvr>
+                                        <p:cTn id="18" dur="1" fill="hold">
+                                          <p:stCondLst>
+                                            <p:cond delay="0"/>
+                                          </p:stCondLst>
+                                        </p:cTn>
+                                        <p:tgtEl>
+                                          <p:spTgt spid="20483">
+                                            <p:txEl>
+                                              <p:pRg st="2" end="2"/>
+                                            </p:txEl>
+                                          </p:spTgt>
+                                        </p:tgtEl>
+                                        <p:attrNameLst>
+                                          <p:attrName>style.visibility</p:attrName>
+                                        </p:attrNameLst>
+                                      </p:cBhvr>
+                                      <p:to>
+                                        <p:strVal val="visible"/>
+                                      </p:to>
+                                    </p:set>
+                                    <p:anim calcmode="lin" valueType="num">
+                                      <p:cBhvr additive="base">
+                                        <p:cTn id="19" dur="500" fill="hold"/>
+                                        <p:tgtEl>
+                                          <p:spTgt spid="20483">
+                                            <p:txEl>
+                                              <p:pRg st="2" end="2"/>
+                                            </p:txEl>
+                                          </p:spTgt>
+                                        </p:tgtEl>
+                                        <p:attrNameLst>
+                                          <p:attrName>ppt_x</p:attrName>
+                                        </p:attrNameLst>
+                                      </p:cBhvr>
+                                      <p:tavLst>
+                                        <p:tav tm="0">
+                                          <p:val>
+                                            <p:strVal val="#ppt_x"/>
+                                          </p:val>
+                                        </p:tav>
+                                        <p:tav tm="100000">
+                                          <p:val>
+                                            <p:strVal val="#ppt_x"/>
+                                          </p:val>
+                                        </p:tav>
+                                      </p:tavLst>
+                                    </p:anim>
+                                    <p:anim calcmode="lin" valueType="num">
+                                      <p:cBhvr additive="base">
+                                        <p:cTn id="20" dur="500" fill="hold"/>
+                                        <p:tgtEl>
+                                          <p:spTgt spid="20483">
+                                            <p:txEl>
+                                              <p:pRg st="2" end="2"/>
+                                            </p:txEl>
+                                          </p:spTgt>
+                                        </p:tgtEl>
+                                        <p:attrNameLst>
+                                          <p:attrName>ppt_y</p:attrName>
+                                        </p:attrNameLst>
+                                      </p:cBhvr>
+                                      <p:tavLst>
+                                        <p:tav tm="0">
+                                          <p:val>
+                                            <p:strVal val="1+#ppt_h/2"/>
+                                          </p:val>
+                                        </p:tav>
+                                        <p:tav tm="100000">
+                                          <p:val>
+                                            <p:strVal val="#ppt_y"/>
+                                          </p:val>
+                                        </p:tav>
+                                      </p:tavLst>
+                                    </p:anim>
+                                  </p:childTnLst>
+                                </p:cTn>
+                              </p:par>
+                            </p:childTnLst>
+                          </p:cTn>
+                        </p:par>
+                      </p:childTnLst>
+                    </p:cTn>
+                  </p:par>
+                  <p:par>
+                    <p:cTn id="21" fill="hold">
+                      <p:stCondLst>
+                        <p:cond delay="indefinite"/>
+                      </p:stCondLst>
+                      <p:childTnLst>
+                        <p:par>
+                          <p:cTn id="22" fill="hold">
+                            <p:stCondLst>
+                              <p:cond delay="0"/>
+                            </p:stCondLst>
+                            <p:childTnLst>
+                              <p:par>
+                                <p:cTn id="23" presetID="2" presetClass="entr" presetSubtype="4" fill="hold" grpId="0" nodeType="clickEffect">
+                                  <p:stCondLst>
+                                    <p:cond delay="0"/>
+                                  </p:stCondLst>
+                                  <p:childTnLst>
+                                    <p:set>
+                                      <p:cBhvr>
+                                        <p:cTn id="24" dur="1" fill="hold">
+                                          <p:stCondLst>
+                                            <p:cond delay="0"/>
+                                          </p:stCondLst>
+                                        </p:cTn>
+                                        <p:tgtEl>
+                                          <p:spTgt spid="20483">
+                                            <p:txEl>
+                                              <p:pRg st="3" end="3"/>
+                                            </p:txEl>
+                                          </p:spTgt>
+                                        </p:tgtEl>
+                                        <p:attrNameLst>
+                                          <p:attrName>style.visibility</p:attrName>
+                                        </p:attrNameLst>
+                                      </p:cBhvr>
+                                      <p:to>
+                                        <p:strVal val="visible"/>
+                                      </p:to>
+                                    </p:set>
+                                    <p:anim calcmode="lin" valueType="num">
+                                      <p:cBhvr additive="base">
+                                        <p:cTn id="25" dur="500" fill="hold"/>
+                                        <p:tgtEl>
+                                          <p:spTgt spid="20483">
+                                            <p:txEl>
+                                              <p:pRg st="3" end="3"/>
+                                            </p:txEl>
+                                          </p:spTgt>
+                                        </p:tgtEl>
+                                        <p:attrNameLst>
+                                          <p:attrName>ppt_x</p:attrName>
+                                        </p:attrNameLst>
+                                      </p:cBhvr>
+                                      <p:tavLst>
+                                        <p:tav tm="0">
+                                          <p:val>
+                                            <p:strVal val="#ppt_x"/>
+                                          </p:val>
+                                        </p:tav>
+                                        <p:tav tm="100000">
+                                          <p:val>
+                                            <p:strVal val="#ppt_x"/>
+                                          </p:val>
+                                        </p:tav>
+                                      </p:tavLst>
+                                    </p:anim>
+                                    <p:anim calcmode="lin" valueType="num">
+                                      <p:cBhvr additive="base">
+                                        <p:cTn id="26" dur="500" fill="hold"/>
+                                        <p:tgtEl>
+                                          <p:spTgt spid="20483">
+                                            <p:txEl>
+                                              <p:pRg st="3" end="3"/>
+                                            </p:txEl>
+                                          </p:spTgt>
+                                        </p:tgtEl>
+                                        <p:attrNameLst>
+                                          <p:attrName>ppt_y</p:attrName>
+                                        </p:attrNameLst>
+                                      </p:cBhvr>
+                                      <p:tavLst>
+                                        <p:tav tm="0">
+                                          <p:val>
+                                            <p:strVal val="1+#ppt_h/2"/>
+                                          </p:val>
+                                        </p:tav>
+                                        <p:tav tm="100000">
+                                          <p:val>
+                                            <p:strVal val="#ppt_y"/>
+                                          </p:val>
+                                        </p:tav>
+                                      </p:tavLst>
+                                    </p:anim>
+                                  </p:childTnLst>
+                                </p:cTn>
+                              </p:par>
+                            </p:childTnLst>
+                          </p:cTn>
+                        </p:par>
+                      </p:childTnLst>
+                    </p:cTn>
+                  </p:par>
+                  <p:par>
+                    <p:cTn id="27" fill="hold">
+                      <p:stCondLst>
+                        <p:cond delay="indefinite"/>
+                      </p:stCondLst>
+                      <p:childTnLst>
+                        <p:par>
+                          <p:cTn id="28" fill="hold">
+                            <p:stCondLst>
+                              <p:cond delay="0"/>
+                            </p:stCondLst>
+                            <p:childTnLst>
+                              <p:par>
+                                <p:cTn id="29" presetID="2" presetClass="entr" presetSubtype="4" fill="hold" grpId="0" nodeType="clickEffect">
+                                  <p:stCondLst>
+                                    <p:cond delay="0"/>
+                                  </p:stCondLst>
+                                  <p:childTnLst>
+                                    <p:set>
+                                      <p:cBhvr>
+                                        <p:cTn id="30" dur="1" fill="hold">
+                                          <p:stCondLst>
+                                            <p:cond delay="0"/>
+                                          </p:stCondLst>
+                                        </p:cTn>
+                                        <p:tgtEl>
+                                          <p:spTgt spid="20483">
+                                            <p:txEl>
+                                              <p:pRg st="4" end="4"/>
+                                            </p:txEl>
+                                          </p:spTgt>
+                                        </p:tgtEl>
+                                        <p:attrNameLst>
+                                          <p:attrName>style.visibility</p:attrName>
+                                        </p:attrNameLst>
+                                      </p:cBhvr>
+                                      <p:to>
+                                        <p:strVal val="visible"/>
+                                      </p:to>
+                                    </p:set>
+                                    <p:anim calcmode="lin" valueType="num">
+                                      <p:cBhvr additive="base">
+                                        <p:cTn id="31" dur="500" fill="hold"/>
+                                        <p:tgtEl>
+                                          <p:spTgt spid="20483">
+                                            <p:txEl>
+                                              <p:pRg st="4" end="4"/>
+                                            </p:txEl>
+                                          </p:spTgt>
+                                        </p:tgtEl>
+                                        <p:attrNameLst>
+                                          <p:attrName>ppt_x</p:attrName>
+                                        </p:attrNameLst>
+                                      </p:cBhvr>
+                                      <p:tavLst>
+                                        <p:tav tm="0">
+                                          <p:val>
+                                            <p:strVal val="#ppt_x"/>
+                                          </p:val>
+                                        </p:tav>
+                                        <p:tav tm="100000">
+                                          <p:val>
+                                            <p:strVal val="#ppt_x"/>
+                                          </p:val>
+                                        </p:tav>
+                                      </p:tavLst>
+                                    </p:anim>
+                                    <p:anim calcmode="lin" valueType="num">
+                                      <p:cBhvr additive="base">
+                                        <p:cTn id="32" dur="500" fill="hold"/>
+                                        <p:tgtEl>
+                                          <p:spTgt spid="20483">
+                                            <p:txEl>
+                                              <p:pRg st="4" end="4"/>
+                                            </p:txEl>
+                                          </p:spTgt>
+                                        </p:tgtEl>
+                                        <p:attrNameLst>
+                                          <p:attrName>ppt_y</p:attrName>
+                                        </p:attrNameLst>
+                                      </p:cBhvr>
+                                      <p:tavLst>
+                                        <p:tav tm="0">
+                                          <p:val>
+                                            <p:strVal val="1+#ppt_h/2"/>
+                                          </p:val>
+                                        </p:tav>
+                                        <p:tav tm="100000">
+                                          <p:val>
+                                            <p:strVal val="#ppt_y"/>
+                                          </p:val>
+                                        </p:tav>
+                                      </p:tavLst>
+                                    </p:anim>
+                                  </p:childTnLst>
+                                </p:cTn>
+                              </p:par>
+                            </p:childTnLst>
+                          </p:cTn>
+                        </p:par>
+                      </p:childTnLst>
+                    </p:cTn>
+                  </p:par>
+                  <p:par>
+                    <p:cTn id="33" fill="hold">
+                      <p:stCondLst>
+                        <p:cond delay="indefinite"/>
+                      </p:stCondLst>
+                      <p:childTnLst>
+                        <p:par>
+                          <p:cTn id="34" fill="hold">
+                            <p:stCondLst>
+                              <p:cond delay="0"/>
+                            </p:stCondLst>
+                            <p:childTnLst>
+                              <p:par>
+                                <p:cTn id="35" presetID="2" presetClass="entr" presetSubtype="4" fill="hold" grpId="0" nodeType="clickEffect">
+                                  <p:stCondLst>
+                                    <p:cond delay="0"/>
+                                  </p:stCondLst>
+                                  <p:childTnLst>
+                                    <p:set>
+                                      <p:cBhvr>
+                                        <p:cTn id="36" dur="1" fill="hold">
+                                          <p:stCondLst>
+                                            <p:cond delay="0"/>
+                                          </p:stCondLst>
+                                        </p:cTn>
+                                        <p:tgtEl>
+                                          <p:spTgt spid="20483">
+                                            <p:txEl>
+                                              <p:pRg st="5" end="5"/>
+                                            </p:txEl>
+                                          </p:spTgt>
+                                        </p:tgtEl>
+                                        <p:attrNameLst>
+                                          <p:attrName>style.visibility</p:attrName>
+                                        </p:attrNameLst>
+                                      </p:cBhvr>
+                                      <p:to>
+                                        <p:strVal val="visible"/>
+                                      </p:to>
+                                    </p:set>
+                                    <p:anim calcmode="lin" valueType="num">
+                                      <p:cBhvr additive="base">
+                                        <p:cTn id="37" dur="500" fill="hold"/>
+                                        <p:tgtEl>
+                                          <p:spTgt spid="20483">
+                                            <p:txEl>
+                                              <p:pRg st="5" end="5"/>
+                                            </p:txEl>
+                                          </p:spTgt>
+                                        </p:tgtEl>
+                                        <p:attrNameLst>
+                                          <p:attrName>ppt_x</p:attrName>
+                                        </p:attrNameLst>
+                                      </p:cBhvr>
+                                      <p:tavLst>
+                                        <p:tav tm="0">
+                                          <p:val>
+                                            <p:strVal val="#ppt_x"/>
+                                          </p:val>
+                                        </p:tav>
+                                        <p:tav tm="100000">
+                                          <p:val>
+                                            <p:strVal val="#ppt_x"/>
+                                          </p:val>
+                                        </p:tav>
+                                      </p:tavLst>
+                                    </p:anim>
+                                    <p:anim calcmode="lin" valueType="num">
+                                      <p:cBhvr additive="base">
+                                        <p:cTn id="38" dur="500" fill="hold"/>
+                                        <p:tgtEl>
+                                          <p:spTgt spid="20483">
+                                            <p:txEl>
+                                              <p:pRg st="5" end="5"/>
+                                            </p:txEl>
+                                          </p:spTgt>
+                                        </p:tgtEl>
+                                        <p:attrNameLst>
+                                          <p:attrName>ppt_y</p:attrName>
+                                        </p:attrNameLst>
+                                      </p:cBhvr>
+                                      <p:tavLst>
+                                        <p:tav tm="0">
+                                          <p:val>
+                                            <p:strVal val="1+#ppt_h/2"/>
+                                          </p:val>
+                                        </p:tav>
+                                        <p:tav tm="100000">
+                                          <p:val>
+                                            <p:strVal val="#ppt_y"/>
+                                          </p:val>
+                                        </p:tav>
+                                      </p:tavLst>
+                                    </p:anim>
+                                  </p:childTnLst>
+                                </p:cTn>
+                              </p:par>
+                            </p:childTnLst>
+                          </p:cTn>
+                        </p:par>
+                      </p:childTnLst>
+                    </p:cTn>
+                  </p:par>
+                  <p:par>
+                    <p:cTn id="39" fill="hold">
+                      <p:stCondLst>
+                        <p:cond delay="indefinite"/>
+                      </p:stCondLst>
+                      <p:childTnLst>
+                        <p:par>
+                          <p:cTn id="40" fill="hold">
+                            <p:stCondLst>
+                              <p:cond delay="0"/>
+                            </p:stCondLst>
+                            <p:childTnLst>
+                              <p:par>
+                                <p:cTn id="41" presetID="2" presetClass="entr" presetSubtype="4" fill="hold" grpId="0" nodeType="clickEffect">
+                                  <p:stCondLst>
+                                    <p:cond delay="0"/>
+                                  </p:stCondLst>
+                                  <p:childTnLst>
+                                    <p:set>
+                                      <p:cBhvr>
+                                        <p:cTn id="42" dur="1" fill="hold">
+                                          <p:stCondLst>
+                                            <p:cond delay="0"/>
+                                          </p:stCondLst>
+                                        </p:cTn>
+                                        <p:tgtEl>
+                                          <p:spTgt spid="20483">
+                                            <p:txEl>
+                                              <p:pRg st="6" end="6"/>
+                                            </p:txEl>
+                                          </p:spTgt>
+                                        </p:tgtEl>
+                                        <p:attrNameLst>
+                                          <p:attrName>style.visibility</p:attrName>
+                                        </p:attrNameLst>
+                                      </p:cBhvr>
+                                      <p:to>
+                                        <p:strVal val="visible"/>
+                                      </p:to>
+                                    </p:set>
+                                    <p:anim calcmode="lin" valueType="num">
+                                      <p:cBhvr additive="base">
+                                        <p:cTn id="43" dur="500" fill="hold"/>
+                                        <p:tgtEl>
+                                          <p:spTgt spid="20483">
+                                            <p:txEl>
+                                              <p:pRg st="6" end="6"/>
+                                            </p:txEl>
+                                          </p:spTgt>
+                                        </p:tgtEl>
+                                        <p:attrNameLst>
+                                          <p:attrName>ppt_x</p:attrName>
+                                        </p:attrNameLst>
+                                      </p:cBhvr>
+                                      <p:tavLst>
+                                        <p:tav tm="0">
+                                          <p:val>
+                                            <p:strVal val="#ppt_x"/>
+                                          </p:val>
+                                        </p:tav>
+                                        <p:tav tm="100000">
+                                          <p:val>
+                                            <p:strVal val="#ppt_x"/>
+                                          </p:val>
+                                        </p:tav>
+                                      </p:tavLst>
+                                    </p:anim>
+                                    <p:anim calcmode="lin" valueType="num">
+                                      <p:cBhvr additive="base">
+                                        <p:cTn id="44" dur="500" fill="hold"/>
+                                        <p:tgtEl>
+                                          <p:spTgt spid="20483">
+                                            <p:txEl>
+                                              <p:pRg st="6" end="6"/>
+                                            </p:txEl>
+                                          </p:spTgt>
+                                        </p:tgtEl>
+                                        <p:attrNameLst>
+                                          <p:attrName>ppt_y</p:attrName>
+                                        </p:attrNameLst>
+                                      </p:cBhvr>
+                                      <p:tavLst>
+                                        <p:tav tm="0">
+                                          <p:val>
+                                            <p:strVal val="1+#ppt_h/2"/>
+                                          </p:val>
+                                        </p:tav>
+                                        <p:tav tm="100000">
+                                          <p:val>
+                                            <p:strVal val="#ppt_y"/>
+                                          </p:val>
+                                        </p:tav>
+                                      </p:tavLst>
+                                    </p:anim>
+                                  </p:childTnLst>
+                                </p:cTn>
+                              </p:par>
+                            </p:childTnLst>
+                          </p:cTn>
+                        </p:par>
+                      </p:childTnLst>
+                    </p:cTn>
+                  </p:par>
+                </p:childTnLst>
+              </p:cTn>
+              <p:prevCondLst>
+                <p:cond evt="onPrev" delay="0">
+                  <p:tgtEl>
+                    <p:sldTgt/>
+                  </p:tgtEl>
+                </p:cond>
+              </p:prevCondLst>
+              <p:nextCondLst>
+                <p:cond evt="onNext" delay="0">
+                  <p:tgtEl>
+                    <p:sldTgt/>
+                  </p:tgtEl>
+                </p:cond>
+              </p:nextCondLst>
+            </p:seq>
+          </p:childTnLst>
+        </p:cTn>
       </p:par>
     </p:tnLst>
+    <p:bldLst>
+      <p:bldP spid="20483" grpId="0" build="p"/>
+    </p:bldLst>
   </p:timing>
 </p:sld>
 </file>

</xml_diff>

<commit_message>
Completed delete functionality and changes in ppt
</commit_message>
<xml_diff>
--- a/QTec/Presentation.pptx
+++ b/QTec/Presentation.pptx
@@ -902,20 +902,7 @@
               <a:buFontTx/>
               <a:buChar char="•"/>
             </a:pPr>
-            <a:r>
-              <a:rPr lang="en-US"/>
-              <a:t>How presentation will benefit audience: Adult learners are more interested in a subject if they know how or why it is important to them.</a:t>
-            </a:r>
-          </a:p>
-          <a:p>
-            <a:pPr lvl="1">
-              <a:buFontTx/>
-              <a:buChar char="•"/>
-            </a:pPr>
-            <a:r>
-              <a:rPr lang="en-US"/>
-              <a:t>Presenter’s level of expertise in the subject: Briefly state your credentials in this area, or explain why participants should listen to you.</a:t>
-            </a:r>
+            <a:endParaRPr lang="en-US" dirty="0"/>
           </a:p>
         </p:txBody>
       </p:sp>
@@ -1199,7 +1186,6 @@
               <a:rPr lang="en-US" altLang="en-US" noProof="0" smtClean="0"/>
               <a:t>Click to edit Master title style</a:t>
             </a:r>
-            <a:endParaRPr lang="en-US" altLang="en-US" noProof="0" smtClean="0"/>
           </a:p>
         </p:txBody>
       </p:sp>
@@ -1234,7 +1220,6 @@
               <a:rPr lang="en-US" altLang="en-US" noProof="0" smtClean="0"/>
               <a:t>Click to edit Master subtitle style</a:t>
             </a:r>
-            <a:endParaRPr lang="en-US" altLang="en-US" noProof="0" smtClean="0"/>
           </a:p>
         </p:txBody>
       </p:sp>
@@ -4103,7 +4088,6 @@
               <a:rPr lang="en-US" altLang="en-US" smtClean="0"/>
               <a:t>Click to edit Master title style</a:t>
             </a:r>
-            <a:endParaRPr lang="en-US" altLang="en-US" smtClean="0"/>
           </a:p>
         </p:txBody>
       </p:sp>
@@ -4200,7 +4184,6 @@
               <a:rPr lang="en-US" altLang="en-US" smtClean="0"/>
               <a:t>Fifth level</a:t>
             </a:r>
-            <a:endParaRPr lang="en-US" altLang="en-US" smtClean="0"/>
           </a:p>
         </p:txBody>
       </p:sp>
@@ -5814,6 +5797,20 @@
               <a:rPr lang="en-US" dirty="0" smtClean="0"/>
               <a:t>.</a:t>
             </a:r>
+          </a:p>
+          <a:p>
+            <a:r>
+              <a:rPr lang="en-US" dirty="0" smtClean="0"/>
+              <a:t>C# </a:t>
+            </a:r>
+            <a:r>
+              <a:rPr lang="en-US" dirty="0" err="1" smtClean="0"/>
+              <a:t>Async</a:t>
+            </a:r>
+            <a:r>
+              <a:rPr lang="en-US" dirty="0" smtClean="0"/>
+              <a:t> programming.</a:t>
+            </a:r>
             <a:endParaRPr lang="en-US" dirty="0"/>
           </a:p>
           <a:p>
@@ -5844,11 +5841,7 @@
           <a:p>
             <a:r>
               <a:rPr lang="en-US" dirty="0" smtClean="0"/>
-              <a:t>Repository and Unit of Work design pattern</a:t>
-            </a:r>
-            <a:r>
-              <a:rPr lang="en-US" dirty="0" smtClean="0"/>
-              <a:t>.</a:t>
+              <a:t>Repository and Unit of Work design pattern.</a:t>
             </a:r>
           </a:p>
           <a:p>
@@ -5862,7 +5855,6 @@
               <a:rPr lang="en-US" dirty="0" smtClean="0"/>
               <a:t>Auto mapper.</a:t>
             </a:r>
-            <a:endParaRPr lang="en-US" dirty="0" smtClean="0"/>
           </a:p>
         </p:txBody>
       </p:sp>
@@ -6600,6 +6592,109 @@
                       </p:childTnLst>
                     </p:cTn>
                   </p:par>
+                  <p:par>
+                    <p:cTn id="45" fill="hold">
+                      <p:stCondLst>
+                        <p:cond delay="indefinite"/>
+                      </p:stCondLst>
+                      <p:childTnLst>
+                        <p:par>
+                          <p:cTn id="46" fill="hold">
+                            <p:stCondLst>
+                              <p:cond delay="0"/>
+                            </p:stCondLst>
+                            <p:childTnLst>
+                              <p:par>
+                                <p:cTn id="47" presetID="2" presetClass="entr" presetSubtype="4" fill="hold" grpId="0" nodeType="clickEffect">
+                                  <p:stCondLst>
+                                    <p:cond delay="0"/>
+                                  </p:stCondLst>
+                                  <p:childTnLst>
+                                    <p:set>
+                                      <p:cBhvr>
+                                        <p:cTn id="48" dur="1" fill="hold">
+                                          <p:stCondLst>
+                                            <p:cond delay="0"/>
+                                          </p:stCondLst>
+                                        </p:cTn>
+                                        <p:tgtEl>
+                                          <p:spTgt spid="6147">
+                                            <p:txEl>
+                                              <p:pRg st="7" end="7"/>
+                                            </p:txEl>
+                                          </p:spTgt>
+                                        </p:tgtEl>
+                                        <p:attrNameLst>
+                                          <p:attrName>style.visibility</p:attrName>
+                                        </p:attrNameLst>
+                                      </p:cBhvr>
+                                      <p:to>
+                                        <p:strVal val="visible"/>
+                                      </p:to>
+                                    </p:set>
+                                    <p:anim calcmode="lin" valueType="num">
+                                      <p:cBhvr additive="base">
+                                        <p:cTn id="49" dur="500" fill="hold"/>
+                                        <p:tgtEl>
+                                          <p:spTgt spid="6147">
+                                            <p:txEl>
+                                              <p:pRg st="7" end="7"/>
+                                            </p:txEl>
+                                          </p:spTgt>
+                                        </p:tgtEl>
+                                        <p:attrNameLst>
+                                          <p:attrName>ppt_x</p:attrName>
+                                        </p:attrNameLst>
+                                      </p:cBhvr>
+                                      <p:tavLst>
+                                        <p:tav tm="0">
+                                          <p:val>
+                                            <p:strVal val="#ppt_x"/>
+                                          </p:val>
+                                        </p:tav>
+                                        <p:tav tm="100000">
+                                          <p:val>
+                                            <p:strVal val="#ppt_x"/>
+                                          </p:val>
+                                        </p:tav>
+                                      </p:tavLst>
+                                    </p:anim>
+                                    <p:anim calcmode="lin" valueType="num">
+                                      <p:cBhvr additive="base">
+                                        <p:cTn id="50" dur="500" fill="hold"/>
+                                        <p:tgtEl>
+                                          <p:spTgt spid="6147">
+                                            <p:txEl>
+                                              <p:pRg st="7" end="7"/>
+                                            </p:txEl>
+                                          </p:spTgt>
+                                        </p:tgtEl>
+                                        <p:attrNameLst>
+                                          <p:attrName>ppt_y</p:attrName>
+                                        </p:attrNameLst>
+                                      </p:cBhvr>
+                                      <p:tavLst>
+                                        <p:tav tm="0">
+                                          <p:val>
+                                            <p:strVal val="1+#ppt_h/2"/>
+                                          </p:val>
+                                        </p:tav>
+                                        <p:tav tm="100000">
+                                          <p:val>
+                                            <p:strVal val="#ppt_y"/>
+                                          </p:val>
+                                        </p:tav>
+                                      </p:tavLst>
+                                    </p:anim>
+                                  </p:childTnLst>
+                                </p:cTn>
+                              </p:par>
+                            </p:childTnLst>
+                          </p:cTn>
+                        </p:par>
+                      </p:childTnLst>
+                    </p:cTn>
+                  </p:par>
                 </p:childTnLst>
               </p:cTn>
               <p:prevCondLst>
@@ -6748,7 +6843,6 @@
               <a:rPr lang="en-US" dirty="0" smtClean="0"/>
               <a:t>Use proper conventions in naming the projects file.</a:t>
             </a:r>
-            <a:endParaRPr lang="en-US" dirty="0" smtClean="0"/>
           </a:p>
           <a:p>
             <a:r>
@@ -6791,7 +6885,6 @@
               <a:rPr lang="en-US" dirty="0" smtClean="0"/>
               <a:t>Use file linking feature for common files.</a:t>
             </a:r>
-            <a:endParaRPr lang="en-US" dirty="0" smtClean="0"/>
           </a:p>
           <a:p>
             <a:r>
@@ -7941,7 +8034,6 @@
               <a:rPr lang="en-US" dirty="0"/>
               <a:t> Code Analysis feature of Visual Studio performs static code analysis on code to help developers identify potential design, globalization, interoperability, performance, security, and a lot of other categories of potential problems.</a:t>
             </a:r>
-            <a:endParaRPr lang="en-US" dirty="0"/>
           </a:p>
           <a:p>
             <a:r>
@@ -7998,7 +8090,6 @@
               <a:rPr lang="en-US" dirty="0" smtClean="0"/>
               <a:t>Avoid duplicate code by using ‘Code Clone’ feature of Visual Studio.</a:t>
             </a:r>
-            <a:endParaRPr lang="en-US" dirty="0" smtClean="0"/>
           </a:p>
           <a:p>
             <a:r>
@@ -8830,9 +8921,14 @@
           <a:lstStyle/>
           <a:p>
             <a:r>
-              <a:rPr lang="en-US"/>
-              <a:t>Lesson 1: Content</a:t>
-            </a:r>
+              <a:rPr lang="en-US" dirty="0" err="1" smtClean="0"/>
+              <a:t>Async</a:t>
+            </a:r>
+            <a:r>
+              <a:rPr lang="en-US" dirty="0" smtClean="0"/>
+              <a:t> Programming (Task)</a:t>
+            </a:r>
+            <a:endParaRPr lang="en-US" dirty="0"/>
           </a:p>
         </p:txBody>
       </p:sp>
@@ -8846,65 +8942,125 @@
             <p:ph type="body" sz="half" idx="1"/>
           </p:nvPr>
         </p:nvSpPr>
-        <p:spPr/>
+        <p:spPr>
+          <a:xfrm>
+            <a:off x="457200" y="1719263"/>
+            <a:ext cx="7696200" cy="4411662"/>
+          </a:xfrm>
+        </p:spPr>
         <p:txBody>
           <a:bodyPr/>
           <a:lstStyle/>
           <a:p>
             <a:r>
-              <a:rPr lang="en-US" sz="2600"/>
-              <a:t>Add text here. </a:t>
-            </a:r>
-          </a:p>
-          <a:p>
-            <a:r>
-              <a:rPr lang="en-US" sz="2600"/>
-              <a:t>To add a picture, chart, or other content in the right column, click the appropriate icon.</a:t>
-            </a:r>
-          </a:p>
-          <a:p>
-            <a:r>
-              <a:rPr lang="en-US" sz="2600"/>
-              <a:t>To add a slide, click </a:t>
-            </a:r>
-            <a:r>
-              <a:rPr lang="en-US" sz="2600" b="1"/>
-              <a:t>New Slide</a:t>
-            </a:r>
-            <a:r>
-              <a:rPr lang="en-US" sz="2600"/>
-              <a:t> on the </a:t>
-            </a:r>
-            <a:r>
-              <a:rPr lang="en-US" sz="2600" b="1"/>
-              <a:t>Insert</a:t>
-            </a:r>
-            <a:r>
-              <a:rPr lang="en-US" sz="2600"/>
-              <a:t> menu, or press CTRL+M.</a:t>
-            </a:r>
-          </a:p>
-        </p:txBody>
-      </p:sp>
-      <p:sp>
-        <p:nvSpPr>
-          <p:cNvPr id="31751" name="Rectangle 7"/>
-          <p:cNvSpPr>
-            <a:spLocks noGrp="1" noChangeArrowheads="1"/>
-          </p:cNvSpPr>
-          <p:nvPr>
-            <p:ph sz="half" idx="2"/>
-          </p:nvPr>
-        </p:nvSpPr>
-        <p:spPr/>
-        <p:txBody>
-          <a:bodyPr/>
-          <a:lstStyle/>
-          <a:p>
-            <a:endParaRPr lang="en-US" sz="2200"/>
-          </a:p>
-        </p:txBody>
-      </p:sp>
+              <a:rPr lang="en-US" sz="2600" dirty="0" smtClean="0"/>
+              <a:t>Introduced with </a:t>
+            </a:r>
+            <a:r>
+              <a:rPr lang="en-US" sz="2600" dirty="0" err="1" smtClean="0"/>
+              <a:t>.net</a:t>
+            </a:r>
+            <a:r>
+              <a:rPr lang="en-US" sz="2600" dirty="0" smtClean="0"/>
+              <a:t> Framework 4.0</a:t>
+            </a:r>
+          </a:p>
+          <a:p>
+            <a:r>
+              <a:rPr lang="en-US" sz="2600" dirty="0" smtClean="0"/>
+              <a:t>The task class represents the ongoing operation.</a:t>
+            </a:r>
+          </a:p>
+          <a:p>
+            <a:r>
+              <a:rPr lang="en-US" sz="2600" dirty="0" smtClean="0"/>
+              <a:t>A generic version of Task&lt;T&gt; acts like a promise which will be available in the future once the operation is completed. The result of this operation will be of type T.</a:t>
+            </a:r>
+            <a:endParaRPr lang="en-US" sz="2600" dirty="0"/>
+          </a:p>
+          <a:p>
+            <a:r>
+              <a:rPr lang="en-US" sz="2600" dirty="0" smtClean="0"/>
+              <a:t>Any method which invokes the task should be prefixed by </a:t>
+            </a:r>
+            <a:r>
+              <a:rPr lang="en-US" sz="2600" dirty="0" err="1" smtClean="0"/>
+              <a:t>async</a:t>
+            </a:r>
+            <a:r>
+              <a:rPr lang="en-US" sz="2600" dirty="0" smtClean="0"/>
+              <a:t> keyword.</a:t>
+            </a:r>
+          </a:p>
+          <a:p>
+            <a:r>
+              <a:rPr lang="en-US" sz="2600" dirty="0" smtClean="0"/>
+              <a:t>All methods that returns tasks must be called by prefixing await keyword.</a:t>
+            </a:r>
+            <a:endParaRPr lang="en-US" sz="2600" dirty="0"/>
+          </a:p>
+          <a:p>
+            <a:pPr marL="0" indent="0">
+              <a:buNone/>
+            </a:pPr>
+            <a:endParaRPr lang="en-US" sz="2600" dirty="0"/>
+          </a:p>
+        </p:txBody>
+      </p:sp>
+      <p:pic>
+        <p:nvPicPr>
+          <p:cNvPr id="1026" name="Picture 2"/>
+          <p:cNvPicPr>
+            <a:picLocks noChangeAspect="1" noChangeArrowheads="1"/>
+          </p:cNvPicPr>
+          <p:nvPr/>
+        </p:nvPicPr>
+        <p:blipFill>
+          <a:blip r:embed="rId2">
+            <a:extLst>
+              <a:ext uri="{28A0092B-C50C-407E-A947-70E740481C1C}">
+                <a14:useLocalDpi xmlns:a14="http://schemas.microsoft.com/office/drawing/2010/main" val="0"/>
+              </a:ext>
+            </a:extLst>
+          </a:blip>
+          <a:srcRect/>
+          <a:stretch>
+            <a:fillRect/>
+          </a:stretch>
+        </p:blipFill>
+        <p:spPr bwMode="auto">
+          <a:xfrm>
+            <a:off x="609600" y="1810555"/>
+            <a:ext cx="7943910" cy="4419600"/>
+          </a:xfrm>
+          <a:prstGeom prst="rect">
+            <a:avLst/>
+          </a:prstGeom>
+          <a:noFill/>
+          <a:ln>
+            <a:noFill/>
+          </a:ln>
+          <a:extLst>
+            <a:ext uri="{909E8E84-426E-40DD-AFC4-6F175D3DCCD1}">
+              <a14:hiddenFill xmlns:a14="http://schemas.microsoft.com/office/drawing/2010/main">
+                <a:solidFill>
+                  <a:schemeClr val="accent1"/>
+                </a:solidFill>
+              </a14:hiddenFill>
+            </a:ext>
+            <a:ext uri="{91240B29-F687-4F45-9708-019B960494DF}">
+              <a14:hiddenLine xmlns:a14="http://schemas.microsoft.com/office/drawing/2010/main" w="9525">
+                <a:solidFill>
+                  <a:schemeClr val="tx1"/>
+                </a:solidFill>
+                <a:miter lim="800000"/>
+                <a:headEnd/>
+                <a:tailEnd/>
+              </a14:hiddenLine>
+            </a:ext>
+          </a:extLst>
+        </p:spPr>
+      </p:pic>
     </p:spTree>
   </p:cSld>
   <p:clrMapOvr>
@@ -8913,9 +9069,603 @@
   <p:timing>
     <p:tnLst>
       <p:par>
-        <p:cTn id="1" dur="indefinite" restart="never" nodeType="tmRoot"/>
+        <p:cTn id="1" dur="indefinite" restart="never" nodeType="tmRoot">
+          <p:childTnLst>
+            <p:seq concurrent="1" nextAc="seek">
+              <p:cTn id="2" dur="indefinite" nodeType="mainSeq">
+                <p:childTnLst>
+                  <p:par>
+                    <p:cTn id="3" fill="hold">
+                      <p:stCondLst>
+                        <p:cond delay="indefinite"/>
+                      </p:stCondLst>
+                      <p:childTnLst>
+                        <p:par>
+                          <p:cTn id="4" fill="hold">
+                            <p:stCondLst>
+                              <p:cond delay="0"/>
+                            </p:stCondLst>
+                            <p:childTnLst>
+                              <p:par>
+                                <p:cTn id="5" presetID="2" presetClass="entr" presetSubtype="4" fill="hold" grpId="0" nodeType="clickEffect">
+                                  <p:stCondLst>
+                                    <p:cond delay="0"/>
+                                  </p:stCondLst>
+                                  <p:childTnLst>
+                                    <p:set>
+                                      <p:cBhvr>
+                                        <p:cTn id="6" dur="1" fill="hold">
+                                          <p:stCondLst>
+                                            <p:cond delay="0"/>
+                                          </p:stCondLst>
+                                        </p:cTn>
+                                        <p:tgtEl>
+                                          <p:spTgt spid="31750">
+                                            <p:txEl>
+                                              <p:pRg st="0" end="0"/>
+                                            </p:txEl>
+                                          </p:spTgt>
+                                        </p:tgtEl>
+                                        <p:attrNameLst>
+                                          <p:attrName>style.visibility</p:attrName>
+                                        </p:attrNameLst>
+                                      </p:cBhvr>
+                                      <p:to>
+                                        <p:strVal val="visible"/>
+                                      </p:to>
+                                    </p:set>
+                                    <p:anim calcmode="lin" valueType="num">
+                                      <p:cBhvr additive="base">
+                                        <p:cTn id="7" dur="500" fill="hold"/>
+                                        <p:tgtEl>
+                                          <p:spTgt spid="31750">
+                                            <p:txEl>
+                                              <p:pRg st="0" end="0"/>
+                                            </p:txEl>
+                                          </p:spTgt>
+                                        </p:tgtEl>
+                                        <p:attrNameLst>
+                                          <p:attrName>ppt_x</p:attrName>
+                                        </p:attrNameLst>
+                                      </p:cBhvr>
+                                      <p:tavLst>
+                                        <p:tav tm="0">
+                                          <p:val>
+                                            <p:strVal val="#ppt_x"/>
+                                          </p:val>
+                                        </p:tav>
+                                        <p:tav tm="100000">
+                                          <p:val>
+                                            <p:strVal val="#ppt_x"/>
+                                          </p:val>
+                                        </p:tav>
+                                      </p:tavLst>
+                                    </p:anim>
+                                    <p:anim calcmode="lin" valueType="num">
+                                      <p:cBhvr additive="base">
+                                        <p:cTn id="8" dur="500" fill="hold"/>
+                                        <p:tgtEl>
+                                          <p:spTgt spid="31750">
+                                            <p:txEl>
+                                              <p:pRg st="0" end="0"/>
+                                            </p:txEl>
+                                          </p:spTgt>
+                                        </p:tgtEl>
+                                        <p:attrNameLst>
+                                          <p:attrName>ppt_y</p:attrName>
+                                        </p:attrNameLst>
+                                      </p:cBhvr>
+                                      <p:tavLst>
+                                        <p:tav tm="0">
+                                          <p:val>
+                                            <p:strVal val="1+#ppt_h/2"/>
+                                          </p:val>
+                                        </p:tav>
+                                        <p:tav tm="100000">
+                                          <p:val>
+                                            <p:strVal val="#ppt_y"/>
+                                          </p:val>
+                                        </p:tav>
+                                      </p:tavLst>
+                                    </p:anim>
+                                  </p:childTnLst>
+                                </p:cTn>
+                              </p:par>
+                            </p:childTnLst>
+                          </p:cTn>
+                        </p:par>
+                      </p:childTnLst>
+                    </p:cTn>
+                  </p:par>
+                  <p:par>
+                    <p:cTn id="9" fill="hold">
+                      <p:stCondLst>
+                        <p:cond delay="indefinite"/>
+                      </p:stCondLst>
+                      <p:childTnLst>
+                        <p:par>
+                          <p:cTn id="10" fill="hold">
+                            <p:stCondLst>
+                              <p:cond delay="0"/>
+                            </p:stCondLst>
+                            <p:childTnLst>
+                              <p:par>
+                                <p:cTn id="11" presetID="2" presetClass="entr" presetSubtype="4" fill="hold" grpId="0" nodeType="clickEffect">
+                                  <p:stCondLst>
+                                    <p:cond delay="0"/>
+                                  </p:stCondLst>
+                                  <p:childTnLst>
+                                    <p:set>
+                                      <p:cBhvr>
+                                        <p:cTn id="12" dur="1" fill="hold">
+                                          <p:stCondLst>
+                                            <p:cond delay="0"/>
+                                          </p:stCondLst>
+                                        </p:cTn>
+                                        <p:tgtEl>
+                                          <p:spTgt spid="31750">
+                                            <p:txEl>
+                                              <p:pRg st="1" end="1"/>
+                                            </p:txEl>
+                                          </p:spTgt>
+                                        </p:tgtEl>
+                                        <p:attrNameLst>
+                                          <p:attrName>style.visibility</p:attrName>
+                                        </p:attrNameLst>
+                                      </p:cBhvr>
+                                      <p:to>
+                                        <p:strVal val="visible"/>
+                                      </p:to>
+                                    </p:set>
+                                    <p:anim calcmode="lin" valueType="num">
+                                      <p:cBhvr additive="base">
+                                        <p:cTn id="13" dur="500" fill="hold"/>
+                                        <p:tgtEl>
+                                          <p:spTgt spid="31750">
+                                            <p:txEl>
+                                              <p:pRg st="1" end="1"/>
+                                            </p:txEl>
+                                          </p:spTgt>
+                                        </p:tgtEl>
+                                        <p:attrNameLst>
+                                          <p:attrName>ppt_x</p:attrName>
+                                        </p:attrNameLst>
+                                      </p:cBhvr>
+                                      <p:tavLst>
+                                        <p:tav tm="0">
+                                          <p:val>
+                                            <p:strVal val="#ppt_x"/>
+                                          </p:val>
+                                        </p:tav>
+                                        <p:tav tm="100000">
+                                          <p:val>
+                                            <p:strVal val="#ppt_x"/>
+                                          </p:val>
+                                        </p:tav>
+                                      </p:tavLst>
+                                    </p:anim>
+                                    <p:anim calcmode="lin" valueType="num">
+                                      <p:cBhvr additive="base">
+                                        <p:cTn id="14" dur="500" fill="hold"/>
+                                        <p:tgtEl>
+                                          <p:spTgt spid="31750">
+                                            <p:txEl>
+                                              <p:pRg st="1" end="1"/>
+                                            </p:txEl>
+                                          </p:spTgt>
+                                        </p:tgtEl>
+                                        <p:attrNameLst>
+                                          <p:attrName>ppt_y</p:attrName>
+                                        </p:attrNameLst>
+                                      </p:cBhvr>
+                                      <p:tavLst>
+                                        <p:tav tm="0">
+                                          <p:val>
+                                            <p:strVal val="1+#ppt_h/2"/>
+                                          </p:val>
+                                        </p:tav>
+                                        <p:tav tm="100000">
+                                          <p:val>
+                                            <p:strVal val="#ppt_y"/>
+                                          </p:val>
+                                        </p:tav>
+                                      </p:tavLst>
+                                    </p:anim>
+                                  </p:childTnLst>
+                                </p:cTn>
+                              </p:par>
+                            </p:childTnLst>
+                          </p:cTn>
+                        </p:par>
+                      </p:childTnLst>
+                    </p:cTn>
+                  </p:par>
+                  <p:par>
+                    <p:cTn id="15" fill="hold">
+                      <p:stCondLst>
+                        <p:cond delay="indefinite"/>
+                      </p:stCondLst>
+                      <p:childTnLst>
+                        <p:par>
+                          <p:cTn id="16" fill="hold">
+                            <p:stCondLst>
+                              <p:cond delay="0"/>
+                            </p:stCondLst>
+                            <p:childTnLst>
+                              <p:par>
+                                <p:cTn id="17" presetID="2" presetClass="entr" presetSubtype="4" fill="hold" grpId="0" nodeType="clickEffect">
+                                  <p:stCondLst>
+                                    <p:cond delay="0"/>
+                                  </p:stCondLst>
+                                  <p:childTnLst>
+                                    <p:set>
+                                      <p:cBhvr>
+                                        <p:cTn id="18" dur="1" fill="hold">
+                                          <p:stCondLst>
+                                            <p:cond delay="0"/>
+                                          </p:stCondLst>
+                                        </p:cTn>
+                                        <p:tgtEl>
+                                          <p:spTgt spid="31750">
+                                            <p:txEl>
+                                              <p:pRg st="2" end="2"/>
+                                            </p:txEl>
+                                          </p:spTgt>
+                                        </p:tgtEl>
+                                        <p:attrNameLst>
+                                          <p:attrName>style.visibility</p:attrName>
+                                        </p:attrNameLst>
+                                      </p:cBhvr>
+                                      <p:to>
+                                        <p:strVal val="visible"/>
+                                      </p:to>
+                                    </p:set>
+                                    <p:anim calcmode="lin" valueType="num">
+                                      <p:cBhvr additive="base">
+                                        <p:cTn id="19" dur="500" fill="hold"/>
+                                        <p:tgtEl>
+                                          <p:spTgt spid="31750">
+                                            <p:txEl>
+                                              <p:pRg st="2" end="2"/>
+                                            </p:txEl>
+                                          </p:spTgt>
+                                        </p:tgtEl>
+                                        <p:attrNameLst>
+                                          <p:attrName>ppt_x</p:attrName>
+                                        </p:attrNameLst>
+                                      </p:cBhvr>
+                                      <p:tavLst>
+                                        <p:tav tm="0">
+                                          <p:val>
+                                            <p:strVal val="#ppt_x"/>
+                                          </p:val>
+                                        </p:tav>
+                                        <p:tav tm="100000">
+                                          <p:val>
+                                            <p:strVal val="#ppt_x"/>
+                                          </p:val>
+                                        </p:tav>
+                                      </p:tavLst>
+                                    </p:anim>
+                                    <p:anim calcmode="lin" valueType="num">
+                                      <p:cBhvr additive="base">
+                                        <p:cTn id="20" dur="500" fill="hold"/>
+                                        <p:tgtEl>
+                                          <p:spTgt spid="31750">
+                                            <p:txEl>
+                                              <p:pRg st="2" end="2"/>
+                                            </p:txEl>
+                                          </p:spTgt>
+                                        </p:tgtEl>
+                                        <p:attrNameLst>
+                                          <p:attrName>ppt_y</p:attrName>
+                                        </p:attrNameLst>
+                                      </p:cBhvr>
+                                      <p:tavLst>
+                                        <p:tav tm="0">
+                                          <p:val>
+                                            <p:strVal val="1+#ppt_h/2"/>
+                                          </p:val>
+                                        </p:tav>
+                                        <p:tav tm="100000">
+                                          <p:val>
+                                            <p:strVal val="#ppt_y"/>
+                                          </p:val>
+                                        </p:tav>
+                                      </p:tavLst>
+                                    </p:anim>
+                                  </p:childTnLst>
+                                </p:cTn>
+                              </p:par>
+                            </p:childTnLst>
+                          </p:cTn>
+                        </p:par>
+                      </p:childTnLst>
+                    </p:cTn>
+                  </p:par>
+                  <p:par>
+                    <p:cTn id="21" fill="hold">
+                      <p:stCondLst>
+                        <p:cond delay="indefinite"/>
+                      </p:stCondLst>
+                      <p:childTnLst>
+                        <p:par>
+                          <p:cTn id="22" fill="hold">
+                            <p:stCondLst>
+                              <p:cond delay="0"/>
+                            </p:stCondLst>
+                            <p:childTnLst>
+                              <p:par>
+                                <p:cTn id="23" presetID="2" presetClass="entr" presetSubtype="4" fill="hold" grpId="0" nodeType="clickEffect">
+                                  <p:stCondLst>
+                                    <p:cond delay="0"/>
+                                  </p:stCondLst>
+                                  <p:childTnLst>
+                                    <p:set>
+                                      <p:cBhvr>
+                                        <p:cTn id="24" dur="1" fill="hold">
+                                          <p:stCondLst>
+                                            <p:cond delay="0"/>
+                                          </p:stCondLst>
+                                        </p:cTn>
+                                        <p:tgtEl>
+                                          <p:spTgt spid="31750">
+                                            <p:txEl>
+                                              <p:pRg st="3" end="3"/>
+                                            </p:txEl>
+                                          </p:spTgt>
+                                        </p:tgtEl>
+                                        <p:attrNameLst>
+                                          <p:attrName>style.visibility</p:attrName>
+                                        </p:attrNameLst>
+                                      </p:cBhvr>
+                                      <p:to>
+                                        <p:strVal val="visible"/>
+                                      </p:to>
+                                    </p:set>
+                                    <p:anim calcmode="lin" valueType="num">
+                                      <p:cBhvr additive="base">
+                                        <p:cTn id="25" dur="500" fill="hold"/>
+                                        <p:tgtEl>
+                                          <p:spTgt spid="31750">
+                                            <p:txEl>
+                                              <p:pRg st="3" end="3"/>
+                                            </p:txEl>
+                                          </p:spTgt>
+                                        </p:tgtEl>
+                                        <p:attrNameLst>
+                                          <p:attrName>ppt_x</p:attrName>
+                                        </p:attrNameLst>
+                                      </p:cBhvr>
+                                      <p:tavLst>
+                                        <p:tav tm="0">
+                                          <p:val>
+                                            <p:strVal val="#ppt_x"/>
+                                          </p:val>
+                                        </p:tav>
+                                        <p:tav tm="100000">
+                                          <p:val>
+                                            <p:strVal val="#ppt_x"/>
+                                          </p:val>
+                                        </p:tav>
+                                      </p:tavLst>
+                                    </p:anim>
+                                    <p:anim calcmode="lin" valueType="num">
+                                      <p:cBhvr additive="base">
+                                        <p:cTn id="26" dur="500" fill="hold"/>
+                                        <p:tgtEl>
+                                          <p:spTgt spid="31750">
+                                            <p:txEl>
+                                              <p:pRg st="3" end="3"/>
+                                            </p:txEl>
+                                          </p:spTgt>
+                                        </p:tgtEl>
+                                        <p:attrNameLst>
+                                          <p:attrName>ppt_y</p:attrName>
+                                        </p:attrNameLst>
+                                      </p:cBhvr>
+                                      <p:tavLst>
+                                        <p:tav tm="0">
+                                          <p:val>
+                                            <p:strVal val="1+#ppt_h/2"/>
+                                          </p:val>
+                                        </p:tav>
+                                        <p:tav tm="100000">
+                                          <p:val>
+                                            <p:strVal val="#ppt_y"/>
+                                          </p:val>
+                                        </p:tav>
+                                      </p:tavLst>
+                                    </p:anim>
+                                  </p:childTnLst>
+                                </p:cTn>
+                              </p:par>
+                            </p:childTnLst>
+                          </p:cTn>
+                        </p:par>
+                      </p:childTnLst>
+                    </p:cTn>
+                  </p:par>
+                  <p:par>
+                    <p:cTn id="27" fill="hold">
+                      <p:stCondLst>
+                        <p:cond delay="indefinite"/>
+                      </p:stCondLst>
+                      <p:childTnLst>
+                        <p:par>
+                          <p:cTn id="28" fill="hold">
+                            <p:stCondLst>
+                              <p:cond delay="0"/>
+                            </p:stCondLst>
+                            <p:childTnLst>
+                              <p:par>
+                                <p:cTn id="29" presetID="2" presetClass="entr" presetSubtype="4" fill="hold" grpId="0" nodeType="clickEffect">
+                                  <p:stCondLst>
+                                    <p:cond delay="0"/>
+                                  </p:stCondLst>
+                                  <p:childTnLst>
+                                    <p:set>
+                                      <p:cBhvr>
+                                        <p:cTn id="30" dur="1" fill="hold">
+                                          <p:stCondLst>
+                                            <p:cond delay="0"/>
+                                          </p:stCondLst>
+                                        </p:cTn>
+                                        <p:tgtEl>
+                                          <p:spTgt spid="31750">
+                                            <p:txEl>
+                                              <p:pRg st="4" end="4"/>
+                                            </p:txEl>
+                                          </p:spTgt>
+                                        </p:tgtEl>
+                                        <p:attrNameLst>
+                                          <p:attrName>style.visibility</p:attrName>
+                                        </p:attrNameLst>
+                                      </p:cBhvr>
+                                      <p:to>
+                                        <p:strVal val="visible"/>
+                                      </p:to>
+                                    </p:set>
+                                    <p:anim calcmode="lin" valueType="num">
+                                      <p:cBhvr additive="base">
+                                        <p:cTn id="31" dur="500" fill="hold"/>
+                                        <p:tgtEl>
+                                          <p:spTgt spid="31750">
+                                            <p:txEl>
+                                              <p:pRg st="4" end="4"/>
+                                            </p:txEl>
+                                          </p:spTgt>
+                                        </p:tgtEl>
+                                        <p:attrNameLst>
+                                          <p:attrName>ppt_x</p:attrName>
+                                        </p:attrNameLst>
+                                      </p:cBhvr>
+                                      <p:tavLst>
+                                        <p:tav tm="0">
+                                          <p:val>
+                                            <p:strVal val="#ppt_x"/>
+                                          </p:val>
+                                        </p:tav>
+                                        <p:tav tm="100000">
+                                          <p:val>
+                                            <p:strVal val="#ppt_x"/>
+                                          </p:val>
+                                        </p:tav>
+                                      </p:tavLst>
+                                    </p:anim>
+                                    <p:anim calcmode="lin" valueType="num">
+                                      <p:cBhvr additive="base">
+                                        <p:cTn id="32" dur="500" fill="hold"/>
+                                        <p:tgtEl>
+                                          <p:spTgt spid="31750">
+                                            <p:txEl>
+                                              <p:pRg st="4" end="4"/>
+                                            </p:txEl>
+                                          </p:spTgt>
+                                        </p:tgtEl>
+                                        <p:attrNameLst>
+                                          <p:attrName>ppt_y</p:attrName>
+                                        </p:attrNameLst>
+                                      </p:cBhvr>
+                                      <p:tavLst>
+                                        <p:tav tm="0">
+                                          <p:val>
+                                            <p:strVal val="1+#ppt_h/2"/>
+                                          </p:val>
+                                        </p:tav>
+                                        <p:tav tm="100000">
+                                          <p:val>
+                                            <p:strVal val="#ppt_y"/>
+                                          </p:val>
+                                        </p:tav>
+                                      </p:tavLst>
+                                    </p:anim>
+                                  </p:childTnLst>
+                                </p:cTn>
+                              </p:par>
+                            </p:childTnLst>
+                          </p:cTn>
+                        </p:par>
+                      </p:childTnLst>
+                    </p:cTn>
+                  </p:par>
+                  <p:par>
+                    <p:cTn id="33" fill="hold">
+                      <p:stCondLst>
+                        <p:cond delay="indefinite"/>
+                      </p:stCondLst>
+                      <p:childTnLst>
+                        <p:par>
+                          <p:cTn id="34" fill="hold">
+                            <p:stCondLst>
+                              <p:cond delay="0"/>
+                            </p:stCondLst>
+                            <p:childTnLst>
+                              <p:par>
+                                <p:cTn id="35" presetID="16" presetClass="entr" presetSubtype="21" fill="hold" nodeType="clickEffect">
+                                  <p:stCondLst>
+                                    <p:cond delay="0"/>
+                                  </p:stCondLst>
+                                  <p:childTnLst>
+                                    <p:set>
+                                      <p:cBhvr>
+                                        <p:cTn id="36" dur="1" fill="hold">
+                                          <p:stCondLst>
+                                            <p:cond delay="0"/>
+                                          </p:stCondLst>
+                                        </p:cTn>
+                                        <p:tgtEl>
+                                          <p:spTgt spid="1026"/>
+                                        </p:tgtEl>
+                                        <p:attrNameLst>
+                                          <p:attrName>style.visibility</p:attrName>
+                                        </p:attrNameLst>
+                                      </p:cBhvr>
+                                      <p:to>
+                                        <p:strVal val="visible"/>
+                                      </p:to>
+                                    </p:set>
+                                    <p:animEffect transition="in" filter="barn(inVertical)">
+                                      <p:cBhvr>
+                                        <p:cTn id="37" dur="500"/>
+                                        <p:tgtEl>
+                                          <p:spTgt spid="1026"/>
+                                        </p:tgtEl>
+                                      </p:cBhvr>
+                                    </p:animEffect>
+                                  </p:childTnLst>
+                                </p:cTn>
+                              </p:par>
+                            </p:childTnLst>
+                          </p:cTn>
+                        </p:par>
+                      </p:childTnLst>
+                    </p:cTn>
+                  </p:par>
+                </p:childTnLst>
+              </p:cTn>
+              <p:prevCondLst>
+                <p:cond evt="onPrev" delay="0">
+                  <p:tgtEl>
+                    <p:sldTgt/>
+                  </p:tgtEl>
+                </p:cond>
+              </p:prevCondLst>
+              <p:nextCondLst>
+                <p:cond evt="onNext" delay="0">
+                  <p:tgtEl>
+                    <p:sldTgt/>
+                  </p:tgtEl>
+                </p:cond>
+              </p:nextCondLst>
+            </p:seq>
+          </p:childTnLst>
+        </p:cTn>
       </p:par>
     </p:tnLst>
+    <p:bldLst>
+      <p:bldP spid="31750" grpId="0" build="p"/>
+    </p:bldLst>
   </p:timing>
 </p:sld>
 </file>
@@ -8953,9 +9703,14 @@
           <a:lstStyle/>
           <a:p>
             <a:r>
-              <a:rPr lang="en-US"/>
-              <a:t>Lesson 1: Wrap-up</a:t>
-            </a:r>
+              <a:rPr lang="en-US" dirty="0" smtClean="0"/>
+              <a:t>Dependency Injection &amp; </a:t>
+            </a:r>
+            <a:r>
+              <a:rPr lang="en-US" dirty="0" err="1" smtClean="0"/>
+              <a:t>IoC</a:t>
+            </a:r>
+            <a:endParaRPr lang="en-US" dirty="0"/>
           </a:p>
         </p:txBody>
       </p:sp>
@@ -8975,18 +9730,146 @@
           <a:lstStyle/>
           <a:p>
             <a:r>
-              <a:rPr lang="en-US"/>
-              <a:t>Summarize important points.</a:t>
-            </a:r>
-          </a:p>
-          <a:p>
-            <a:r>
-              <a:rPr lang="en-US"/>
-              <a:t>Allow time for questions.</a:t>
-            </a:r>
-          </a:p>
-        </p:txBody>
-      </p:sp>
+              <a:rPr lang="en-US" dirty="0" smtClean="0"/>
+              <a:t>Classes depends on other classes for their functionalities to achieve. (E.g.</a:t>
+            </a:r>
+            <a:r>
+              <a:rPr lang="en-US" dirty="0" smtClean="0"/>
+              <a:t> Employee depends on Salary. Employee  creates concrete object of Salary.)</a:t>
+            </a:r>
+          </a:p>
+          <a:p>
+            <a:r>
+              <a:rPr lang="en-US" dirty="0"/>
+              <a:t>The Dependency injection says that components that depend on each other should interact via an abstraction and not directly with a concrete implementation</a:t>
+            </a:r>
+            <a:r>
+              <a:rPr lang="en-US" dirty="0" smtClean="0"/>
+              <a:t>.</a:t>
+            </a:r>
+          </a:p>
+          <a:p>
+            <a:pPr marL="0" indent="0">
+              <a:buNone/>
+            </a:pPr>
+            <a:endParaRPr lang="en-US" dirty="0" smtClean="0"/>
+          </a:p>
+          <a:p>
+            <a:pPr marL="0" indent="0">
+              <a:buNone/>
+            </a:pPr>
+            <a:endParaRPr lang="en-US" dirty="0"/>
+          </a:p>
+        </p:txBody>
+      </p:sp>
+      <p:pic>
+        <p:nvPicPr>
+          <p:cNvPr id="2050" name="Picture 2"/>
+          <p:cNvPicPr>
+            <a:picLocks noChangeAspect="1" noChangeArrowheads="1"/>
+          </p:cNvPicPr>
+          <p:nvPr/>
+        </p:nvPicPr>
+        <p:blipFill>
+          <a:blip r:embed="rId2">
+            <a:extLst>
+              <a:ext uri="{28A0092B-C50C-407E-A947-70E740481C1C}">
+                <a14:useLocalDpi xmlns:a14="http://schemas.microsoft.com/office/drawing/2010/main" val="0"/>
+              </a:ext>
+            </a:extLst>
+          </a:blip>
+          <a:srcRect/>
+          <a:stretch>
+            <a:fillRect/>
+          </a:stretch>
+        </p:blipFill>
+        <p:spPr bwMode="auto">
+          <a:xfrm>
+            <a:off x="-4953000" y="3814762"/>
+            <a:ext cx="7086600" cy="4419600"/>
+          </a:xfrm>
+          <a:prstGeom prst="rect">
+            <a:avLst/>
+          </a:prstGeom>
+          <a:noFill/>
+          <a:ln>
+            <a:noFill/>
+          </a:ln>
+          <a:extLst>
+            <a:ext uri="{909E8E84-426E-40DD-AFC4-6F175D3DCCD1}">
+              <a14:hiddenFill xmlns:a14="http://schemas.microsoft.com/office/drawing/2010/main">
+                <a:solidFill>
+                  <a:schemeClr val="accent1"/>
+                </a:solidFill>
+              </a14:hiddenFill>
+            </a:ext>
+            <a:ext uri="{91240B29-F687-4F45-9708-019B960494DF}">
+              <a14:hiddenLine xmlns:a14="http://schemas.microsoft.com/office/drawing/2010/main" w="9525">
+                <a:solidFill>
+                  <a:schemeClr val="tx1"/>
+                </a:solidFill>
+                <a:miter lim="800000"/>
+                <a:headEnd/>
+                <a:tailEnd/>
+              </a14:hiddenLine>
+            </a:ext>
+          </a:extLst>
+        </p:spPr>
+      </p:pic>
+      <p:pic>
+        <p:nvPicPr>
+          <p:cNvPr id="2051" name="Picture 3"/>
+          <p:cNvPicPr>
+            <a:picLocks noChangeAspect="1" noChangeArrowheads="1"/>
+          </p:cNvPicPr>
+          <p:nvPr/>
+        </p:nvPicPr>
+        <p:blipFill>
+          <a:blip r:embed="rId3">
+            <a:extLst>
+              <a:ext uri="{28A0092B-C50C-407E-A947-70E740481C1C}">
+                <a14:useLocalDpi xmlns:a14="http://schemas.microsoft.com/office/drawing/2010/main" val="0"/>
+              </a:ext>
+            </a:extLst>
+          </a:blip>
+          <a:srcRect/>
+          <a:stretch>
+            <a:fillRect/>
+          </a:stretch>
+        </p:blipFill>
+        <p:spPr bwMode="auto">
+          <a:xfrm>
+            <a:off x="6858000" y="2971800"/>
+            <a:ext cx="7162800" cy="6105525"/>
+          </a:xfrm>
+          <a:prstGeom prst="rect">
+            <a:avLst/>
+          </a:prstGeom>
+          <a:noFill/>
+          <a:ln>
+            <a:noFill/>
+          </a:ln>
+          <a:extLst>
+            <a:ext uri="{909E8E84-426E-40DD-AFC4-6F175D3DCCD1}">
+              <a14:hiddenFill xmlns:a14="http://schemas.microsoft.com/office/drawing/2010/main">
+                <a:solidFill>
+                  <a:schemeClr val="accent1"/>
+                </a:solidFill>
+              </a14:hiddenFill>
+            </a:ext>
+            <a:ext uri="{91240B29-F687-4F45-9708-019B960494DF}">
+              <a14:hiddenLine xmlns:a14="http://schemas.microsoft.com/office/drawing/2010/main" w="9525">
+                <a:solidFill>
+                  <a:schemeClr val="tx1"/>
+                </a:solidFill>
+                <a:miter lim="800000"/>
+                <a:headEnd/>
+                <a:tailEnd/>
+              </a14:hiddenLine>
+            </a:ext>
+          </a:extLst>
+        </p:spPr>
+      </p:pic>
     </p:spTree>
   </p:cSld>
   <p:clrMapOvr>

</xml_diff>

<commit_message>
PPT changes and minor code refactoring
</commit_message>
<xml_diff>
--- a/QTec/Presentation.pptx
+++ b/QTec/Presentation.pptx
@@ -5,7 +5,7 @@
     <p:sldMasterId id="2147483663" r:id="rId2"/>
   </p:sldMasterIdLst>
   <p:notesMasterIdLst>
-    <p:notesMasterId r:id="rId17"/>
+    <p:notesMasterId r:id="rId14"/>
   </p:notesMasterIdLst>
   <p:sldIdLst>
     <p:sldId id="256" r:id="rId3"/>
@@ -17,11 +17,8 @@
     <p:sldId id="268" r:id="rId9"/>
     <p:sldId id="261" r:id="rId10"/>
     <p:sldId id="265" r:id="rId11"/>
-    <p:sldId id="269" r:id="rId12"/>
-    <p:sldId id="262" r:id="rId13"/>
-    <p:sldId id="266" r:id="rId14"/>
-    <p:sldId id="263" r:id="rId15"/>
-    <p:sldId id="267" r:id="rId16"/>
+    <p:sldId id="266" r:id="rId12"/>
+    <p:sldId id="263" r:id="rId13"/>
   </p:sldIdLst>
   <p:sldSz cx="9144000" cy="6858000" type="screen4x3"/>
   <p:notesSz cx="6997700" cy="9283700"/>
@@ -5269,211 +5266,6 @@
       </p:grpSpPr>
       <p:sp>
         <p:nvSpPr>
-          <p:cNvPr id="44034" name="Rectangle 2"/>
-          <p:cNvSpPr>
-            <a:spLocks noGrp="1" noChangeArrowheads="1"/>
-          </p:cNvSpPr>
-          <p:nvPr>
-            <p:ph type="ctrTitle"/>
-          </p:nvPr>
-        </p:nvSpPr>
-        <p:spPr/>
-        <p:txBody>
-          <a:bodyPr/>
-          <a:lstStyle/>
-          <a:p>
-            <a:r>
-              <a:rPr lang="en-US" dirty="0"/>
-              <a:t>Lesson 3: Objectives</a:t>
-            </a:r>
-          </a:p>
-        </p:txBody>
-      </p:sp>
-      <p:sp>
-        <p:nvSpPr>
-          <p:cNvPr id="44035" name="Rectangle 3"/>
-          <p:cNvSpPr>
-            <a:spLocks noGrp="1" noChangeArrowheads="1"/>
-          </p:cNvSpPr>
-          <p:nvPr>
-            <p:ph type="subTitle" idx="1"/>
-          </p:nvPr>
-        </p:nvSpPr>
-        <p:spPr/>
-        <p:txBody>
-          <a:bodyPr/>
-          <a:lstStyle/>
-          <a:p>
-            <a:r>
-              <a:rPr lang="en-US" dirty="0"/>
-              <a:t>List the intended outcomes for this training session.</a:t>
-            </a:r>
-          </a:p>
-          <a:p>
-            <a:r>
-              <a:rPr lang="en-US" dirty="0"/>
-              <a:t>Each objective should be concise, should contain a verb, and should have a measurable result.</a:t>
-            </a:r>
-          </a:p>
-        </p:txBody>
-      </p:sp>
-    </p:spTree>
-  </p:cSld>
-  <p:clrMapOvr>
-    <a:masterClrMapping/>
-  </p:clrMapOvr>
-  <p:timing>
-    <p:tnLst>
-      <p:par>
-        <p:cTn id="1" dur="indefinite" restart="never" nodeType="tmRoot"/>
-      </p:par>
-    </p:tnLst>
-  </p:timing>
-</p:sld>
-</file>
-
-<file path=ppt/slides/slide11.xml><?xml version="1.0" encoding="utf-8"?>
-<p:sld xmlns:a="http://schemas.openxmlformats.org/drawingml/2006/main" xmlns:r="http://schemas.openxmlformats.org/officeDocument/2006/relationships" xmlns:p="http://schemas.openxmlformats.org/presentationml/2006/main">
-  <p:cSld>
-    <p:spTree>
-      <p:nvGrpSpPr>
-        <p:cNvPr id="1" name=""/>
-        <p:cNvGrpSpPr/>
-        <p:nvPr/>
-      </p:nvGrpSpPr>
-      <p:grpSpPr>
-        <a:xfrm>
-          <a:off x="0" y="0"/>
-          <a:ext cx="0" cy="0"/>
-          <a:chOff x="0" y="0"/>
-          <a:chExt cx="0" cy="0"/>
-        </a:xfrm>
-      </p:grpSpPr>
-      <p:sp>
-        <p:nvSpPr>
-          <p:cNvPr id="36866" name="Rectangle 2"/>
-          <p:cNvSpPr>
-            <a:spLocks noGrp="1" noChangeArrowheads="1"/>
-          </p:cNvSpPr>
-          <p:nvPr>
-            <p:ph type="title"/>
-          </p:nvPr>
-        </p:nvSpPr>
-        <p:spPr/>
-        <p:txBody>
-          <a:bodyPr/>
-          <a:lstStyle/>
-          <a:p>
-            <a:r>
-              <a:rPr lang="en-US"/>
-              <a:t>Lesson 3: Content</a:t>
-            </a:r>
-          </a:p>
-        </p:txBody>
-      </p:sp>
-      <p:sp>
-        <p:nvSpPr>
-          <p:cNvPr id="36867" name="Rectangle 3"/>
-          <p:cNvSpPr>
-            <a:spLocks noGrp="1" noChangeArrowheads="1"/>
-          </p:cNvSpPr>
-          <p:nvPr>
-            <p:ph type="body" sz="half" idx="1"/>
-          </p:nvPr>
-        </p:nvSpPr>
-        <p:spPr/>
-        <p:txBody>
-          <a:bodyPr/>
-          <a:lstStyle/>
-          <a:p>
-            <a:r>
-              <a:rPr lang="en-US" sz="2600"/>
-              <a:t>Add text here. </a:t>
-            </a:r>
-          </a:p>
-          <a:p>
-            <a:r>
-              <a:rPr lang="en-US" sz="2600"/>
-              <a:t>To add a picture, chart, or other content in the right column, click the appropriate icon.</a:t>
-            </a:r>
-          </a:p>
-          <a:p>
-            <a:r>
-              <a:rPr lang="en-US" sz="2600"/>
-              <a:t>To add a slide, click </a:t>
-            </a:r>
-            <a:r>
-              <a:rPr lang="en-US" sz="2600" b="1"/>
-              <a:t>New Slide</a:t>
-            </a:r>
-            <a:r>
-              <a:rPr lang="en-US" sz="2600"/>
-              <a:t> on the </a:t>
-            </a:r>
-            <a:r>
-              <a:rPr lang="en-US" sz="2600" b="1"/>
-              <a:t>Insert</a:t>
-            </a:r>
-            <a:r>
-              <a:rPr lang="en-US" sz="2600"/>
-              <a:t> menu, or press CTRL+M.</a:t>
-            </a:r>
-          </a:p>
-        </p:txBody>
-      </p:sp>
-      <p:sp>
-        <p:nvSpPr>
-          <p:cNvPr id="36868" name="Rectangle 4"/>
-          <p:cNvSpPr>
-            <a:spLocks noGrp="1" noChangeArrowheads="1"/>
-          </p:cNvSpPr>
-          <p:nvPr>
-            <p:ph sz="half" idx="2"/>
-          </p:nvPr>
-        </p:nvSpPr>
-        <p:spPr/>
-        <p:txBody>
-          <a:bodyPr/>
-          <a:lstStyle/>
-          <a:p>
-            <a:endParaRPr lang="en-US" sz="2200"/>
-          </a:p>
-        </p:txBody>
-      </p:sp>
-    </p:spTree>
-  </p:cSld>
-  <p:clrMapOvr>
-    <a:masterClrMapping/>
-  </p:clrMapOvr>
-  <p:timing>
-    <p:tnLst>
-      <p:par>
-        <p:cTn id="1" dur="indefinite" restart="never" nodeType="tmRoot"/>
-      </p:par>
-    </p:tnLst>
-  </p:timing>
-</p:sld>
-</file>
-
-<file path=ppt/slides/slide12.xml><?xml version="1.0" encoding="utf-8"?>
-<p:sld xmlns:a="http://schemas.openxmlformats.org/drawingml/2006/main" xmlns:r="http://schemas.openxmlformats.org/officeDocument/2006/relationships" xmlns:p="http://schemas.openxmlformats.org/presentationml/2006/main">
-  <p:cSld>
-    <p:spTree>
-      <p:nvGrpSpPr>
-        <p:cNvPr id="1" name=""/>
-        <p:cNvGrpSpPr/>
-        <p:nvPr/>
-      </p:nvGrpSpPr>
-      <p:grpSpPr>
-        <a:xfrm>
-          <a:off x="0" y="0"/>
-          <a:ext cx="0" cy="0"/>
-          <a:chOff x="0" y="0"/>
-          <a:chExt cx="0" cy="0"/>
-        </a:xfrm>
-      </p:grpSpPr>
-      <p:sp>
-        <p:nvSpPr>
           <p:cNvPr id="40962" name="Rectangle 2"/>
           <p:cNvSpPr>
             <a:spLocks noGrp="1" noChangeArrowheads="1"/>
@@ -5488,9 +5280,10 @@
           <a:lstStyle/>
           <a:p>
             <a:r>
-              <a:rPr lang="en-US"/>
-              <a:t>Lesson 3: Wrap-up</a:t>
-            </a:r>
+              <a:rPr lang="en-US" dirty="0" smtClean="0"/>
+              <a:t>Auto mapper</a:t>
+            </a:r>
+            <a:endParaRPr lang="en-US" dirty="0"/>
           </a:p>
         </p:txBody>
       </p:sp>
@@ -5510,15 +5303,53 @@
           <a:lstStyle/>
           <a:p>
             <a:r>
-              <a:rPr lang="en-US"/>
-              <a:t>Summarize important points.</a:t>
-            </a:r>
-          </a:p>
-          <a:p>
-            <a:r>
-              <a:rPr lang="en-US"/>
-              <a:t>Allow time for questions.</a:t>
-            </a:r>
+              <a:rPr lang="en-US" dirty="0" smtClean="0"/>
+              <a:t>A </a:t>
+            </a:r>
+            <a:r>
+              <a:rPr lang="en-US" dirty="0" err="1" smtClean="0"/>
+              <a:t>.net</a:t>
+            </a:r>
+            <a:r>
+              <a:rPr lang="en-US" dirty="0" smtClean="0"/>
+              <a:t> library to map the properties of two objects.</a:t>
+            </a:r>
+            <a:endParaRPr lang="en-US" dirty="0"/>
+          </a:p>
+          <a:p>
+            <a:r>
+              <a:rPr lang="en-US" dirty="0" smtClean="0"/>
+              <a:t>Mapping is based on the naming convention.</a:t>
+            </a:r>
+          </a:p>
+          <a:p>
+            <a:r>
+              <a:rPr lang="en-US" dirty="0" smtClean="0"/>
+              <a:t>Can be extensively utilized to map </a:t>
+            </a:r>
+            <a:r>
+              <a:rPr lang="en-US" dirty="0" err="1" smtClean="0"/>
+              <a:t>ViewModel</a:t>
+            </a:r>
+            <a:r>
+              <a:rPr lang="en-US" dirty="0"/>
+              <a:t> </a:t>
+            </a:r>
+            <a:r>
+              <a:rPr lang="en-US" dirty="0" smtClean="0"/>
+              <a:t>to Model and vice versa.</a:t>
+            </a:r>
+          </a:p>
+          <a:p>
+            <a:r>
+              <a:rPr lang="en-US" dirty="0" err="1" smtClean="0"/>
+              <a:t>Api</a:t>
+            </a:r>
+            <a:r>
+              <a:rPr lang="en-US" dirty="0" smtClean="0"/>
+              <a:t> available to define your custom convention.</a:t>
+            </a:r>
+            <a:endParaRPr lang="en-US" dirty="0"/>
           </a:p>
         </p:txBody>
       </p:sp>
@@ -5530,14 +5361,452 @@
   <p:timing>
     <p:tnLst>
       <p:par>
-        <p:cTn id="1" dur="indefinite" restart="never" nodeType="tmRoot"/>
+        <p:cTn id="1" dur="indefinite" restart="never" nodeType="tmRoot">
+          <p:childTnLst>
+            <p:seq concurrent="1" nextAc="seek">
+              <p:cTn id="2" dur="indefinite" nodeType="mainSeq">
+                <p:childTnLst>
+                  <p:par>
+                    <p:cTn id="3" fill="hold">
+                      <p:stCondLst>
+                        <p:cond delay="indefinite"/>
+                      </p:stCondLst>
+                      <p:childTnLst>
+                        <p:par>
+                          <p:cTn id="4" fill="hold">
+                            <p:stCondLst>
+                              <p:cond delay="0"/>
+                            </p:stCondLst>
+                            <p:childTnLst>
+                              <p:par>
+                                <p:cTn id="5" presetID="2" presetClass="entr" presetSubtype="4" fill="hold" grpId="0" nodeType="clickEffect">
+                                  <p:stCondLst>
+                                    <p:cond delay="0"/>
+                                  </p:stCondLst>
+                                  <p:childTnLst>
+                                    <p:set>
+                                      <p:cBhvr>
+                                        <p:cTn id="6" dur="1" fill="hold">
+                                          <p:stCondLst>
+                                            <p:cond delay="0"/>
+                                          </p:stCondLst>
+                                        </p:cTn>
+                                        <p:tgtEl>
+                                          <p:spTgt spid="40963">
+                                            <p:txEl>
+                                              <p:pRg st="0" end="0"/>
+                                            </p:txEl>
+                                          </p:spTgt>
+                                        </p:tgtEl>
+                                        <p:attrNameLst>
+                                          <p:attrName>style.visibility</p:attrName>
+                                        </p:attrNameLst>
+                                      </p:cBhvr>
+                                      <p:to>
+                                        <p:strVal val="visible"/>
+                                      </p:to>
+                                    </p:set>
+                                    <p:anim calcmode="lin" valueType="num">
+                                      <p:cBhvr additive="base">
+                                        <p:cTn id="7" dur="500" fill="hold"/>
+                                        <p:tgtEl>
+                                          <p:spTgt spid="40963">
+                                            <p:txEl>
+                                              <p:pRg st="0" end="0"/>
+                                            </p:txEl>
+                                          </p:spTgt>
+                                        </p:tgtEl>
+                                        <p:attrNameLst>
+                                          <p:attrName>ppt_x</p:attrName>
+                                        </p:attrNameLst>
+                                      </p:cBhvr>
+                                      <p:tavLst>
+                                        <p:tav tm="0">
+                                          <p:val>
+                                            <p:strVal val="#ppt_x"/>
+                                          </p:val>
+                                        </p:tav>
+                                        <p:tav tm="100000">
+                                          <p:val>
+                                            <p:strVal val="#ppt_x"/>
+                                          </p:val>
+                                        </p:tav>
+                                      </p:tavLst>
+                                    </p:anim>
+                                    <p:anim calcmode="lin" valueType="num">
+                                      <p:cBhvr additive="base">
+                                        <p:cTn id="8" dur="500" fill="hold"/>
+                                        <p:tgtEl>
+                                          <p:spTgt spid="40963">
+                                            <p:txEl>
+                                              <p:pRg st="0" end="0"/>
+                                            </p:txEl>
+                                          </p:spTgt>
+                                        </p:tgtEl>
+                                        <p:attrNameLst>
+                                          <p:attrName>ppt_y</p:attrName>
+                                        </p:attrNameLst>
+                                      </p:cBhvr>
+                                      <p:tavLst>
+                                        <p:tav tm="0">
+                                          <p:val>
+                                            <p:strVal val="1+#ppt_h/2"/>
+                                          </p:val>
+                                        </p:tav>
+                                        <p:tav tm="100000">
+                                          <p:val>
+                                            <p:strVal val="#ppt_y"/>
+                                          </p:val>
+                                        </p:tav>
+                                      </p:tavLst>
+                                    </p:anim>
+                                  </p:childTnLst>
+                                </p:cTn>
+                              </p:par>
+                            </p:childTnLst>
+                          </p:cTn>
+                        </p:par>
+                      </p:childTnLst>
+                    </p:cTn>
+                  </p:par>
+                  <p:par>
+                    <p:cTn id="9" fill="hold">
+                      <p:stCondLst>
+                        <p:cond delay="indefinite"/>
+                      </p:stCondLst>
+                      <p:childTnLst>
+                        <p:par>
+                          <p:cTn id="10" fill="hold">
+                            <p:stCondLst>
+                              <p:cond delay="0"/>
+                            </p:stCondLst>
+                            <p:childTnLst>
+                              <p:par>
+                                <p:cTn id="11" presetID="2" presetClass="entr" presetSubtype="4" fill="hold" grpId="0" nodeType="clickEffect">
+                                  <p:stCondLst>
+                                    <p:cond delay="0"/>
+                                  </p:stCondLst>
+                                  <p:childTnLst>
+                                    <p:set>
+                                      <p:cBhvr>
+                                        <p:cTn id="12" dur="1" fill="hold">
+                                          <p:stCondLst>
+                                            <p:cond delay="0"/>
+                                          </p:stCondLst>
+                                        </p:cTn>
+                                        <p:tgtEl>
+                                          <p:spTgt spid="40963">
+                                            <p:txEl>
+                                              <p:pRg st="1" end="1"/>
+                                            </p:txEl>
+                                          </p:spTgt>
+                                        </p:tgtEl>
+                                        <p:attrNameLst>
+                                          <p:attrName>style.visibility</p:attrName>
+                                        </p:attrNameLst>
+                                      </p:cBhvr>
+                                      <p:to>
+                                        <p:strVal val="visible"/>
+                                      </p:to>
+                                    </p:set>
+                                    <p:anim calcmode="lin" valueType="num">
+                                      <p:cBhvr additive="base">
+                                        <p:cTn id="13" dur="500" fill="hold"/>
+                                        <p:tgtEl>
+                                          <p:spTgt spid="40963">
+                                            <p:txEl>
+                                              <p:pRg st="1" end="1"/>
+                                            </p:txEl>
+                                          </p:spTgt>
+                                        </p:tgtEl>
+                                        <p:attrNameLst>
+                                          <p:attrName>ppt_x</p:attrName>
+                                        </p:attrNameLst>
+                                      </p:cBhvr>
+                                      <p:tavLst>
+                                        <p:tav tm="0">
+                                          <p:val>
+                                            <p:strVal val="#ppt_x"/>
+                                          </p:val>
+                                        </p:tav>
+                                        <p:tav tm="100000">
+                                          <p:val>
+                                            <p:strVal val="#ppt_x"/>
+                                          </p:val>
+                                        </p:tav>
+                                      </p:tavLst>
+                                    </p:anim>
+                                    <p:anim calcmode="lin" valueType="num">
+                                      <p:cBhvr additive="base">
+                                        <p:cTn id="14" dur="500" fill="hold"/>
+                                        <p:tgtEl>
+                                          <p:spTgt spid="40963">
+                                            <p:txEl>
+                                              <p:pRg st="1" end="1"/>
+                                            </p:txEl>
+                                          </p:spTgt>
+                                        </p:tgtEl>
+                                        <p:attrNameLst>
+                                          <p:attrName>ppt_y</p:attrName>
+                                        </p:attrNameLst>
+                                      </p:cBhvr>
+                                      <p:tavLst>
+                                        <p:tav tm="0">
+                                          <p:val>
+                                            <p:strVal val="1+#ppt_h/2"/>
+                                          </p:val>
+                                        </p:tav>
+                                        <p:tav tm="100000">
+                                          <p:val>
+                                            <p:strVal val="#ppt_y"/>
+                                          </p:val>
+                                        </p:tav>
+                                      </p:tavLst>
+                                    </p:anim>
+                                  </p:childTnLst>
+                                </p:cTn>
+                              </p:par>
+                            </p:childTnLst>
+                          </p:cTn>
+                        </p:par>
+                      </p:childTnLst>
+                    </p:cTn>
+                  </p:par>
+                  <p:par>
+                    <p:cTn id="15" fill="hold">
+                      <p:stCondLst>
+                        <p:cond delay="indefinite"/>
+                      </p:stCondLst>
+                      <p:childTnLst>
+                        <p:par>
+                          <p:cTn id="16" fill="hold">
+                            <p:stCondLst>
+                              <p:cond delay="0"/>
+                            </p:stCondLst>
+                            <p:childTnLst>
+                              <p:par>
+                                <p:cTn id="17" presetID="2" presetClass="entr" presetSubtype="4" fill="hold" grpId="0" nodeType="clickEffect">
+                                  <p:stCondLst>
+                                    <p:cond delay="0"/>
+                                  </p:stCondLst>
+                                  <p:childTnLst>
+                                    <p:set>
+                                      <p:cBhvr>
+                                        <p:cTn id="18" dur="1" fill="hold">
+                                          <p:stCondLst>
+                                            <p:cond delay="0"/>
+                                          </p:stCondLst>
+                                        </p:cTn>
+                                        <p:tgtEl>
+                                          <p:spTgt spid="40963">
+                                            <p:txEl>
+                                              <p:pRg st="2" end="2"/>
+                                            </p:txEl>
+                                          </p:spTgt>
+                                        </p:tgtEl>
+                                        <p:attrNameLst>
+                                          <p:attrName>style.visibility</p:attrName>
+                                        </p:attrNameLst>
+                                      </p:cBhvr>
+                                      <p:to>
+                                        <p:strVal val="visible"/>
+                                      </p:to>
+                                    </p:set>
+                                    <p:anim calcmode="lin" valueType="num">
+                                      <p:cBhvr additive="base">
+                                        <p:cTn id="19" dur="500" fill="hold"/>
+                                        <p:tgtEl>
+                                          <p:spTgt spid="40963">
+                                            <p:txEl>
+                                              <p:pRg st="2" end="2"/>
+                                            </p:txEl>
+                                          </p:spTgt>
+                                        </p:tgtEl>
+                                        <p:attrNameLst>
+                                          <p:attrName>ppt_x</p:attrName>
+                                        </p:attrNameLst>
+                                      </p:cBhvr>
+                                      <p:tavLst>
+                                        <p:tav tm="0">
+                                          <p:val>
+                                            <p:strVal val="#ppt_x"/>
+                                          </p:val>
+                                        </p:tav>
+                                        <p:tav tm="100000">
+                                          <p:val>
+                                            <p:strVal val="#ppt_x"/>
+                                          </p:val>
+                                        </p:tav>
+                                      </p:tavLst>
+                                    </p:anim>
+                                    <p:anim calcmode="lin" valueType="num">
+                                      <p:cBhvr additive="base">
+                                        <p:cTn id="20" dur="500" fill="hold"/>
+                                        <p:tgtEl>
+                                          <p:spTgt spid="40963">
+                                            <p:txEl>
+                                              <p:pRg st="2" end="2"/>
+                                            </p:txEl>
+                                          </p:spTgt>
+                                        </p:tgtEl>
+                                        <p:attrNameLst>
+                                          <p:attrName>ppt_y</p:attrName>
+                                        </p:attrNameLst>
+                                      </p:cBhvr>
+                                      <p:tavLst>
+                                        <p:tav tm="0">
+                                          <p:val>
+                                            <p:strVal val="1+#ppt_h/2"/>
+                                          </p:val>
+                                        </p:tav>
+                                        <p:tav tm="100000">
+                                          <p:val>
+                                            <p:strVal val="#ppt_y"/>
+                                          </p:val>
+                                        </p:tav>
+                                      </p:tavLst>
+                                    </p:anim>
+                                  </p:childTnLst>
+                                </p:cTn>
+                              </p:par>
+                            </p:childTnLst>
+                          </p:cTn>
+                        </p:par>
+                      </p:childTnLst>
+                    </p:cTn>
+                  </p:par>
+                  <p:par>
+                    <p:cTn id="21" fill="hold">
+                      <p:stCondLst>
+                        <p:cond delay="indefinite"/>
+                      </p:stCondLst>
+                      <p:childTnLst>
+                        <p:par>
+                          <p:cTn id="22" fill="hold">
+                            <p:stCondLst>
+                              <p:cond delay="0"/>
+                            </p:stCondLst>
+                            <p:childTnLst>
+                              <p:par>
+                                <p:cTn id="23" presetID="2" presetClass="entr" presetSubtype="4" fill="hold" grpId="0" nodeType="clickEffect">
+                                  <p:stCondLst>
+                                    <p:cond delay="0"/>
+                                  </p:stCondLst>
+                                  <p:childTnLst>
+                                    <p:set>
+                                      <p:cBhvr>
+                                        <p:cTn id="24" dur="1" fill="hold">
+                                          <p:stCondLst>
+                                            <p:cond delay="0"/>
+                                          </p:stCondLst>
+                                        </p:cTn>
+                                        <p:tgtEl>
+                                          <p:spTgt spid="40963">
+                                            <p:txEl>
+                                              <p:pRg st="3" end="3"/>
+                                            </p:txEl>
+                                          </p:spTgt>
+                                        </p:tgtEl>
+                                        <p:attrNameLst>
+                                          <p:attrName>style.visibility</p:attrName>
+                                        </p:attrNameLst>
+                                      </p:cBhvr>
+                                      <p:to>
+                                        <p:strVal val="visible"/>
+                                      </p:to>
+                                    </p:set>
+                                    <p:anim calcmode="lin" valueType="num">
+                                      <p:cBhvr additive="base">
+                                        <p:cTn id="25" dur="500" fill="hold"/>
+                                        <p:tgtEl>
+                                          <p:spTgt spid="40963">
+                                            <p:txEl>
+                                              <p:pRg st="3" end="3"/>
+                                            </p:txEl>
+                                          </p:spTgt>
+                                        </p:tgtEl>
+                                        <p:attrNameLst>
+                                          <p:attrName>ppt_x</p:attrName>
+                                        </p:attrNameLst>
+                                      </p:cBhvr>
+                                      <p:tavLst>
+                                        <p:tav tm="0">
+                                          <p:val>
+                                            <p:strVal val="#ppt_x"/>
+                                          </p:val>
+                                        </p:tav>
+                                        <p:tav tm="100000">
+                                          <p:val>
+                                            <p:strVal val="#ppt_x"/>
+                                          </p:val>
+                                        </p:tav>
+                                      </p:tavLst>
+                                    </p:anim>
+                                    <p:anim calcmode="lin" valueType="num">
+                                      <p:cBhvr additive="base">
+                                        <p:cTn id="26" dur="500" fill="hold"/>
+                                        <p:tgtEl>
+                                          <p:spTgt spid="40963">
+                                            <p:txEl>
+                                              <p:pRg st="3" end="3"/>
+                                            </p:txEl>
+                                          </p:spTgt>
+                                        </p:tgtEl>
+                                        <p:attrNameLst>
+                                          <p:attrName>ppt_y</p:attrName>
+                                        </p:attrNameLst>
+                                      </p:cBhvr>
+                                      <p:tavLst>
+                                        <p:tav tm="0">
+                                          <p:val>
+                                            <p:strVal val="1+#ppt_h/2"/>
+                                          </p:val>
+                                        </p:tav>
+                                        <p:tav tm="100000">
+                                          <p:val>
+                                            <p:strVal val="#ppt_y"/>
+                                          </p:val>
+                                        </p:tav>
+                                      </p:tavLst>
+                                    </p:anim>
+                                  </p:childTnLst>
+                                </p:cTn>
+                              </p:par>
+                            </p:childTnLst>
+                          </p:cTn>
+                        </p:par>
+                      </p:childTnLst>
+                    </p:cTn>
+                  </p:par>
+                </p:childTnLst>
+              </p:cTn>
+              <p:prevCondLst>
+                <p:cond evt="onPrev" delay="0">
+                  <p:tgtEl>
+                    <p:sldTgt/>
+                  </p:tgtEl>
+                </p:cond>
+              </p:prevCondLst>
+              <p:nextCondLst>
+                <p:cond evt="onNext" delay="0">
+                  <p:tgtEl>
+                    <p:sldTgt/>
+                  </p:tgtEl>
+                </p:cond>
+              </p:nextCondLst>
+            </p:seq>
+          </p:childTnLst>
+        </p:cTn>
       </p:par>
     </p:tnLst>
+    <p:bldLst>
+      <p:bldP spid="40963" grpId="0" build="p"/>
+    </p:bldLst>
   </p:timing>
 </p:sld>
 </file>
 
-<file path=ppt/slides/slide13.xml><?xml version="1.0" encoding="utf-8"?>
+<file path=ppt/slides/slide11.xml><?xml version="1.0" encoding="utf-8"?>
 <p:sld xmlns:a="http://schemas.openxmlformats.org/drawingml/2006/main" xmlns:r="http://schemas.openxmlformats.org/officeDocument/2006/relationships" xmlns:p="http://schemas.openxmlformats.org/presentationml/2006/main">
   <p:cSld>
     <p:spTree>
@@ -5570,9 +5839,10 @@
           <a:lstStyle/>
           <a:p>
             <a:r>
-              <a:rPr lang="en-US"/>
-              <a:t>Summary of Training</a:t>
-            </a:r>
+              <a:rPr lang="en-US" smtClean="0"/>
+              <a:t>Questions</a:t>
+            </a:r>
+            <a:endParaRPr lang="en-US" dirty="0"/>
           </a:p>
         </p:txBody>
       </p:sp>
@@ -5591,115 +5861,10 @@
           <a:bodyPr/>
           <a:lstStyle/>
           <a:p>
-            <a:r>
-              <a:rPr lang="en-US"/>
-              <a:t>List important points from each lesson.</a:t>
-            </a:r>
-          </a:p>
-          <a:p>
-            <a:r>
-              <a:rPr lang="en-US"/>
-              <a:t>Provide resources for more information on subject.</a:t>
-            </a:r>
-          </a:p>
-          <a:p>
-            <a:pPr lvl="1"/>
-            <a:r>
-              <a:rPr lang="en-US"/>
-              <a:t>List resources on this slide.</a:t>
-            </a:r>
-          </a:p>
-          <a:p>
-            <a:pPr lvl="1"/>
-            <a:r>
-              <a:rPr lang="en-US"/>
-              <a:t>Provide handouts with additional resource material.</a:t>
-            </a:r>
-          </a:p>
-        </p:txBody>
-      </p:sp>
-    </p:spTree>
-  </p:cSld>
-  <p:clrMapOvr>
-    <a:masterClrMapping/>
-  </p:clrMapOvr>
-  <p:timing>
-    <p:tnLst>
-      <p:par>
-        <p:cTn id="1" dur="indefinite" restart="never" nodeType="tmRoot"/>
-      </p:par>
-    </p:tnLst>
-  </p:timing>
-</p:sld>
-</file>
-
-<file path=ppt/slides/slide14.xml><?xml version="1.0" encoding="utf-8"?>
-<p:sld xmlns:a="http://schemas.openxmlformats.org/drawingml/2006/main" xmlns:r="http://schemas.openxmlformats.org/officeDocument/2006/relationships" xmlns:p="http://schemas.openxmlformats.org/presentationml/2006/main">
-  <p:cSld>
-    <p:spTree>
-      <p:nvGrpSpPr>
-        <p:cNvPr id="1" name=""/>
-        <p:cNvGrpSpPr/>
-        <p:nvPr/>
-      </p:nvGrpSpPr>
-      <p:grpSpPr>
-        <a:xfrm>
-          <a:off x="0" y="0"/>
-          <a:ext cx="0" cy="0"/>
-          <a:chOff x="0" y="0"/>
-          <a:chExt cx="0" cy="0"/>
-        </a:xfrm>
-      </p:grpSpPr>
-      <p:sp>
-        <p:nvSpPr>
-          <p:cNvPr id="41986" name="Rectangle 2"/>
-          <p:cNvSpPr>
-            <a:spLocks noGrp="1" noChangeArrowheads="1"/>
-          </p:cNvSpPr>
-          <p:nvPr>
-            <p:ph type="title"/>
-          </p:nvPr>
-        </p:nvSpPr>
-        <p:spPr/>
-        <p:txBody>
-          <a:bodyPr/>
-          <a:lstStyle/>
-          <a:p>
-            <a:r>
-              <a:rPr lang="en-US"/>
-              <a:t>Assessment and Evaluation</a:t>
-            </a:r>
-          </a:p>
-        </p:txBody>
-      </p:sp>
-      <p:sp>
-        <p:nvSpPr>
-          <p:cNvPr id="41987" name="Rectangle 3"/>
-          <p:cNvSpPr>
-            <a:spLocks noGrp="1" noChangeArrowheads="1"/>
-          </p:cNvSpPr>
-          <p:nvPr>
-            <p:ph type="body" idx="1"/>
-          </p:nvPr>
-        </p:nvSpPr>
-        <p:spPr/>
-        <p:txBody>
-          <a:bodyPr/>
-          <a:lstStyle/>
-          <a:p>
-            <a:r>
-              <a:rPr lang="en-US"/>
-              <a:t>Prepare a quiz or challenge to assess how much information participants learned.</a:t>
-            </a:r>
-          </a:p>
-          <a:p>
-            <a:r>
-              <a:rPr lang="en-US"/>
-              <a:t>Survey participants to see if they found the training beneficial.</a:t>
-            </a:r>
-          </a:p>
-          <a:p>
-            <a:endParaRPr lang="en-US"/>
+            <a:pPr marL="0" indent="0">
+              <a:buNone/>
+            </a:pPr>
+            <a:endParaRPr lang="en-US" dirty="0"/>
           </a:p>
         </p:txBody>
       </p:sp>
@@ -8104,15 +8269,7 @@
           <a:p>
             <a:r>
               <a:rPr lang="en-US" dirty="0" smtClean="0"/>
-              <a:t>No code should be committed until </a:t>
-            </a:r>
-            <a:r>
-              <a:rPr lang="en-US" smtClean="0"/>
-              <a:t>all warnings </a:t>
-            </a:r>
-            <a:r>
-              <a:rPr lang="en-US" dirty="0" smtClean="0"/>
-              <a:t>of code analysis and </a:t>
+              <a:t>No code should be committed until all warnings of code analysis and </a:t>
             </a:r>
             <a:r>
               <a:rPr lang="en-US" dirty="0" err="1" smtClean="0"/>
@@ -9030,7 +9187,7 @@
         </p:blipFill>
         <p:spPr bwMode="auto">
           <a:xfrm>
-            <a:off x="609600" y="1810555"/>
+            <a:off x="381000" y="1810555"/>
             <a:ext cx="7943910" cy="4419600"/>
           </a:xfrm>
           <a:prstGeom prst="rect">
@@ -11579,9 +11736,10 @@
           <a:lstStyle/>
           <a:p>
             <a:r>
-              <a:rPr lang="en-US"/>
-              <a:t>Lesson 2: Wrap-up</a:t>
-            </a:r>
+              <a:rPr lang="en-US" dirty="0" smtClean="0"/>
+              <a:t>Fluent Validation</a:t>
+            </a:r>
+            <a:endParaRPr lang="en-US" dirty="0"/>
           </a:p>
         </p:txBody>
       </p:sp>
@@ -11601,15 +11759,65 @@
           <a:lstStyle/>
           <a:p>
             <a:r>
-              <a:rPr lang="en-US"/>
-              <a:t>Summarize important points.</a:t>
-            </a:r>
-          </a:p>
-          <a:p>
-            <a:r>
-              <a:rPr lang="en-US"/>
-              <a:t>Allow time for questions.</a:t>
-            </a:r>
+              <a:rPr lang="en-US" dirty="0" smtClean="0"/>
+              <a:t>A </a:t>
+            </a:r>
+            <a:r>
+              <a:rPr lang="en-US" dirty="0" err="1" smtClean="0"/>
+              <a:t>.net</a:t>
+            </a:r>
+            <a:r>
+              <a:rPr lang="en-US" dirty="0" smtClean="0"/>
+              <a:t> library for validating business objects.</a:t>
+            </a:r>
+            <a:endParaRPr lang="en-US" dirty="0"/>
+          </a:p>
+          <a:p>
+            <a:r>
+              <a:rPr lang="en-US" dirty="0" smtClean="0"/>
+              <a:t>Fluent </a:t>
+            </a:r>
+            <a:r>
+              <a:rPr lang="en-US" dirty="0" err="1" smtClean="0"/>
+              <a:t>api</a:t>
+            </a:r>
+            <a:r>
+              <a:rPr lang="en-US" dirty="0" smtClean="0"/>
+              <a:t> with lambda expressions.</a:t>
+            </a:r>
+          </a:p>
+          <a:p>
+            <a:r>
+              <a:rPr lang="en-US" dirty="0" smtClean="0"/>
+              <a:t>Supports TDD.</a:t>
+            </a:r>
+          </a:p>
+          <a:p>
+            <a:r>
+              <a:rPr lang="en-US" dirty="0" smtClean="0"/>
+              <a:t>Supports Dependency Injection.</a:t>
+            </a:r>
+          </a:p>
+          <a:p>
+            <a:r>
+              <a:rPr lang="en-US" dirty="0" smtClean="0"/>
+              <a:t>Almost every validation is supported like (Not Null, Empty, Range, Regular Expression </a:t>
+            </a:r>
+            <a:r>
+              <a:rPr lang="en-US" dirty="0" err="1" smtClean="0"/>
+              <a:t>etc</a:t>
+            </a:r>
+            <a:r>
+              <a:rPr lang="en-US" dirty="0" smtClean="0"/>
+              <a:t>).</a:t>
+            </a:r>
+          </a:p>
+          <a:p>
+            <a:r>
+              <a:rPr lang="en-US" dirty="0" smtClean="0"/>
+              <a:t>Can be extended to implement your own validator.</a:t>
+            </a:r>
+            <a:endParaRPr lang="en-US" dirty="0"/>
           </a:p>
         </p:txBody>
       </p:sp>
@@ -11621,9 +11829,653 @@
   <p:timing>
     <p:tnLst>
       <p:par>
-        <p:cTn id="1" dur="indefinite" restart="never" nodeType="tmRoot"/>
+        <p:cTn id="1" dur="indefinite" restart="never" nodeType="tmRoot">
+          <p:childTnLst>
+            <p:seq concurrent="1" nextAc="seek">
+              <p:cTn id="2" dur="indefinite" nodeType="mainSeq">
+                <p:childTnLst>
+                  <p:par>
+                    <p:cTn id="3" fill="hold">
+                      <p:stCondLst>
+                        <p:cond delay="indefinite"/>
+                      </p:stCondLst>
+                      <p:childTnLst>
+                        <p:par>
+                          <p:cTn id="4" fill="hold">
+                            <p:stCondLst>
+                              <p:cond delay="0"/>
+                            </p:stCondLst>
+                            <p:childTnLst>
+                              <p:par>
+                                <p:cTn id="5" presetID="2" presetClass="entr" presetSubtype="4" fill="hold" grpId="0" nodeType="clickEffect">
+                                  <p:stCondLst>
+                                    <p:cond delay="0"/>
+                                  </p:stCondLst>
+                                  <p:childTnLst>
+                                    <p:set>
+                                      <p:cBhvr>
+                                        <p:cTn id="6" dur="1" fill="hold">
+                                          <p:stCondLst>
+                                            <p:cond delay="0"/>
+                                          </p:stCondLst>
+                                        </p:cTn>
+                                        <p:tgtEl>
+                                          <p:spTgt spid="39939">
+                                            <p:txEl>
+                                              <p:pRg st="0" end="0"/>
+                                            </p:txEl>
+                                          </p:spTgt>
+                                        </p:tgtEl>
+                                        <p:attrNameLst>
+                                          <p:attrName>style.visibility</p:attrName>
+                                        </p:attrNameLst>
+                                      </p:cBhvr>
+                                      <p:to>
+                                        <p:strVal val="visible"/>
+                                      </p:to>
+                                    </p:set>
+                                    <p:anim calcmode="lin" valueType="num">
+                                      <p:cBhvr additive="base">
+                                        <p:cTn id="7" dur="500" fill="hold"/>
+                                        <p:tgtEl>
+                                          <p:spTgt spid="39939">
+                                            <p:txEl>
+                                              <p:pRg st="0" end="0"/>
+                                            </p:txEl>
+                                          </p:spTgt>
+                                        </p:tgtEl>
+                                        <p:attrNameLst>
+                                          <p:attrName>ppt_x</p:attrName>
+                                        </p:attrNameLst>
+                                      </p:cBhvr>
+                                      <p:tavLst>
+                                        <p:tav tm="0">
+                                          <p:val>
+                                            <p:strVal val="#ppt_x"/>
+                                          </p:val>
+                                        </p:tav>
+                                        <p:tav tm="100000">
+                                          <p:val>
+                                            <p:strVal val="#ppt_x"/>
+                                          </p:val>
+                                        </p:tav>
+                                      </p:tavLst>
+                                    </p:anim>
+                                    <p:anim calcmode="lin" valueType="num">
+                                      <p:cBhvr additive="base">
+                                        <p:cTn id="8" dur="500" fill="hold"/>
+                                        <p:tgtEl>
+                                          <p:spTgt spid="39939">
+                                            <p:txEl>
+                                              <p:pRg st="0" end="0"/>
+                                            </p:txEl>
+                                          </p:spTgt>
+                                        </p:tgtEl>
+                                        <p:attrNameLst>
+                                          <p:attrName>ppt_y</p:attrName>
+                                        </p:attrNameLst>
+                                      </p:cBhvr>
+                                      <p:tavLst>
+                                        <p:tav tm="0">
+                                          <p:val>
+                                            <p:strVal val="1+#ppt_h/2"/>
+                                          </p:val>
+                                        </p:tav>
+                                        <p:tav tm="100000">
+                                          <p:val>
+                                            <p:strVal val="#ppt_y"/>
+                                          </p:val>
+                                        </p:tav>
+                                      </p:tavLst>
+                                    </p:anim>
+                                  </p:childTnLst>
+                                </p:cTn>
+                              </p:par>
+                            </p:childTnLst>
+                          </p:cTn>
+                        </p:par>
+                      </p:childTnLst>
+                    </p:cTn>
+                  </p:par>
+                  <p:par>
+                    <p:cTn id="9" fill="hold">
+                      <p:stCondLst>
+                        <p:cond delay="indefinite"/>
+                      </p:stCondLst>
+                      <p:childTnLst>
+                        <p:par>
+                          <p:cTn id="10" fill="hold">
+                            <p:stCondLst>
+                              <p:cond delay="0"/>
+                            </p:stCondLst>
+                            <p:childTnLst>
+                              <p:par>
+                                <p:cTn id="11" presetID="2" presetClass="entr" presetSubtype="4" fill="hold" grpId="0" nodeType="clickEffect">
+                                  <p:stCondLst>
+                                    <p:cond delay="0"/>
+                                  </p:stCondLst>
+                                  <p:childTnLst>
+                                    <p:set>
+                                      <p:cBhvr>
+                                        <p:cTn id="12" dur="1" fill="hold">
+                                          <p:stCondLst>
+                                            <p:cond delay="0"/>
+                                          </p:stCondLst>
+                                        </p:cTn>
+                                        <p:tgtEl>
+                                          <p:spTgt spid="39939">
+                                            <p:txEl>
+                                              <p:pRg st="1" end="1"/>
+                                            </p:txEl>
+                                          </p:spTgt>
+                                        </p:tgtEl>
+                                        <p:attrNameLst>
+                                          <p:attrName>style.visibility</p:attrName>
+                                        </p:attrNameLst>
+                                      </p:cBhvr>
+                                      <p:to>
+                                        <p:strVal val="visible"/>
+                                      </p:to>
+                                    </p:set>
+                                    <p:anim calcmode="lin" valueType="num">
+                                      <p:cBhvr additive="base">
+                                        <p:cTn id="13" dur="500" fill="hold"/>
+                                        <p:tgtEl>
+                                          <p:spTgt spid="39939">
+                                            <p:txEl>
+                                              <p:pRg st="1" end="1"/>
+                                            </p:txEl>
+                                          </p:spTgt>
+                                        </p:tgtEl>
+                                        <p:attrNameLst>
+                                          <p:attrName>ppt_x</p:attrName>
+                                        </p:attrNameLst>
+                                      </p:cBhvr>
+                                      <p:tavLst>
+                                        <p:tav tm="0">
+                                          <p:val>
+                                            <p:strVal val="#ppt_x"/>
+                                          </p:val>
+                                        </p:tav>
+                                        <p:tav tm="100000">
+                                          <p:val>
+                                            <p:strVal val="#ppt_x"/>
+                                          </p:val>
+                                        </p:tav>
+                                      </p:tavLst>
+                                    </p:anim>
+                                    <p:anim calcmode="lin" valueType="num">
+                                      <p:cBhvr additive="base">
+                                        <p:cTn id="14" dur="500" fill="hold"/>
+                                        <p:tgtEl>
+                                          <p:spTgt spid="39939">
+                                            <p:txEl>
+                                              <p:pRg st="1" end="1"/>
+                                            </p:txEl>
+                                          </p:spTgt>
+                                        </p:tgtEl>
+                                        <p:attrNameLst>
+                                          <p:attrName>ppt_y</p:attrName>
+                                        </p:attrNameLst>
+                                      </p:cBhvr>
+                                      <p:tavLst>
+                                        <p:tav tm="0">
+                                          <p:val>
+                                            <p:strVal val="1+#ppt_h/2"/>
+                                          </p:val>
+                                        </p:tav>
+                                        <p:tav tm="100000">
+                                          <p:val>
+                                            <p:strVal val="#ppt_y"/>
+                                          </p:val>
+                                        </p:tav>
+                                      </p:tavLst>
+                                    </p:anim>
+                                  </p:childTnLst>
+                                </p:cTn>
+                              </p:par>
+                            </p:childTnLst>
+                          </p:cTn>
+                        </p:par>
+                      </p:childTnLst>
+                    </p:cTn>
+                  </p:par>
+                  <p:par>
+                    <p:cTn id="15" fill="hold">
+                      <p:stCondLst>
+                        <p:cond delay="indefinite"/>
+                      </p:stCondLst>
+                      <p:childTnLst>
+                        <p:par>
+                          <p:cTn id="16" fill="hold">
+                            <p:stCondLst>
+                              <p:cond delay="0"/>
+                            </p:stCondLst>
+                            <p:childTnLst>
+                              <p:par>
+                                <p:cTn id="17" presetID="2" presetClass="entr" presetSubtype="4" fill="hold" grpId="0" nodeType="clickEffect">
+                                  <p:stCondLst>
+                                    <p:cond delay="0"/>
+                                  </p:stCondLst>
+                                  <p:childTnLst>
+                                    <p:set>
+                                      <p:cBhvr>
+                                        <p:cTn id="18" dur="1" fill="hold">
+                                          <p:stCondLst>
+                                            <p:cond delay="0"/>
+                                          </p:stCondLst>
+                                        </p:cTn>
+                                        <p:tgtEl>
+                                          <p:spTgt spid="39939">
+                                            <p:txEl>
+                                              <p:pRg st="2" end="2"/>
+                                            </p:txEl>
+                                          </p:spTgt>
+                                        </p:tgtEl>
+                                        <p:attrNameLst>
+                                          <p:attrName>style.visibility</p:attrName>
+                                        </p:attrNameLst>
+                                      </p:cBhvr>
+                                      <p:to>
+                                        <p:strVal val="visible"/>
+                                      </p:to>
+                                    </p:set>
+                                    <p:anim calcmode="lin" valueType="num">
+                                      <p:cBhvr additive="base">
+                                        <p:cTn id="19" dur="500" fill="hold"/>
+                                        <p:tgtEl>
+                                          <p:spTgt spid="39939">
+                                            <p:txEl>
+                                              <p:pRg st="2" end="2"/>
+                                            </p:txEl>
+                                          </p:spTgt>
+                                        </p:tgtEl>
+                                        <p:attrNameLst>
+                                          <p:attrName>ppt_x</p:attrName>
+                                        </p:attrNameLst>
+                                      </p:cBhvr>
+                                      <p:tavLst>
+                                        <p:tav tm="0">
+                                          <p:val>
+                                            <p:strVal val="#ppt_x"/>
+                                          </p:val>
+                                        </p:tav>
+                                        <p:tav tm="100000">
+                                          <p:val>
+                                            <p:strVal val="#ppt_x"/>
+                                          </p:val>
+                                        </p:tav>
+                                      </p:tavLst>
+                                    </p:anim>
+                                    <p:anim calcmode="lin" valueType="num">
+                                      <p:cBhvr additive="base">
+                                        <p:cTn id="20" dur="500" fill="hold"/>
+                                        <p:tgtEl>
+                                          <p:spTgt spid="39939">
+                                            <p:txEl>
+                                              <p:pRg st="2" end="2"/>
+                                            </p:txEl>
+                                          </p:spTgt>
+                                        </p:tgtEl>
+                                        <p:attrNameLst>
+                                          <p:attrName>ppt_y</p:attrName>
+                                        </p:attrNameLst>
+                                      </p:cBhvr>
+                                      <p:tavLst>
+                                        <p:tav tm="0">
+                                          <p:val>
+                                            <p:strVal val="1+#ppt_h/2"/>
+                                          </p:val>
+                                        </p:tav>
+                                        <p:tav tm="100000">
+                                          <p:val>
+                                            <p:strVal val="#ppt_y"/>
+                                          </p:val>
+                                        </p:tav>
+                                      </p:tavLst>
+                                    </p:anim>
+                                  </p:childTnLst>
+                                </p:cTn>
+                              </p:par>
+                            </p:childTnLst>
+                          </p:cTn>
+                        </p:par>
+                      </p:childTnLst>
+                    </p:cTn>
+                  </p:par>
+                  <p:par>
+                    <p:cTn id="21" fill="hold">
+                      <p:stCondLst>
+                        <p:cond delay="indefinite"/>
+                      </p:stCondLst>
+                      <p:childTnLst>
+                        <p:par>
+                          <p:cTn id="22" fill="hold">
+                            <p:stCondLst>
+                              <p:cond delay="0"/>
+                            </p:stCondLst>
+                            <p:childTnLst>
+                              <p:par>
+                                <p:cTn id="23" presetID="2" presetClass="entr" presetSubtype="4" fill="hold" grpId="0" nodeType="clickEffect">
+                                  <p:stCondLst>
+                                    <p:cond delay="0"/>
+                                  </p:stCondLst>
+                                  <p:childTnLst>
+                                    <p:set>
+                                      <p:cBhvr>
+                                        <p:cTn id="24" dur="1" fill="hold">
+                                          <p:stCondLst>
+                                            <p:cond delay="0"/>
+                                          </p:stCondLst>
+                                        </p:cTn>
+                                        <p:tgtEl>
+                                          <p:spTgt spid="39939">
+                                            <p:txEl>
+                                              <p:pRg st="3" end="3"/>
+                                            </p:txEl>
+                                          </p:spTgt>
+                                        </p:tgtEl>
+                                        <p:attrNameLst>
+                                          <p:attrName>style.visibility</p:attrName>
+                                        </p:attrNameLst>
+                                      </p:cBhvr>
+                                      <p:to>
+                                        <p:strVal val="visible"/>
+                                      </p:to>
+                                    </p:set>
+                                    <p:anim calcmode="lin" valueType="num">
+                                      <p:cBhvr additive="base">
+                                        <p:cTn id="25" dur="500" fill="hold"/>
+                                        <p:tgtEl>
+                                          <p:spTgt spid="39939">
+                                            <p:txEl>
+                                              <p:pRg st="3" end="3"/>
+                                            </p:txEl>
+                                          </p:spTgt>
+                                        </p:tgtEl>
+                                        <p:attrNameLst>
+                                          <p:attrName>ppt_x</p:attrName>
+                                        </p:attrNameLst>
+                                      </p:cBhvr>
+                                      <p:tavLst>
+                                        <p:tav tm="0">
+                                          <p:val>
+                                            <p:strVal val="#ppt_x"/>
+                                          </p:val>
+                                        </p:tav>
+                                        <p:tav tm="100000">
+                                          <p:val>
+                                            <p:strVal val="#ppt_x"/>
+                                          </p:val>
+                                        </p:tav>
+                                      </p:tavLst>
+                                    </p:anim>
+                                    <p:anim calcmode="lin" valueType="num">
+                                      <p:cBhvr additive="base">
+                                        <p:cTn id="26" dur="500" fill="hold"/>
+                                        <p:tgtEl>
+                                          <p:spTgt spid="39939">
+                                            <p:txEl>
+                                              <p:pRg st="3" end="3"/>
+                                            </p:txEl>
+                                          </p:spTgt>
+                                        </p:tgtEl>
+                                        <p:attrNameLst>
+                                          <p:attrName>ppt_y</p:attrName>
+                                        </p:attrNameLst>
+                                      </p:cBhvr>
+                                      <p:tavLst>
+                                        <p:tav tm="0">
+                                          <p:val>
+                                            <p:strVal val="1+#ppt_h/2"/>
+                                          </p:val>
+                                        </p:tav>
+                                        <p:tav tm="100000">
+                                          <p:val>
+                                            <p:strVal val="#ppt_y"/>
+                                          </p:val>
+                                        </p:tav>
+                                      </p:tavLst>
+                                    </p:anim>
+                                  </p:childTnLst>
+                                </p:cTn>
+                              </p:par>
+                            </p:childTnLst>
+                          </p:cTn>
+                        </p:par>
+                      </p:childTnLst>
+                    </p:cTn>
+                  </p:par>
+                  <p:par>
+                    <p:cTn id="27" fill="hold">
+                      <p:stCondLst>
+                        <p:cond delay="indefinite"/>
+                      </p:stCondLst>
+                      <p:childTnLst>
+                        <p:par>
+                          <p:cTn id="28" fill="hold">
+                            <p:stCondLst>
+                              <p:cond delay="0"/>
+                            </p:stCondLst>
+                            <p:childTnLst>
+                              <p:par>
+                                <p:cTn id="29" presetID="2" presetClass="entr" presetSubtype="4" fill="hold" grpId="0" nodeType="clickEffect">
+                                  <p:stCondLst>
+                                    <p:cond delay="0"/>
+                                  </p:stCondLst>
+                                  <p:childTnLst>
+                                    <p:set>
+                                      <p:cBhvr>
+                                        <p:cTn id="30" dur="1" fill="hold">
+                                          <p:stCondLst>
+                                            <p:cond delay="0"/>
+                                          </p:stCondLst>
+                                        </p:cTn>
+                                        <p:tgtEl>
+                                          <p:spTgt spid="39939">
+                                            <p:txEl>
+                                              <p:pRg st="4" end="4"/>
+                                            </p:txEl>
+                                          </p:spTgt>
+                                        </p:tgtEl>
+                                        <p:attrNameLst>
+                                          <p:attrName>style.visibility</p:attrName>
+                                        </p:attrNameLst>
+                                      </p:cBhvr>
+                                      <p:to>
+                                        <p:strVal val="visible"/>
+                                      </p:to>
+                                    </p:set>
+                                    <p:anim calcmode="lin" valueType="num">
+                                      <p:cBhvr additive="base">
+                                        <p:cTn id="31" dur="500" fill="hold"/>
+                                        <p:tgtEl>
+                                          <p:spTgt spid="39939">
+                                            <p:txEl>
+                                              <p:pRg st="4" end="4"/>
+                                            </p:txEl>
+                                          </p:spTgt>
+                                        </p:tgtEl>
+                                        <p:attrNameLst>
+                                          <p:attrName>ppt_x</p:attrName>
+                                        </p:attrNameLst>
+                                      </p:cBhvr>
+                                      <p:tavLst>
+                                        <p:tav tm="0">
+                                          <p:val>
+                                            <p:strVal val="#ppt_x"/>
+                                          </p:val>
+                                        </p:tav>
+                                        <p:tav tm="100000">
+                                          <p:val>
+                                            <p:strVal val="#ppt_x"/>
+                                          </p:val>
+                                        </p:tav>
+                                      </p:tavLst>
+                                    </p:anim>
+                                    <p:anim calcmode="lin" valueType="num">
+                                      <p:cBhvr additive="base">
+                                        <p:cTn id="32" dur="500" fill="hold"/>
+                                        <p:tgtEl>
+                                          <p:spTgt spid="39939">
+                                            <p:txEl>
+                                              <p:pRg st="4" end="4"/>
+                                            </p:txEl>
+                                          </p:spTgt>
+                                        </p:tgtEl>
+                                        <p:attrNameLst>
+                                          <p:attrName>ppt_y</p:attrName>
+                                        </p:attrNameLst>
+                                      </p:cBhvr>
+                                      <p:tavLst>
+                                        <p:tav tm="0">
+                                          <p:val>
+                                            <p:strVal val="1+#ppt_h/2"/>
+                                          </p:val>
+                                        </p:tav>
+                                        <p:tav tm="100000">
+                                          <p:val>
+                                            <p:strVal val="#ppt_y"/>
+                                          </p:val>
+                                        </p:tav>
+                                      </p:tavLst>
+                                    </p:anim>
+                                  </p:childTnLst>
+                                </p:cTn>
+                              </p:par>
+                            </p:childTnLst>
+                          </p:cTn>
+                        </p:par>
+                      </p:childTnLst>
+                    </p:cTn>
+                  </p:par>
+                  <p:par>
+                    <p:cTn id="33" fill="hold">
+                      <p:stCondLst>
+                        <p:cond delay="indefinite"/>
+                      </p:stCondLst>
+                      <p:childTnLst>
+                        <p:par>
+                          <p:cTn id="34" fill="hold">
+                            <p:stCondLst>
+                              <p:cond delay="0"/>
+                            </p:stCondLst>
+                            <p:childTnLst>
+                              <p:par>
+                                <p:cTn id="35" presetID="2" presetClass="entr" presetSubtype="4" fill="hold" grpId="0" nodeType="clickEffect">
+                                  <p:stCondLst>
+                                    <p:cond delay="0"/>
+                                  </p:stCondLst>
+                                  <p:childTnLst>
+                                    <p:set>
+                                      <p:cBhvr>
+                                        <p:cTn id="36" dur="1" fill="hold">
+                                          <p:stCondLst>
+                                            <p:cond delay="0"/>
+                                          </p:stCondLst>
+                                        </p:cTn>
+                                        <p:tgtEl>
+                                          <p:spTgt spid="39939">
+                                            <p:txEl>
+                                              <p:pRg st="5" end="5"/>
+                                            </p:txEl>
+                                          </p:spTgt>
+                                        </p:tgtEl>
+                                        <p:attrNameLst>
+                                          <p:attrName>style.visibility</p:attrName>
+                                        </p:attrNameLst>
+                                      </p:cBhvr>
+                                      <p:to>
+                                        <p:strVal val="visible"/>
+                                      </p:to>
+                                    </p:set>
+                                    <p:anim calcmode="lin" valueType="num">
+                                      <p:cBhvr additive="base">
+                                        <p:cTn id="37" dur="500" fill="hold"/>
+                                        <p:tgtEl>
+                                          <p:spTgt spid="39939">
+                                            <p:txEl>
+                                              <p:pRg st="5" end="5"/>
+                                            </p:txEl>
+                                          </p:spTgt>
+                                        </p:tgtEl>
+                                        <p:attrNameLst>
+                                          <p:attrName>ppt_x</p:attrName>
+                                        </p:attrNameLst>
+                                      </p:cBhvr>
+                                      <p:tavLst>
+                                        <p:tav tm="0">
+                                          <p:val>
+                                            <p:strVal val="#ppt_x"/>
+                                          </p:val>
+                                        </p:tav>
+                                        <p:tav tm="100000">
+                                          <p:val>
+                                            <p:strVal val="#ppt_x"/>
+                                          </p:val>
+                                        </p:tav>
+                                      </p:tavLst>
+                                    </p:anim>
+                                    <p:anim calcmode="lin" valueType="num">
+                                      <p:cBhvr additive="base">
+                                        <p:cTn id="38" dur="500" fill="hold"/>
+                                        <p:tgtEl>
+                                          <p:spTgt spid="39939">
+                                            <p:txEl>
+                                              <p:pRg st="5" end="5"/>
+                                            </p:txEl>
+                                          </p:spTgt>
+                                        </p:tgtEl>
+                                        <p:attrNameLst>
+                                          <p:attrName>ppt_y</p:attrName>
+                                        </p:attrNameLst>
+                                      </p:cBhvr>
+                                      <p:tavLst>
+                                        <p:tav tm="0">
+                                          <p:val>
+                                            <p:strVal val="1+#ppt_h/2"/>
+                                          </p:val>
+                                        </p:tav>
+                                        <p:tav tm="100000">
+                                          <p:val>
+                                            <p:strVal val="#ppt_y"/>
+                                          </p:val>
+                                        </p:tav>
+                                      </p:tavLst>
+                                    </p:anim>
+                                  </p:childTnLst>
+                                </p:cTn>
+                              </p:par>
+                            </p:childTnLst>
+                          </p:cTn>
+                        </p:par>
+                      </p:childTnLst>
+                    </p:cTn>
+                  </p:par>
+                </p:childTnLst>
+              </p:cTn>
+              <p:prevCondLst>
+                <p:cond evt="onPrev" delay="0">
+                  <p:tgtEl>
+                    <p:sldTgt/>
+                  </p:tgtEl>
+                </p:cond>
+              </p:prevCondLst>
+              <p:nextCondLst>
+                <p:cond evt="onNext" delay="0">
+                  <p:tgtEl>
+                    <p:sldTgt/>
+                  </p:tgtEl>
+                </p:cond>
+              </p:nextCondLst>
+            </p:seq>
+          </p:childTnLst>
+        </p:cTn>
       </p:par>
     </p:tnLst>
+    <p:bldLst>
+      <p:bldP spid="39939" grpId="0" build="p"/>
+    </p:bldLst>
   </p:timing>
 </p:sld>
 </file>

</xml_diff>